<commit_message>
Added a bunch of data
</commit_message>
<xml_diff>
--- a/ppt/TableauPrepBuilderIntroV1_1.pptx
+++ b/ppt/TableauPrepBuilderIntroV1_1.pptx
@@ -5,10 +5,10 @@
     <p:sldMasterId id="2147483660" r:id="rId4"/>
   </p:sldMasterIdLst>
   <p:notesMasterIdLst>
-    <p:notesMasterId r:id="rId65"/>
+    <p:notesMasterId r:id="rId79"/>
   </p:notesMasterIdLst>
   <p:handoutMasterIdLst>
-    <p:handoutMasterId r:id="rId66"/>
+    <p:handoutMasterId r:id="rId80"/>
   </p:handoutMasterIdLst>
   <p:sldIdLst>
     <p:sldId id="323" r:id="rId5"/>
@@ -24,53 +24,67 @@
     <p:sldId id="417" r:id="rId15"/>
     <p:sldId id="418" r:id="rId16"/>
     <p:sldId id="419" r:id="rId17"/>
-    <p:sldId id="342" r:id="rId18"/>
-    <p:sldId id="343" r:id="rId19"/>
-    <p:sldId id="344" r:id="rId20"/>
-    <p:sldId id="345" r:id="rId21"/>
-    <p:sldId id="346" r:id="rId22"/>
-    <p:sldId id="409" r:id="rId23"/>
-    <p:sldId id="401" r:id="rId24"/>
-    <p:sldId id="402" r:id="rId25"/>
-    <p:sldId id="403" r:id="rId26"/>
-    <p:sldId id="404" r:id="rId27"/>
-    <p:sldId id="405" r:id="rId28"/>
-    <p:sldId id="406" r:id="rId29"/>
-    <p:sldId id="407" r:id="rId30"/>
-    <p:sldId id="408" r:id="rId31"/>
-    <p:sldId id="410" r:id="rId32"/>
-    <p:sldId id="396" r:id="rId33"/>
-    <p:sldId id="397" r:id="rId34"/>
-    <p:sldId id="398" r:id="rId35"/>
-    <p:sldId id="399" r:id="rId36"/>
-    <p:sldId id="400" r:id="rId37"/>
-    <p:sldId id="411" r:id="rId38"/>
-    <p:sldId id="392" r:id="rId39"/>
-    <p:sldId id="393" r:id="rId40"/>
-    <p:sldId id="394" r:id="rId41"/>
-    <p:sldId id="395" r:id="rId42"/>
-    <p:sldId id="412" r:id="rId43"/>
-    <p:sldId id="386" r:id="rId44"/>
-    <p:sldId id="387" r:id="rId45"/>
-    <p:sldId id="388" r:id="rId46"/>
-    <p:sldId id="389" r:id="rId47"/>
-    <p:sldId id="390" r:id="rId48"/>
-    <p:sldId id="391" r:id="rId49"/>
-    <p:sldId id="413" r:id="rId50"/>
-    <p:sldId id="374" r:id="rId51"/>
-    <p:sldId id="375" r:id="rId52"/>
-    <p:sldId id="376" r:id="rId53"/>
-    <p:sldId id="377" r:id="rId54"/>
-    <p:sldId id="378" r:id="rId55"/>
-    <p:sldId id="379" r:id="rId56"/>
-    <p:sldId id="414" r:id="rId57"/>
-    <p:sldId id="381" r:id="rId58"/>
-    <p:sldId id="382" r:id="rId59"/>
-    <p:sldId id="383" r:id="rId60"/>
-    <p:sldId id="384" r:id="rId61"/>
-    <p:sldId id="385" r:id="rId62"/>
-    <p:sldId id="415" r:id="rId63"/>
-    <p:sldId id="340" r:id="rId64"/>
+    <p:sldId id="420" r:id="rId18"/>
+    <p:sldId id="421" r:id="rId19"/>
+    <p:sldId id="422" r:id="rId20"/>
+    <p:sldId id="426" r:id="rId21"/>
+    <p:sldId id="423" r:id="rId22"/>
+    <p:sldId id="424" r:id="rId23"/>
+    <p:sldId id="425" r:id="rId24"/>
+    <p:sldId id="427" r:id="rId25"/>
+    <p:sldId id="428" r:id="rId26"/>
+    <p:sldId id="429" r:id="rId27"/>
+    <p:sldId id="430" r:id="rId28"/>
+    <p:sldId id="431" r:id="rId29"/>
+    <p:sldId id="432" r:id="rId30"/>
+    <p:sldId id="433" r:id="rId31"/>
+    <p:sldId id="342" r:id="rId32"/>
+    <p:sldId id="343" r:id="rId33"/>
+    <p:sldId id="344" r:id="rId34"/>
+    <p:sldId id="345" r:id="rId35"/>
+    <p:sldId id="346" r:id="rId36"/>
+    <p:sldId id="409" r:id="rId37"/>
+    <p:sldId id="401" r:id="rId38"/>
+    <p:sldId id="402" r:id="rId39"/>
+    <p:sldId id="403" r:id="rId40"/>
+    <p:sldId id="404" r:id="rId41"/>
+    <p:sldId id="405" r:id="rId42"/>
+    <p:sldId id="406" r:id="rId43"/>
+    <p:sldId id="407" r:id="rId44"/>
+    <p:sldId id="408" r:id="rId45"/>
+    <p:sldId id="410" r:id="rId46"/>
+    <p:sldId id="396" r:id="rId47"/>
+    <p:sldId id="397" r:id="rId48"/>
+    <p:sldId id="398" r:id="rId49"/>
+    <p:sldId id="399" r:id="rId50"/>
+    <p:sldId id="400" r:id="rId51"/>
+    <p:sldId id="411" r:id="rId52"/>
+    <p:sldId id="392" r:id="rId53"/>
+    <p:sldId id="393" r:id="rId54"/>
+    <p:sldId id="394" r:id="rId55"/>
+    <p:sldId id="395" r:id="rId56"/>
+    <p:sldId id="412" r:id="rId57"/>
+    <p:sldId id="386" r:id="rId58"/>
+    <p:sldId id="387" r:id="rId59"/>
+    <p:sldId id="388" r:id="rId60"/>
+    <p:sldId id="389" r:id="rId61"/>
+    <p:sldId id="390" r:id="rId62"/>
+    <p:sldId id="391" r:id="rId63"/>
+    <p:sldId id="413" r:id="rId64"/>
+    <p:sldId id="374" r:id="rId65"/>
+    <p:sldId id="375" r:id="rId66"/>
+    <p:sldId id="376" r:id="rId67"/>
+    <p:sldId id="377" r:id="rId68"/>
+    <p:sldId id="378" r:id="rId69"/>
+    <p:sldId id="379" r:id="rId70"/>
+    <p:sldId id="414" r:id="rId71"/>
+    <p:sldId id="381" r:id="rId72"/>
+    <p:sldId id="382" r:id="rId73"/>
+    <p:sldId id="383" r:id="rId74"/>
+    <p:sldId id="384" r:id="rId75"/>
+    <p:sldId id="385" r:id="rId76"/>
+    <p:sldId id="415" r:id="rId77"/>
+    <p:sldId id="340" r:id="rId78"/>
   </p:sldIdLst>
   <p:sldSz cx="12192000" cy="6858000"/>
   <p:notesSz cx="9309100" cy="7053263"/>
@@ -221,6 +235,20 @@
             <p14:sldId id="417"/>
             <p14:sldId id="418"/>
             <p14:sldId id="419"/>
+            <p14:sldId id="420"/>
+            <p14:sldId id="421"/>
+            <p14:sldId id="422"/>
+            <p14:sldId id="426"/>
+            <p14:sldId id="423"/>
+            <p14:sldId id="424"/>
+            <p14:sldId id="425"/>
+            <p14:sldId id="427"/>
+            <p14:sldId id="428"/>
+            <p14:sldId id="429"/>
+            <p14:sldId id="430"/>
+            <p14:sldId id="431"/>
+            <p14:sldId id="432"/>
+            <p14:sldId id="433"/>
           </p14:sldIdLst>
         </p14:section>
         <p14:section name="Module 2: Introduction and Prep Builder" id="{98F94D3A-15E3-4D17-80BB-8918625923CE}">
@@ -458,7 +486,7 @@
               <a:pPr>
                 <a:defRPr/>
               </a:pPr>
-              <a:t>1/19/20</a:t>
+              <a:t>1/19/2020</a:t>
             </a:fld>
             <a:endParaRPr lang="en-US"/>
           </a:p>
@@ -677,7 +705,7 @@
               <a:pPr>
                 <a:defRPr/>
               </a:pPr>
-              <a:t>1/19/20</a:t>
+              <a:t>1/19/2020</a:t>
             </a:fld>
             <a:endParaRPr lang="en-US"/>
           </a:p>
@@ -4392,7 +4420,11 @@
           <a:bodyPr/>
           <a:lstStyle/>
           <a:p>
-            <a:endParaRPr lang="en-US"/>
+            <a:r>
+              <a:rPr lang="en-US" dirty="0" smtClean="0"/>
+              <a:t>Transform</a:t>
+            </a:r>
+            <a:endParaRPr lang="en-US" dirty="0"/>
           </a:p>
         </p:txBody>
       </p:sp>
@@ -4417,7 +4449,43 @@
           <a:bodyPr/>
           <a:lstStyle/>
           <a:p>
-            <a:endParaRPr lang="en-US"/>
+            <a:r>
+              <a:rPr lang="en-US" dirty="0" smtClean="0"/>
+              <a:t>“Clean” data = remove or repair erroneous entries</a:t>
+            </a:r>
+          </a:p>
+          <a:p>
+            <a:r>
+              <a:rPr lang="en-US" dirty="0" smtClean="0"/>
+              <a:t>“Shape” data = get data in a form that’s compatible with your analytic needs</a:t>
+            </a:r>
+          </a:p>
+          <a:p>
+            <a:pPr lvl="1"/>
+            <a:r>
+              <a:rPr lang="en-US" dirty="0" smtClean="0"/>
+              <a:t>Join &amp; </a:t>
+            </a:r>
+            <a:r>
+              <a:rPr lang="en-US" dirty="0" err="1" smtClean="0"/>
+              <a:t>denormalize</a:t>
+            </a:r>
+            <a:endParaRPr lang="en-US" dirty="0" smtClean="0"/>
+          </a:p>
+          <a:p>
+            <a:pPr lvl="1"/>
+            <a:r>
+              <a:rPr lang="en-US" dirty="0" smtClean="0"/>
+              <a:t>Replace codes</a:t>
+            </a:r>
+          </a:p>
+          <a:p>
+            <a:pPr lvl="1"/>
+            <a:r>
+              <a:rPr lang="en-US" dirty="0" err="1" smtClean="0"/>
+              <a:t>Unpivot</a:t>
+            </a:r>
+            <a:endParaRPr lang="en-US" dirty="0"/>
           </a:p>
         </p:txBody>
       </p:sp>
@@ -4463,48 +4531,40 @@
         </p:nvSpPr>
         <p:spPr/>
         <p:txBody>
-          <a:bodyPr>
-            <a:normAutofit/>
-          </a:bodyPr>
-          <a:lstStyle/>
-          <a:p>
-            <a:r>
-              <a:rPr lang="en-US" dirty="0"/>
-              <a:t>Introduction &amp; Tableau Prep Builder</a:t>
-            </a:r>
-          </a:p>
-          <a:p>
+          <a:bodyPr/>
+          <a:lstStyle/>
+          <a:p>
+            <a:r>
+              <a:rPr lang="en-US" dirty="0" smtClean="0"/>
+              <a:t>Load</a:t>
+            </a:r>
             <a:endParaRPr lang="en-US" dirty="0"/>
           </a:p>
         </p:txBody>
       </p:sp>
       <p:sp>
         <p:nvSpPr>
-          <p:cNvPr id="4" name="Slide Number Placeholder 3"/>
-          <p:cNvSpPr>
-            <a:spLocks noGrp="1"/>
-          </p:cNvSpPr>
-          <p:nvPr>
-            <p:ph type="sldNum" sz="quarter" idx="4294967295"/>
-          </p:nvPr>
-        </p:nvSpPr>
-        <p:spPr/>
-        <p:txBody>
-          <a:bodyPr/>
-          <a:lstStyle/>
-          <a:p>
-            <a:fld id="{4FAB73BC-B049-4115-A692-8D63A059BFB8}" type="slidenum">
-              <a:rPr lang="en-US" smtClean="0"/>
-              <a:t>14</a:t>
-            </a:fld>
-            <a:endParaRPr lang="en-US" dirty="0"/>
+          <p:cNvPr id="3" name="Text Placeholder 2"/>
+          <p:cNvSpPr>
+            <a:spLocks noGrp="1"/>
+          </p:cNvSpPr>
+          <p:nvPr>
+            <p:ph type="body" sz="quarter" idx="10"/>
+          </p:nvPr>
+        </p:nvSpPr>
+        <p:spPr/>
+        <p:txBody>
+          <a:bodyPr/>
+          <a:lstStyle/>
+          <a:p>
+            <a:endParaRPr lang="en-US"/>
           </a:p>
         </p:txBody>
       </p:sp>
     </p:spTree>
     <p:extLst>
       <p:ext uri="{BB962C8B-B14F-4D97-AF65-F5344CB8AC3E}">
-        <p14:creationId xmlns:p14="http://schemas.microsoft.com/office/powerpoint/2010/main" val="765774969"/>
+        <p14:creationId xmlns:p14="http://schemas.microsoft.com/office/powerpoint/2010/main" val="4138222370"/>
       </p:ext>
     </p:extLst>
   </p:cSld>
@@ -4543,24 +4603,20 @@
         </p:nvSpPr>
         <p:spPr/>
         <p:txBody>
-          <a:bodyPr>
-            <a:normAutofit/>
-          </a:bodyPr>
-          <a:lstStyle/>
-          <a:p>
-            <a:r>
-              <a:rPr lang="en-US" dirty="0"/>
-              <a:t>Tableau Prep Builder</a:t>
-            </a:r>
-          </a:p>
-          <a:p>
+          <a:bodyPr/>
+          <a:lstStyle/>
+          <a:p>
+            <a:r>
+              <a:rPr lang="en-US" dirty="0" smtClean="0"/>
+              <a:t>About the Demo Data</a:t>
+            </a:r>
             <a:endParaRPr lang="en-US" dirty="0"/>
           </a:p>
         </p:txBody>
       </p:sp>
       <p:sp>
         <p:nvSpPr>
-          <p:cNvPr id="5" name="Text Placeholder 4"/>
+          <p:cNvPr id="3" name="Text Placeholder 2"/>
           <p:cNvSpPr>
             <a:spLocks noGrp="1"/>
           </p:cNvSpPr>
@@ -4573,29 +4629,54 @@
           <a:bodyPr/>
           <a:lstStyle/>
           <a:p>
-            <a:endParaRPr lang="en-US"/>
-          </a:p>
-        </p:txBody>
-      </p:sp>
-      <p:sp>
-        <p:nvSpPr>
-          <p:cNvPr id="4" name="Slide Number Placeholder 3"/>
-          <p:cNvSpPr>
-            <a:spLocks noGrp="1"/>
-          </p:cNvSpPr>
-          <p:nvPr>
-            <p:ph type="sldNum" sz="quarter" idx="4294967295"/>
-          </p:nvPr>
-        </p:nvSpPr>
-        <p:spPr/>
-        <p:txBody>
-          <a:bodyPr/>
-          <a:lstStyle/>
-          <a:p>
-            <a:fld id="{4FAB73BC-B049-4115-A692-8D63A059BFB8}" type="slidenum">
-              <a:rPr lang="en-US" smtClean="0"/>
-              <a:t>15</a:t>
-            </a:fld>
+            <a:r>
+              <a:rPr lang="en-US" dirty="0" smtClean="0"/>
+              <a:t>ZTCA </a:t>
+            </a:r>
+            <a:r>
+              <a:rPr lang="en-US" dirty="0" smtClean="0">
+                <a:sym typeface="Wingdings" panose="05000000000000000000" pitchFamily="2" charset="2"/>
+              </a:rPr>
+              <a:t> Census</a:t>
+            </a:r>
+          </a:p>
+          <a:p>
+            <a:r>
+              <a:rPr lang="en-US" dirty="0" smtClean="0">
+                <a:sym typeface="Wingdings" panose="05000000000000000000" pitchFamily="2" charset="2"/>
+              </a:rPr>
+              <a:t>USALEEP</a:t>
+            </a:r>
+          </a:p>
+          <a:p>
+            <a:r>
+              <a:rPr lang="en-US" dirty="0" smtClean="0">
+                <a:sym typeface="Wingdings" panose="05000000000000000000" pitchFamily="2" charset="2"/>
+              </a:rPr>
+              <a:t>GEOCORR Education Data</a:t>
+            </a:r>
+          </a:p>
+          <a:p>
+            <a:r>
+              <a:rPr lang="en-US" dirty="0" smtClean="0">
+                <a:sym typeface="Wingdings" panose="05000000000000000000" pitchFamily="2" charset="2"/>
+              </a:rPr>
+              <a:t>The </a:t>
+            </a:r>
+            <a:r>
+              <a:rPr lang="en-US" dirty="0" err="1" smtClean="0">
+                <a:sym typeface="Wingdings" panose="05000000000000000000" pitchFamily="2" charset="2"/>
+              </a:rPr>
+              <a:t>SplitWise</a:t>
+            </a:r>
+            <a:r>
+              <a:rPr lang="en-US" dirty="0" smtClean="0">
+                <a:sym typeface="Wingdings" panose="05000000000000000000" pitchFamily="2" charset="2"/>
+              </a:rPr>
+              <a:t> Blog</a:t>
+            </a:r>
+          </a:p>
+          <a:p>
             <a:endParaRPr lang="en-US" dirty="0"/>
           </a:p>
         </p:txBody>
@@ -4603,7 +4684,7 @@
     </p:spTree>
     <p:extLst>
       <p:ext uri="{BB962C8B-B14F-4D97-AF65-F5344CB8AC3E}">
-        <p14:creationId xmlns:p14="http://schemas.microsoft.com/office/powerpoint/2010/main" val="3047944977"/>
+        <p14:creationId xmlns:p14="http://schemas.microsoft.com/office/powerpoint/2010/main" val="3094642106"/>
       </p:ext>
     </p:extLst>
   </p:cSld>
@@ -4642,24 +4723,20 @@
         </p:nvSpPr>
         <p:spPr/>
         <p:txBody>
-          <a:bodyPr>
-            <a:normAutofit/>
-          </a:bodyPr>
-          <a:lstStyle/>
-          <a:p>
-            <a:r>
-              <a:rPr lang="en-US" dirty="0"/>
-              <a:t>Tableau Prep Builder Interface</a:t>
-            </a:r>
-          </a:p>
-          <a:p>
+          <a:bodyPr/>
+          <a:lstStyle/>
+          <a:p>
+            <a:r>
+              <a:rPr lang="en-US" dirty="0" smtClean="0"/>
+              <a:t>Connecting to Data</a:t>
+            </a:r>
             <a:endParaRPr lang="en-US" dirty="0"/>
           </a:p>
         </p:txBody>
       </p:sp>
       <p:sp>
         <p:nvSpPr>
-          <p:cNvPr id="5" name="Text Placeholder 4"/>
+          <p:cNvPr id="3" name="Text Placeholder 2"/>
           <p:cNvSpPr>
             <a:spLocks noGrp="1"/>
           </p:cNvSpPr>
@@ -4667,48 +4744,61 @@
             <p:ph type="body" sz="quarter" idx="10"/>
           </p:nvPr>
         </p:nvSpPr>
-        <p:spPr/>
-        <p:txBody>
-          <a:bodyPr/>
-          <a:lstStyle/>
-          <a:p>
-            <a:endParaRPr lang="en-US"/>
-          </a:p>
-        </p:txBody>
-      </p:sp>
-      <p:sp>
-        <p:nvSpPr>
-          <p:cNvPr id="4" name="Slide Number Placeholder 3"/>
-          <p:cNvSpPr>
-            <a:spLocks noGrp="1"/>
-          </p:cNvSpPr>
-          <p:nvPr>
-            <p:ph type="sldNum" sz="quarter" idx="4294967295"/>
-          </p:nvPr>
-        </p:nvSpPr>
-        <p:spPr/>
-        <p:txBody>
-          <a:bodyPr/>
-          <a:lstStyle/>
-          <a:p>
-            <a:fld id="{4FAB73BC-B049-4115-A692-8D63A059BFB8}" type="slidenum">
-              <a:rPr lang="en-US" smtClean="0"/>
-              <a:t>16</a:t>
-            </a:fld>
+        <p:spPr>
+          <a:xfrm>
+            <a:off x="762000" y="1752600"/>
+            <a:ext cx="9144000" cy="3733800"/>
+          </a:xfrm>
+        </p:spPr>
+        <p:txBody>
+          <a:bodyPr/>
+          <a:lstStyle/>
+          <a:p>
             <a:endParaRPr lang="en-US" dirty="0"/>
           </a:p>
         </p:txBody>
       </p:sp>
+      <p:pic>
+        <p:nvPicPr>
+          <p:cNvPr id="4" name="Picture 3"/>
+          <p:cNvPicPr>
+            <a:picLocks noChangeAspect="1"/>
+          </p:cNvPicPr>
+          <p:nvPr/>
+        </p:nvPicPr>
+        <p:blipFill>
+          <a:blip r:embed="rId2"/>
+          <a:stretch>
+            <a:fillRect/>
+          </a:stretch>
+        </p:blipFill>
+        <p:spPr>
+          <a:xfrm>
+            <a:off x="10096414" y="304801"/>
+            <a:ext cx="1333586" cy="5181600"/>
+          </a:xfrm>
+          <a:prstGeom prst="rect">
+            <a:avLst/>
+          </a:prstGeom>
+        </p:spPr>
+      </p:pic>
     </p:spTree>
     <p:extLst>
       <p:ext uri="{BB962C8B-B14F-4D97-AF65-F5344CB8AC3E}">
-        <p14:creationId xmlns:p14="http://schemas.microsoft.com/office/powerpoint/2010/main" val="368237020"/>
+        <p14:creationId xmlns:p14="http://schemas.microsoft.com/office/powerpoint/2010/main" val="2791690790"/>
       </p:ext>
     </p:extLst>
   </p:cSld>
   <p:clrMapOvr>
     <a:masterClrMapping/>
   </p:clrMapOvr>
+  <p:timing>
+    <p:tnLst>
+      <p:par>
+        <p:cTn id="1" dur="indefinite" restart="never" nodeType="tmRoot"/>
+      </p:par>
+    </p:tnLst>
+  </p:timing>
 </p:sld>
 </file>
 
@@ -4741,24 +4831,24 @@
         </p:nvSpPr>
         <p:spPr/>
         <p:txBody>
-          <a:bodyPr>
-            <a:normAutofit/>
-          </a:bodyPr>
-          <a:lstStyle/>
-          <a:p>
-            <a:r>
-              <a:rPr lang="en-US" dirty="0"/>
-              <a:t>Steps in Tableau Prep Builder</a:t>
-            </a:r>
-          </a:p>
-          <a:p>
+          <a:bodyPr/>
+          <a:lstStyle/>
+          <a:p>
+            <a:r>
+              <a:rPr lang="en-US" dirty="0" smtClean="0"/>
+              <a:t>Server-Based</a:t>
+            </a:r>
+            <a:r>
+              <a:rPr lang="en-US" baseline="0" dirty="0" smtClean="0"/>
+              <a:t> Data Sources</a:t>
+            </a:r>
             <a:endParaRPr lang="en-US" dirty="0"/>
           </a:p>
         </p:txBody>
       </p:sp>
       <p:sp>
         <p:nvSpPr>
-          <p:cNvPr id="5" name="Text Placeholder 4"/>
+          <p:cNvPr id="3" name="Text Placeholder 2"/>
           <p:cNvSpPr>
             <a:spLocks noGrp="1"/>
           </p:cNvSpPr>
@@ -4772,36 +4862,13 @@
           <a:lstStyle/>
           <a:p>
             <a:endParaRPr lang="en-US"/>
-          </a:p>
-        </p:txBody>
-      </p:sp>
-      <p:sp>
-        <p:nvSpPr>
-          <p:cNvPr id="4" name="Slide Number Placeholder 3"/>
-          <p:cNvSpPr>
-            <a:spLocks noGrp="1"/>
-          </p:cNvSpPr>
-          <p:nvPr>
-            <p:ph type="sldNum" sz="quarter" idx="4294967295"/>
-          </p:nvPr>
-        </p:nvSpPr>
-        <p:spPr/>
-        <p:txBody>
-          <a:bodyPr/>
-          <a:lstStyle/>
-          <a:p>
-            <a:fld id="{4FAB73BC-B049-4115-A692-8D63A059BFB8}" type="slidenum">
-              <a:rPr lang="en-US" smtClean="0"/>
-              <a:t>17</a:t>
-            </a:fld>
-            <a:endParaRPr lang="en-US" dirty="0"/>
           </a:p>
         </p:txBody>
       </p:sp>
     </p:spTree>
     <p:extLst>
       <p:ext uri="{BB962C8B-B14F-4D97-AF65-F5344CB8AC3E}">
-        <p14:creationId xmlns:p14="http://schemas.microsoft.com/office/powerpoint/2010/main" val="1798720831"/>
+        <p14:creationId xmlns:p14="http://schemas.microsoft.com/office/powerpoint/2010/main" val="3838145268"/>
       </p:ext>
     </p:extLst>
   </p:cSld>
@@ -4840,70 +4907,136 @@
         </p:nvSpPr>
         <p:spPr/>
         <p:txBody>
-          <a:bodyPr>
-            <a:normAutofit/>
-          </a:bodyPr>
-          <a:lstStyle/>
-          <a:p>
-            <a:r>
-              <a:rPr lang="en-US" dirty="0"/>
-              <a:t>Features of a Workflow</a:t>
-            </a:r>
-          </a:p>
-          <a:p>
+          <a:bodyPr/>
+          <a:lstStyle/>
+          <a:p>
+            <a:r>
+              <a:rPr lang="en-US" dirty="0" smtClean="0"/>
+              <a:t>Connect to SQL Server</a:t>
+            </a:r>
             <a:endParaRPr lang="en-US" dirty="0"/>
           </a:p>
+        </p:txBody>
+      </p:sp>
+      <p:sp>
+        <p:nvSpPr>
+          <p:cNvPr id="3" name="Text Placeholder 2"/>
+          <p:cNvSpPr>
+            <a:spLocks noGrp="1"/>
+          </p:cNvSpPr>
+          <p:nvPr>
+            <p:ph type="body" sz="quarter" idx="10"/>
+          </p:nvPr>
+        </p:nvSpPr>
+        <p:spPr/>
+        <p:txBody>
+          <a:bodyPr/>
+          <a:lstStyle/>
           <a:p>
             <a:endParaRPr lang="en-US" dirty="0"/>
           </a:p>
         </p:txBody>
       </p:sp>
-      <p:sp>
-        <p:nvSpPr>
-          <p:cNvPr id="5" name="Text Placeholder 4"/>
-          <p:cNvSpPr>
-            <a:spLocks noGrp="1"/>
-          </p:cNvSpPr>
-          <p:nvPr>
-            <p:ph type="body" sz="quarter" idx="10"/>
-          </p:nvPr>
-        </p:nvSpPr>
-        <p:spPr/>
-        <p:txBody>
-          <a:bodyPr/>
-          <a:lstStyle/>
-          <a:p>
-            <a:endParaRPr lang="en-US"/>
-          </a:p>
-        </p:txBody>
-      </p:sp>
-      <p:sp>
-        <p:nvSpPr>
-          <p:cNvPr id="4" name="Slide Number Placeholder 3"/>
-          <p:cNvSpPr>
-            <a:spLocks noGrp="1"/>
-          </p:cNvSpPr>
-          <p:nvPr>
-            <p:ph type="sldNum" sz="quarter" idx="4294967295"/>
-          </p:nvPr>
-        </p:nvSpPr>
-        <p:spPr/>
-        <p:txBody>
-          <a:bodyPr/>
-          <a:lstStyle/>
-          <a:p>
-            <a:fld id="{4FAB73BC-B049-4115-A692-8D63A059BFB8}" type="slidenum">
-              <a:rPr lang="en-US" smtClean="0"/>
-              <a:t>18</a:t>
-            </a:fld>
-            <a:endParaRPr lang="en-US" dirty="0"/>
-          </a:p>
-        </p:txBody>
-      </p:sp>
+      <p:pic>
+        <p:nvPicPr>
+          <p:cNvPr id="4" name="Picture 3"/>
+          <p:cNvPicPr>
+            <a:picLocks noChangeAspect="1"/>
+          </p:cNvPicPr>
+          <p:nvPr/>
+        </p:nvPicPr>
+        <p:blipFill>
+          <a:blip r:embed="rId2"/>
+          <a:stretch>
+            <a:fillRect/>
+          </a:stretch>
+        </p:blipFill>
+        <p:spPr>
+          <a:xfrm>
+            <a:off x="8839200" y="385412"/>
+            <a:ext cx="2057687" cy="266737"/>
+          </a:xfrm>
+          <a:prstGeom prst="rect">
+            <a:avLst/>
+          </a:prstGeom>
+        </p:spPr>
+      </p:pic>
+      <p:pic>
+        <p:nvPicPr>
+          <p:cNvPr id="5" name="Picture 4"/>
+          <p:cNvPicPr>
+            <a:picLocks noChangeAspect="1"/>
+          </p:cNvPicPr>
+          <p:nvPr/>
+        </p:nvPicPr>
+        <p:blipFill>
+          <a:blip r:embed="rId3"/>
+          <a:stretch>
+            <a:fillRect/>
+          </a:stretch>
+        </p:blipFill>
+        <p:spPr>
+          <a:xfrm>
+            <a:off x="8839200" y="914400"/>
+            <a:ext cx="2059964" cy="2129124"/>
+          </a:xfrm>
+          <a:prstGeom prst="rect">
+            <a:avLst/>
+          </a:prstGeom>
+        </p:spPr>
+      </p:pic>
+      <p:pic>
+        <p:nvPicPr>
+          <p:cNvPr id="6" name="Picture 5"/>
+          <p:cNvPicPr>
+            <a:picLocks noChangeAspect="1"/>
+          </p:cNvPicPr>
+          <p:nvPr/>
+        </p:nvPicPr>
+        <p:blipFill>
+          <a:blip r:embed="rId4"/>
+          <a:stretch>
+            <a:fillRect/>
+          </a:stretch>
+        </p:blipFill>
+        <p:spPr>
+          <a:xfrm>
+            <a:off x="12344400" y="4267200"/>
+            <a:ext cx="1829055" cy="724001"/>
+          </a:xfrm>
+          <a:prstGeom prst="rect">
+            <a:avLst/>
+          </a:prstGeom>
+        </p:spPr>
+      </p:pic>
+      <p:pic>
+        <p:nvPicPr>
+          <p:cNvPr id="7" name="Picture 6"/>
+          <p:cNvPicPr>
+            <a:picLocks noChangeAspect="1"/>
+          </p:cNvPicPr>
+          <p:nvPr/>
+        </p:nvPicPr>
+        <p:blipFill>
+          <a:blip r:embed="rId5"/>
+          <a:stretch>
+            <a:fillRect/>
+          </a:stretch>
+        </p:blipFill>
+        <p:spPr>
+          <a:xfrm>
+            <a:off x="8953515" y="3305775"/>
+            <a:ext cx="1829055" cy="2238687"/>
+          </a:xfrm>
+          <a:prstGeom prst="rect">
+            <a:avLst/>
+          </a:prstGeom>
+        </p:spPr>
+      </p:pic>
     </p:spTree>
     <p:extLst>
       <p:ext uri="{BB962C8B-B14F-4D97-AF65-F5344CB8AC3E}">
-        <p14:creationId xmlns:p14="http://schemas.microsoft.com/office/powerpoint/2010/main" val="28198983"/>
+        <p14:creationId xmlns:p14="http://schemas.microsoft.com/office/powerpoint/2010/main" val="539034092"/>
       </p:ext>
     </p:extLst>
   </p:cSld>
@@ -4932,12 +5065,35 @@
       </p:grpSpPr>
       <p:sp>
         <p:nvSpPr>
-          <p:cNvPr id="13" name="Subtitle 12"/>
-          <p:cNvSpPr>
-            <a:spLocks noGrp="1"/>
-          </p:cNvSpPr>
-          <p:nvPr>
-            <p:ph type="subTitle" idx="1"/>
+          <p:cNvPr id="2" name="Title 1"/>
+          <p:cNvSpPr>
+            <a:spLocks noGrp="1"/>
+          </p:cNvSpPr>
+          <p:nvPr>
+            <p:ph type="title"/>
+          </p:nvPr>
+        </p:nvSpPr>
+        <p:spPr/>
+        <p:txBody>
+          <a:bodyPr/>
+          <a:lstStyle/>
+          <a:p>
+            <a:r>
+              <a:rPr lang="en-US" dirty="0" smtClean="0"/>
+              <a:t>Initial SQL</a:t>
+            </a:r>
+            <a:endParaRPr lang="en-US" dirty="0"/>
+          </a:p>
+        </p:txBody>
+      </p:sp>
+      <p:sp>
+        <p:nvSpPr>
+          <p:cNvPr id="3" name="Text Placeholder 2"/>
+          <p:cNvSpPr>
+            <a:spLocks noGrp="1"/>
+          </p:cNvSpPr>
+          <p:nvPr>
+            <p:ph type="body" sz="quarter" idx="10"/>
           </p:nvPr>
         </p:nvSpPr>
         <p:spPr/>
@@ -4949,56 +5105,155 @@
           </a:p>
         </p:txBody>
       </p:sp>
-      <p:sp>
-        <p:nvSpPr>
-          <p:cNvPr id="14" name="Text Placeholder 13"/>
-          <p:cNvSpPr>
-            <a:spLocks noGrp="1"/>
-          </p:cNvSpPr>
-          <p:nvPr>
-            <p:ph type="body" sz="quarter" idx="11"/>
-          </p:nvPr>
-        </p:nvSpPr>
-        <p:spPr/>
-        <p:txBody>
-          <a:bodyPr/>
-          <a:lstStyle/>
-          <a:p>
-            <a:endParaRPr lang="en-US"/>
-          </a:p>
-        </p:txBody>
-      </p:sp>
-      <p:sp>
-        <p:nvSpPr>
-          <p:cNvPr id="8" name="Title 7"/>
-          <p:cNvSpPr>
-            <a:spLocks noGrp="1"/>
-          </p:cNvSpPr>
-          <p:nvPr>
-            <p:ph type="title"/>
-          </p:nvPr>
-        </p:nvSpPr>
+      <p:pic>
+        <p:nvPicPr>
+          <p:cNvPr id="10" name="Picture 9"/>
+          <p:cNvPicPr>
+            <a:picLocks noChangeAspect="1"/>
+          </p:cNvPicPr>
+          <p:nvPr/>
+        </p:nvPicPr>
+        <p:blipFill>
+          <a:blip r:embed="rId2"/>
+          <a:stretch>
+            <a:fillRect/>
+          </a:stretch>
+        </p:blipFill>
         <p:spPr>
           <a:xfrm>
-            <a:off x="762000" y="457200"/>
-            <a:ext cx="7239000" cy="1295400"/>
+            <a:off x="6986116" y="2828845"/>
+            <a:ext cx="4443884" cy="2657555"/>
           </a:xfrm>
+          <a:prstGeom prst="rect">
+            <a:avLst/>
+          </a:prstGeom>
         </p:spPr>
-        <p:txBody>
-          <a:bodyPr/>
-          <a:lstStyle/>
-          <a:p>
-            <a:r>
-              <a:rPr lang="en-US" dirty="0"/>
-              <a:t>Lab 1: Getting started with Tableau Prep Builder</a:t>
-            </a:r>
-          </a:p>
-        </p:txBody>
-      </p:sp>
+      </p:pic>
+      <p:grpSp>
+        <p:nvGrpSpPr>
+          <p:cNvPr id="8" name="Group 7"/>
+          <p:cNvGrpSpPr/>
+          <p:nvPr/>
+        </p:nvGrpSpPr>
+        <p:grpSpPr>
+          <a:xfrm>
+            <a:off x="6934200" y="342900"/>
+            <a:ext cx="2727176" cy="2819400"/>
+            <a:chOff x="7391400" y="457200"/>
+            <a:chExt cx="3943900" cy="4077269"/>
+          </a:xfrm>
+        </p:grpSpPr>
+        <p:pic>
+          <p:nvPicPr>
+            <p:cNvPr id="4" name="Picture 3"/>
+            <p:cNvPicPr>
+              <a:picLocks noChangeAspect="1"/>
+            </p:cNvPicPr>
+            <p:nvPr/>
+          </p:nvPicPr>
+          <p:blipFill>
+            <a:blip r:embed="rId3"/>
+            <a:stretch>
+              <a:fillRect/>
+            </a:stretch>
+          </p:blipFill>
+          <p:spPr>
+            <a:xfrm>
+              <a:off x="7391400" y="457200"/>
+              <a:ext cx="3943900" cy="4077269"/>
+            </a:xfrm>
+            <a:prstGeom prst="rect">
+              <a:avLst/>
+            </a:prstGeom>
+          </p:spPr>
+        </p:pic>
+        <p:sp>
+          <p:nvSpPr>
+            <p:cNvPr id="5" name="Rectangle 4"/>
+            <p:cNvSpPr/>
+            <p:nvPr/>
+          </p:nvSpPr>
+          <p:spPr>
+            <a:xfrm>
+              <a:off x="9982200" y="3733800"/>
+              <a:ext cx="1143000" cy="228600"/>
+            </a:xfrm>
+            <a:prstGeom prst="rect">
+              <a:avLst/>
+            </a:prstGeom>
+            <a:noFill/>
+            <a:ln>
+              <a:solidFill>
+                <a:srgbClr val="FF0000"/>
+              </a:solidFill>
+            </a:ln>
+          </p:spPr>
+          <p:style>
+            <a:lnRef idx="2">
+              <a:schemeClr val="accent1">
+                <a:shade val="50000"/>
+              </a:schemeClr>
+            </a:lnRef>
+            <a:fillRef idx="1">
+              <a:schemeClr val="accent1"/>
+            </a:fillRef>
+            <a:effectRef idx="0">
+              <a:schemeClr val="accent1"/>
+            </a:effectRef>
+            <a:fontRef idx="minor">
+              <a:schemeClr val="lt1"/>
+            </a:fontRef>
+          </p:style>
+          <p:txBody>
+            <a:bodyPr rtlCol="0" anchor="ctr"/>
+            <a:lstStyle/>
+            <a:p>
+              <a:pPr algn="ctr"/>
+              <a:endParaRPr lang="en-US"/>
+            </a:p>
+          </p:txBody>
+        </p:sp>
+        <p:cxnSp>
+          <p:nvCxnSpPr>
+            <p:cNvPr id="7" name="Straight Arrow Connector 6"/>
+            <p:cNvCxnSpPr/>
+            <p:nvPr/>
+          </p:nvCxnSpPr>
+          <p:spPr>
+            <a:xfrm>
+              <a:off x="8966735" y="3645167"/>
+              <a:ext cx="990600" cy="152400"/>
+            </a:xfrm>
+            <a:prstGeom prst="straightConnector1">
+              <a:avLst/>
+            </a:prstGeom>
+            <a:ln>
+              <a:solidFill>
+                <a:srgbClr val="FF0000"/>
+              </a:solidFill>
+              <a:tailEnd type="triangle"/>
+            </a:ln>
+          </p:spPr>
+          <p:style>
+            <a:lnRef idx="1">
+              <a:schemeClr val="accent1"/>
+            </a:lnRef>
+            <a:fillRef idx="0">
+              <a:schemeClr val="accent1"/>
+            </a:fillRef>
+            <a:effectRef idx="0">
+              <a:schemeClr val="accent1"/>
+            </a:effectRef>
+            <a:fontRef idx="minor">
+              <a:schemeClr val="tx1"/>
+            </a:fontRef>
+          </p:style>
+        </p:cxnSp>
+      </p:grpSp>
     </p:spTree>
     <p:extLst>
       <p:ext uri="{BB962C8B-B14F-4D97-AF65-F5344CB8AC3E}">
-        <p14:creationId xmlns:p14="http://schemas.microsoft.com/office/powerpoint/2010/main" val="390888726"/>
+        <p14:creationId xmlns:p14="http://schemas.microsoft.com/office/powerpoint/2010/main" val="1165513848"/>
       </p:ext>
     </p:extLst>
   </p:cSld>
@@ -5089,48 +5344,40 @@
         </p:nvSpPr>
         <p:spPr/>
         <p:txBody>
-          <a:bodyPr>
-            <a:normAutofit/>
-          </a:bodyPr>
-          <a:lstStyle/>
-          <a:p>
-            <a:r>
-              <a:rPr lang="en-US" dirty="0"/>
-              <a:t>Input and Output</a:t>
-            </a:r>
-          </a:p>
-          <a:p>
+          <a:bodyPr/>
+          <a:lstStyle/>
+          <a:p>
+            <a:r>
+              <a:rPr lang="en-US" dirty="0" smtClean="0"/>
+              <a:t>Working with Tableau Data Extracts</a:t>
+            </a:r>
             <a:endParaRPr lang="en-US" dirty="0"/>
           </a:p>
         </p:txBody>
       </p:sp>
       <p:sp>
         <p:nvSpPr>
-          <p:cNvPr id="4" name="Slide Number Placeholder 3"/>
-          <p:cNvSpPr>
-            <a:spLocks noGrp="1"/>
-          </p:cNvSpPr>
-          <p:nvPr>
-            <p:ph type="sldNum" sz="quarter" idx="4294967295"/>
-          </p:nvPr>
-        </p:nvSpPr>
-        <p:spPr/>
-        <p:txBody>
-          <a:bodyPr/>
-          <a:lstStyle/>
-          <a:p>
-            <a:fld id="{4FAB73BC-B049-4115-A692-8D63A059BFB8}" type="slidenum">
-              <a:rPr lang="en-US" smtClean="0"/>
-              <a:t>20</a:t>
-            </a:fld>
-            <a:endParaRPr lang="en-US" dirty="0"/>
+          <p:cNvPr id="3" name="Text Placeholder 2"/>
+          <p:cNvSpPr>
+            <a:spLocks noGrp="1"/>
+          </p:cNvSpPr>
+          <p:nvPr>
+            <p:ph type="body" sz="quarter" idx="10"/>
+          </p:nvPr>
+        </p:nvSpPr>
+        <p:spPr/>
+        <p:txBody>
+          <a:bodyPr/>
+          <a:lstStyle/>
+          <a:p>
+            <a:endParaRPr lang="en-US"/>
           </a:p>
         </p:txBody>
       </p:sp>
     </p:spTree>
     <p:extLst>
       <p:ext uri="{BB962C8B-B14F-4D97-AF65-F5344CB8AC3E}">
-        <p14:creationId xmlns:p14="http://schemas.microsoft.com/office/powerpoint/2010/main" val="605862206"/>
+        <p14:creationId xmlns:p14="http://schemas.microsoft.com/office/powerpoint/2010/main" val="2251478041"/>
       </p:ext>
     </p:extLst>
   </p:cSld>
@@ -5169,24 +5416,20 @@
         </p:nvSpPr>
         <p:spPr/>
         <p:txBody>
-          <a:bodyPr>
-            <a:normAutofit/>
-          </a:bodyPr>
-          <a:lstStyle/>
-          <a:p>
-            <a:r>
-              <a:rPr lang="en-US" dirty="0"/>
-              <a:t>Connect to Microsoft Excel</a:t>
-            </a:r>
-          </a:p>
-          <a:p>
+          <a:bodyPr/>
+          <a:lstStyle/>
+          <a:p>
+            <a:r>
+              <a:rPr lang="en-US" dirty="0" smtClean="0"/>
+              <a:t>Working with File-Based Data Sources</a:t>
+            </a:r>
             <a:endParaRPr lang="en-US" dirty="0"/>
           </a:p>
         </p:txBody>
       </p:sp>
       <p:sp>
         <p:nvSpPr>
-          <p:cNvPr id="5" name="Text Placeholder 4"/>
+          <p:cNvPr id="3" name="Text Placeholder 2"/>
           <p:cNvSpPr>
             <a:spLocks noGrp="1"/>
           </p:cNvSpPr>
@@ -5200,36 +5443,13 @@
           <a:lstStyle/>
           <a:p>
             <a:endParaRPr lang="en-US"/>
-          </a:p>
-        </p:txBody>
-      </p:sp>
-      <p:sp>
-        <p:nvSpPr>
-          <p:cNvPr id="4" name="Slide Number Placeholder 3"/>
-          <p:cNvSpPr>
-            <a:spLocks noGrp="1"/>
-          </p:cNvSpPr>
-          <p:nvPr>
-            <p:ph type="sldNum" sz="quarter" idx="4294967295"/>
-          </p:nvPr>
-        </p:nvSpPr>
-        <p:spPr/>
-        <p:txBody>
-          <a:bodyPr/>
-          <a:lstStyle/>
-          <a:p>
-            <a:fld id="{4FAB73BC-B049-4115-A692-8D63A059BFB8}" type="slidenum">
-              <a:rPr lang="en-US" smtClean="0"/>
-              <a:t>21</a:t>
-            </a:fld>
-            <a:endParaRPr lang="en-US" dirty="0"/>
           </a:p>
         </p:txBody>
       </p:sp>
     </p:spTree>
     <p:extLst>
       <p:ext uri="{BB962C8B-B14F-4D97-AF65-F5344CB8AC3E}">
-        <p14:creationId xmlns:p14="http://schemas.microsoft.com/office/powerpoint/2010/main" val="908011306"/>
+        <p14:creationId xmlns:p14="http://schemas.microsoft.com/office/powerpoint/2010/main" val="2267059166"/>
       </p:ext>
     </p:extLst>
   </p:cSld>
@@ -5268,24 +5488,20 @@
         </p:nvSpPr>
         <p:spPr/>
         <p:txBody>
-          <a:bodyPr>
-            <a:normAutofit/>
-          </a:bodyPr>
-          <a:lstStyle/>
-          <a:p>
-            <a:r>
-              <a:rPr lang="en-US" dirty="0"/>
-              <a:t>Data Interpreter</a:t>
-            </a:r>
-          </a:p>
-          <a:p>
+          <a:bodyPr/>
+          <a:lstStyle/>
+          <a:p>
+            <a:r>
+              <a:rPr lang="en-US" dirty="0" smtClean="0"/>
+              <a:t>Connecting to Microsoft Access</a:t>
+            </a:r>
             <a:endParaRPr lang="en-US" dirty="0"/>
           </a:p>
         </p:txBody>
       </p:sp>
       <p:sp>
         <p:nvSpPr>
-          <p:cNvPr id="5" name="Text Placeholder 4"/>
+          <p:cNvPr id="3" name="Text Placeholder 2"/>
           <p:cNvSpPr>
             <a:spLocks noGrp="1"/>
           </p:cNvSpPr>
@@ -5299,36 +5515,13 @@
           <a:lstStyle/>
           <a:p>
             <a:endParaRPr lang="en-US"/>
-          </a:p>
-        </p:txBody>
-      </p:sp>
-      <p:sp>
-        <p:nvSpPr>
-          <p:cNvPr id="4" name="Slide Number Placeholder 3"/>
-          <p:cNvSpPr>
-            <a:spLocks noGrp="1"/>
-          </p:cNvSpPr>
-          <p:nvPr>
-            <p:ph type="sldNum" sz="quarter" idx="4294967295"/>
-          </p:nvPr>
-        </p:nvSpPr>
-        <p:spPr/>
-        <p:txBody>
-          <a:bodyPr/>
-          <a:lstStyle/>
-          <a:p>
-            <a:fld id="{4FAB73BC-B049-4115-A692-8D63A059BFB8}" type="slidenum">
-              <a:rPr lang="en-US" smtClean="0"/>
-              <a:t>22</a:t>
-            </a:fld>
-            <a:endParaRPr lang="en-US" dirty="0"/>
           </a:p>
         </p:txBody>
       </p:sp>
     </p:spTree>
     <p:extLst>
       <p:ext uri="{BB962C8B-B14F-4D97-AF65-F5344CB8AC3E}">
-        <p14:creationId xmlns:p14="http://schemas.microsoft.com/office/powerpoint/2010/main" val="1285337620"/>
+        <p14:creationId xmlns:p14="http://schemas.microsoft.com/office/powerpoint/2010/main" val="1215057158"/>
       </p:ext>
     </p:extLst>
   </p:cSld>
@@ -5367,24 +5560,20 @@
         </p:nvSpPr>
         <p:spPr/>
         <p:txBody>
-          <a:bodyPr>
-            <a:normAutofit/>
-          </a:bodyPr>
-          <a:lstStyle/>
-          <a:p>
-            <a:r>
-              <a:rPr lang="en-US" dirty="0"/>
-              <a:t>Configuration Window</a:t>
-            </a:r>
-          </a:p>
-          <a:p>
+          <a:bodyPr/>
+          <a:lstStyle/>
+          <a:p>
+            <a:r>
+              <a:rPr lang="en-US" dirty="0" smtClean="0"/>
+              <a:t>Connecting to Microsoft Excel</a:t>
+            </a:r>
             <a:endParaRPr lang="en-US" dirty="0"/>
           </a:p>
         </p:txBody>
       </p:sp>
       <p:sp>
         <p:nvSpPr>
-          <p:cNvPr id="5" name="Text Placeholder 4"/>
+          <p:cNvPr id="3" name="Text Placeholder 2"/>
           <p:cNvSpPr>
             <a:spLocks noGrp="1"/>
           </p:cNvSpPr>
@@ -5398,36 +5587,13 @@
           <a:lstStyle/>
           <a:p>
             <a:endParaRPr lang="en-US"/>
-          </a:p>
-        </p:txBody>
-      </p:sp>
-      <p:sp>
-        <p:nvSpPr>
-          <p:cNvPr id="4" name="Slide Number Placeholder 3"/>
-          <p:cNvSpPr>
-            <a:spLocks noGrp="1"/>
-          </p:cNvSpPr>
-          <p:nvPr>
-            <p:ph type="sldNum" sz="quarter" idx="4294967295"/>
-          </p:nvPr>
-        </p:nvSpPr>
-        <p:spPr/>
-        <p:txBody>
-          <a:bodyPr/>
-          <a:lstStyle/>
-          <a:p>
-            <a:fld id="{4FAB73BC-B049-4115-A692-8D63A059BFB8}" type="slidenum">
-              <a:rPr lang="en-US" smtClean="0"/>
-              <a:t>23</a:t>
-            </a:fld>
-            <a:endParaRPr lang="en-US" dirty="0"/>
           </a:p>
         </p:txBody>
       </p:sp>
     </p:spTree>
     <p:extLst>
       <p:ext uri="{BB962C8B-B14F-4D97-AF65-F5344CB8AC3E}">
-        <p14:creationId xmlns:p14="http://schemas.microsoft.com/office/powerpoint/2010/main" val="481877264"/>
+        <p14:creationId xmlns:p14="http://schemas.microsoft.com/office/powerpoint/2010/main" val="1885312738"/>
       </p:ext>
     </p:extLst>
   </p:cSld>
@@ -5466,24 +5632,20 @@
         </p:nvSpPr>
         <p:spPr/>
         <p:txBody>
-          <a:bodyPr>
-            <a:normAutofit/>
-          </a:bodyPr>
-          <a:lstStyle/>
-          <a:p>
-            <a:r>
-              <a:rPr lang="en-US" dirty="0"/>
-              <a:t>Data Sampling</a:t>
-            </a:r>
-          </a:p>
-          <a:p>
+          <a:bodyPr/>
+          <a:lstStyle/>
+          <a:p>
+            <a:r>
+              <a:rPr lang="en-US" dirty="0" smtClean="0"/>
+              <a:t>Connecting to PDF Files</a:t>
+            </a:r>
             <a:endParaRPr lang="en-US" dirty="0"/>
           </a:p>
         </p:txBody>
       </p:sp>
       <p:sp>
         <p:nvSpPr>
-          <p:cNvPr id="5" name="Text Placeholder 4"/>
+          <p:cNvPr id="3" name="Text Placeholder 2"/>
           <p:cNvSpPr>
             <a:spLocks noGrp="1"/>
           </p:cNvSpPr>
@@ -5497,36 +5659,13 @@
           <a:lstStyle/>
           <a:p>
             <a:endParaRPr lang="en-US"/>
-          </a:p>
-        </p:txBody>
-      </p:sp>
-      <p:sp>
-        <p:nvSpPr>
-          <p:cNvPr id="4" name="Slide Number Placeholder 3"/>
-          <p:cNvSpPr>
-            <a:spLocks noGrp="1"/>
-          </p:cNvSpPr>
-          <p:nvPr>
-            <p:ph type="sldNum" sz="quarter" idx="4294967295"/>
-          </p:nvPr>
-        </p:nvSpPr>
-        <p:spPr/>
-        <p:txBody>
-          <a:bodyPr/>
-          <a:lstStyle/>
-          <a:p>
-            <a:fld id="{4FAB73BC-B049-4115-A692-8D63A059BFB8}" type="slidenum">
-              <a:rPr lang="en-US" smtClean="0"/>
-              <a:t>24</a:t>
-            </a:fld>
-            <a:endParaRPr lang="en-US" dirty="0"/>
           </a:p>
         </p:txBody>
       </p:sp>
     </p:spTree>
     <p:extLst>
       <p:ext uri="{BB962C8B-B14F-4D97-AF65-F5344CB8AC3E}">
-        <p14:creationId xmlns:p14="http://schemas.microsoft.com/office/powerpoint/2010/main" val="2374453051"/>
+        <p14:creationId xmlns:p14="http://schemas.microsoft.com/office/powerpoint/2010/main" val="88523654"/>
       </p:ext>
     </p:extLst>
   </p:cSld>
@@ -5565,24 +5704,24 @@
         </p:nvSpPr>
         <p:spPr/>
         <p:txBody>
-          <a:bodyPr>
-            <a:normAutofit/>
-          </a:bodyPr>
-          <a:lstStyle/>
-          <a:p>
-            <a:r>
-              <a:rPr lang="en-US" dirty="0"/>
-              <a:t>Connect to Tableau Data Extract File</a:t>
-            </a:r>
-          </a:p>
-          <a:p>
+          <a:bodyPr/>
+          <a:lstStyle/>
+          <a:p>
+            <a:r>
+              <a:rPr lang="en-US" dirty="0" smtClean="0"/>
+              <a:t>Connecting</a:t>
+            </a:r>
+            <a:r>
+              <a:rPr lang="en-US" baseline="0" dirty="0" smtClean="0"/>
+              <a:t> to Text Files</a:t>
+            </a:r>
             <a:endParaRPr lang="en-US" dirty="0"/>
           </a:p>
         </p:txBody>
       </p:sp>
       <p:sp>
         <p:nvSpPr>
-          <p:cNvPr id="5" name="Text Placeholder 4"/>
+          <p:cNvPr id="3" name="Text Placeholder 2"/>
           <p:cNvSpPr>
             <a:spLocks noGrp="1"/>
           </p:cNvSpPr>
@@ -5596,36 +5735,13 @@
           <a:lstStyle/>
           <a:p>
             <a:endParaRPr lang="en-US"/>
-          </a:p>
-        </p:txBody>
-      </p:sp>
-      <p:sp>
-        <p:nvSpPr>
-          <p:cNvPr id="4" name="Slide Number Placeholder 3"/>
-          <p:cNvSpPr>
-            <a:spLocks noGrp="1"/>
-          </p:cNvSpPr>
-          <p:nvPr>
-            <p:ph type="sldNum" sz="quarter" idx="4294967295"/>
-          </p:nvPr>
-        </p:nvSpPr>
-        <p:spPr/>
-        <p:txBody>
-          <a:bodyPr/>
-          <a:lstStyle/>
-          <a:p>
-            <a:fld id="{4FAB73BC-B049-4115-A692-8D63A059BFB8}" type="slidenum">
-              <a:rPr lang="en-US" smtClean="0"/>
-              <a:t>25</a:t>
-            </a:fld>
-            <a:endParaRPr lang="en-US" dirty="0"/>
           </a:p>
         </p:txBody>
       </p:sp>
     </p:spTree>
     <p:extLst>
       <p:ext uri="{BB962C8B-B14F-4D97-AF65-F5344CB8AC3E}">
-        <p14:creationId xmlns:p14="http://schemas.microsoft.com/office/powerpoint/2010/main" val="4195757070"/>
+        <p14:creationId xmlns:p14="http://schemas.microsoft.com/office/powerpoint/2010/main" val="3719378937"/>
       </p:ext>
     </p:extLst>
   </p:cSld>
@@ -5664,24 +5780,20 @@
         </p:nvSpPr>
         <p:spPr/>
         <p:txBody>
-          <a:bodyPr>
-            <a:normAutofit/>
-          </a:bodyPr>
-          <a:lstStyle/>
-          <a:p>
-            <a:r>
-              <a:rPr lang="en-US" dirty="0"/>
-              <a:t>Connect to Text File</a:t>
-            </a:r>
-          </a:p>
-          <a:p>
+          <a:bodyPr/>
+          <a:lstStyle/>
+          <a:p>
+            <a:r>
+              <a:rPr lang="en-US" dirty="0" smtClean="0"/>
+              <a:t>UNION Joins</a:t>
+            </a:r>
             <a:endParaRPr lang="en-US" dirty="0"/>
           </a:p>
         </p:txBody>
       </p:sp>
       <p:sp>
         <p:nvSpPr>
-          <p:cNvPr id="5" name="Text Placeholder 4"/>
+          <p:cNvPr id="3" name="Text Placeholder 2"/>
           <p:cNvSpPr>
             <a:spLocks noGrp="1"/>
           </p:cNvSpPr>
@@ -5695,36 +5807,13 @@
           <a:lstStyle/>
           <a:p>
             <a:endParaRPr lang="en-US"/>
-          </a:p>
-        </p:txBody>
-      </p:sp>
-      <p:sp>
-        <p:nvSpPr>
-          <p:cNvPr id="4" name="Slide Number Placeholder 3"/>
-          <p:cNvSpPr>
-            <a:spLocks noGrp="1"/>
-          </p:cNvSpPr>
-          <p:nvPr>
-            <p:ph type="sldNum" sz="quarter" idx="4294967295"/>
-          </p:nvPr>
-        </p:nvSpPr>
-        <p:spPr/>
-        <p:txBody>
-          <a:bodyPr/>
-          <a:lstStyle/>
-          <a:p>
-            <a:fld id="{4FAB73BC-B049-4115-A692-8D63A059BFB8}" type="slidenum">
-              <a:rPr lang="en-US" smtClean="0"/>
-              <a:t>26</a:t>
-            </a:fld>
-            <a:endParaRPr lang="en-US" dirty="0"/>
           </a:p>
         </p:txBody>
       </p:sp>
     </p:spTree>
     <p:extLst>
       <p:ext uri="{BB962C8B-B14F-4D97-AF65-F5344CB8AC3E}">
-        <p14:creationId xmlns:p14="http://schemas.microsoft.com/office/powerpoint/2010/main" val="3357100315"/>
+        <p14:creationId xmlns:p14="http://schemas.microsoft.com/office/powerpoint/2010/main" val="4266211854"/>
       </p:ext>
     </p:extLst>
   </p:cSld>
@@ -5763,24 +5852,20 @@
         </p:nvSpPr>
         <p:spPr/>
         <p:txBody>
-          <a:bodyPr>
-            <a:normAutofit/>
-          </a:bodyPr>
-          <a:lstStyle/>
-          <a:p>
-            <a:r>
-              <a:rPr lang="en-US" dirty="0"/>
-              <a:t>Other Features</a:t>
-            </a:r>
-          </a:p>
-          <a:p>
+          <a:bodyPr/>
+          <a:lstStyle/>
+          <a:p>
+            <a:r>
+              <a:rPr lang="en-US" dirty="0" smtClean="0"/>
+              <a:t>The Data Preview Pane</a:t>
+            </a:r>
             <a:endParaRPr lang="en-US" dirty="0"/>
           </a:p>
         </p:txBody>
       </p:sp>
       <p:sp>
         <p:nvSpPr>
-          <p:cNvPr id="5" name="Text Placeholder 4"/>
+          <p:cNvPr id="3" name="Text Placeholder 2"/>
           <p:cNvSpPr>
             <a:spLocks noGrp="1"/>
           </p:cNvSpPr>
@@ -5794,36 +5879,13 @@
           <a:lstStyle/>
           <a:p>
             <a:endParaRPr lang="en-US"/>
-          </a:p>
-        </p:txBody>
-      </p:sp>
-      <p:sp>
-        <p:nvSpPr>
-          <p:cNvPr id="4" name="Slide Number Placeholder 3"/>
-          <p:cNvSpPr>
-            <a:spLocks noGrp="1"/>
-          </p:cNvSpPr>
-          <p:nvPr>
-            <p:ph type="sldNum" sz="quarter" idx="4294967295"/>
-          </p:nvPr>
-        </p:nvSpPr>
-        <p:spPr/>
-        <p:txBody>
-          <a:bodyPr/>
-          <a:lstStyle/>
-          <a:p>
-            <a:fld id="{4FAB73BC-B049-4115-A692-8D63A059BFB8}" type="slidenum">
-              <a:rPr lang="en-US" smtClean="0"/>
-              <a:t>27</a:t>
-            </a:fld>
-            <a:endParaRPr lang="en-US" dirty="0"/>
           </a:p>
         </p:txBody>
       </p:sp>
     </p:spTree>
     <p:extLst>
       <p:ext uri="{BB962C8B-B14F-4D97-AF65-F5344CB8AC3E}">
-        <p14:creationId xmlns:p14="http://schemas.microsoft.com/office/powerpoint/2010/main" val="1262942265"/>
+        <p14:creationId xmlns:p14="http://schemas.microsoft.com/office/powerpoint/2010/main" val="1963526926"/>
       </p:ext>
     </p:extLst>
   </p:cSld>
@@ -5852,45 +5914,7 @@
       </p:grpSpPr>
       <p:sp>
         <p:nvSpPr>
-          <p:cNvPr id="2" name="Subtitle 1"/>
-          <p:cNvSpPr>
-            <a:spLocks noGrp="1"/>
-          </p:cNvSpPr>
-          <p:nvPr>
-            <p:ph type="subTitle" idx="1"/>
-          </p:nvPr>
-        </p:nvSpPr>
-        <p:spPr/>
-        <p:txBody>
-          <a:bodyPr/>
-          <a:lstStyle/>
-          <a:p>
-            <a:endParaRPr lang="en-US"/>
-          </a:p>
-        </p:txBody>
-      </p:sp>
-      <p:sp>
-        <p:nvSpPr>
-          <p:cNvPr id="3" name="Text Placeholder 2"/>
-          <p:cNvSpPr>
-            <a:spLocks noGrp="1"/>
-          </p:cNvSpPr>
-          <p:nvPr>
-            <p:ph type="body" sz="quarter" idx="11"/>
-          </p:nvPr>
-        </p:nvSpPr>
-        <p:spPr/>
-        <p:txBody>
-          <a:bodyPr/>
-          <a:lstStyle/>
-          <a:p>
-            <a:endParaRPr lang="en-US"/>
-          </a:p>
-        </p:txBody>
-      </p:sp>
-      <p:sp>
-        <p:nvSpPr>
-          <p:cNvPr id="4" name="Title 3"/>
+          <p:cNvPr id="2" name="Title 1"/>
           <p:cNvSpPr>
             <a:spLocks noGrp="1"/>
           </p:cNvSpPr>
@@ -5900,23 +5924,61 @@
         </p:nvSpPr>
         <p:spPr/>
         <p:txBody>
-          <a:bodyPr/>
-          <a:lstStyle/>
-          <a:p>
-            <a:endParaRPr lang="en-US"/>
+          <a:bodyPr>
+            <a:normAutofit/>
+          </a:bodyPr>
+          <a:lstStyle/>
+          <a:p>
+            <a:r>
+              <a:rPr lang="en-US" dirty="0"/>
+              <a:t>Introduction &amp; Tableau Prep Builder</a:t>
+            </a:r>
+          </a:p>
+          <a:p>
+            <a:endParaRPr lang="en-US" dirty="0"/>
+          </a:p>
+        </p:txBody>
+      </p:sp>
+      <p:sp>
+        <p:nvSpPr>
+          <p:cNvPr id="4" name="Slide Number Placeholder 3"/>
+          <p:cNvSpPr>
+            <a:spLocks noGrp="1"/>
+          </p:cNvSpPr>
+          <p:nvPr>
+            <p:ph type="sldNum" sz="quarter" idx="4294967295"/>
+          </p:nvPr>
+        </p:nvSpPr>
+        <p:spPr/>
+        <p:txBody>
+          <a:bodyPr/>
+          <a:lstStyle/>
+          <a:p>
+            <a:fld id="{4FAB73BC-B049-4115-A692-8D63A059BFB8}" type="slidenum">
+              <a:rPr lang="en-US" smtClean="0"/>
+              <a:t>28</a:t>
+            </a:fld>
+            <a:endParaRPr lang="en-US" dirty="0"/>
           </a:p>
         </p:txBody>
       </p:sp>
     </p:spTree>
     <p:extLst>
       <p:ext uri="{BB962C8B-B14F-4D97-AF65-F5344CB8AC3E}">
-        <p14:creationId xmlns:p14="http://schemas.microsoft.com/office/powerpoint/2010/main" val="2350608883"/>
+        <p14:creationId xmlns:p14="http://schemas.microsoft.com/office/powerpoint/2010/main" val="765774969"/>
       </p:ext>
     </p:extLst>
   </p:cSld>
   <p:clrMapOvr>
     <a:masterClrMapping/>
   </p:clrMapOvr>
+  <p:timing>
+    <p:tnLst>
+      <p:par>
+        <p:cTn id="1" dur="indefinite" restart="never" nodeType="tmRoot"/>
+      </p:par>
+    </p:tnLst>
+  </p:timing>
 </p:sld>
 </file>
 
@@ -5956,11 +6018,30 @@
           <a:p>
             <a:r>
               <a:rPr lang="en-US" dirty="0"/>
-              <a:t>Data Cleaning</a:t>
+              <a:t>Tableau Prep Builder</a:t>
             </a:r>
           </a:p>
           <a:p>
             <a:endParaRPr lang="en-US" dirty="0"/>
+          </a:p>
+        </p:txBody>
+      </p:sp>
+      <p:sp>
+        <p:nvSpPr>
+          <p:cNvPr id="5" name="Text Placeholder 4"/>
+          <p:cNvSpPr>
+            <a:spLocks noGrp="1"/>
+          </p:cNvSpPr>
+          <p:nvPr>
+            <p:ph type="body" sz="quarter" idx="10"/>
+          </p:nvPr>
+        </p:nvSpPr>
+        <p:spPr/>
+        <p:txBody>
+          <a:bodyPr/>
+          <a:lstStyle/>
+          <a:p>
+            <a:endParaRPr lang="en-US"/>
           </a:p>
         </p:txBody>
       </p:sp>
@@ -5987,10 +6068,34 @@
           </a:p>
         </p:txBody>
       </p:sp>
+      <p:pic>
+        <p:nvPicPr>
+          <p:cNvPr id="3" name="Picture 2"/>
+          <p:cNvPicPr>
+            <a:picLocks noChangeAspect="1"/>
+          </p:cNvPicPr>
+          <p:nvPr/>
+        </p:nvPicPr>
+        <p:blipFill>
+          <a:blip r:embed="rId2"/>
+          <a:stretch>
+            <a:fillRect/>
+          </a:stretch>
+        </p:blipFill>
+        <p:spPr>
+          <a:xfrm>
+            <a:off x="6096000" y="474846"/>
+            <a:ext cx="5372850" cy="3181794"/>
+          </a:xfrm>
+          <a:prstGeom prst="rect">
+            <a:avLst/>
+          </a:prstGeom>
+        </p:spPr>
+      </p:pic>
     </p:spTree>
     <p:extLst>
       <p:ext uri="{BB962C8B-B14F-4D97-AF65-F5344CB8AC3E}">
-        <p14:creationId xmlns:p14="http://schemas.microsoft.com/office/powerpoint/2010/main" val="3574167115"/>
+        <p14:creationId xmlns:p14="http://schemas.microsoft.com/office/powerpoint/2010/main" val="3047944977"/>
       </p:ext>
     </p:extLst>
   </p:cSld>
@@ -6146,7 +6251,7 @@
           <a:p>
             <a:r>
               <a:rPr lang="en-US" dirty="0"/>
-              <a:t>Profile Pane: An In-Depth Analysis</a:t>
+              <a:t>Tableau Prep Builder Interface</a:t>
             </a:r>
           </a:p>
           <a:p>
@@ -6199,7 +6304,7 @@
     </p:spTree>
     <p:extLst>
       <p:ext uri="{BB962C8B-B14F-4D97-AF65-F5344CB8AC3E}">
-        <p14:creationId xmlns:p14="http://schemas.microsoft.com/office/powerpoint/2010/main" val="1414652983"/>
+        <p14:creationId xmlns:p14="http://schemas.microsoft.com/office/powerpoint/2010/main" val="368237020"/>
       </p:ext>
     </p:extLst>
   </p:cSld>
@@ -6245,7 +6350,7 @@
           <a:p>
             <a:r>
               <a:rPr lang="en-US" dirty="0"/>
-              <a:t>Functions</a:t>
+              <a:t>Steps in Tableau Prep Builder</a:t>
             </a:r>
           </a:p>
           <a:p>
@@ -6298,7 +6403,7 @@
     </p:spTree>
     <p:extLst>
       <p:ext uri="{BB962C8B-B14F-4D97-AF65-F5344CB8AC3E}">
-        <p14:creationId xmlns:p14="http://schemas.microsoft.com/office/powerpoint/2010/main" val="1219868799"/>
+        <p14:creationId xmlns:p14="http://schemas.microsoft.com/office/powerpoint/2010/main" val="1798720831"/>
       </p:ext>
     </p:extLst>
   </p:cSld>
@@ -6344,8 +6449,11 @@
           <a:p>
             <a:r>
               <a:rPr lang="en-US" dirty="0"/>
-              <a:t>Tracking Changes</a:t>
-            </a:r>
+              <a:t>Features of a Workflow</a:t>
+            </a:r>
+          </a:p>
+          <a:p>
+            <a:endParaRPr lang="en-US" dirty="0"/>
           </a:p>
           <a:p>
             <a:endParaRPr lang="en-US" dirty="0"/>
@@ -6397,7 +6505,7 @@
     </p:spTree>
     <p:extLst>
       <p:ext uri="{BB962C8B-B14F-4D97-AF65-F5344CB8AC3E}">
-        <p14:creationId xmlns:p14="http://schemas.microsoft.com/office/powerpoint/2010/main" val="1777712413"/>
+        <p14:creationId xmlns:p14="http://schemas.microsoft.com/office/powerpoint/2010/main" val="28198983"/>
       </p:ext>
     </p:extLst>
   </p:cSld>
@@ -6426,7 +6534,45 @@
       </p:grpSpPr>
       <p:sp>
         <p:nvSpPr>
-          <p:cNvPr id="2" name="Title 1"/>
+          <p:cNvPr id="13" name="Subtitle 12"/>
+          <p:cNvSpPr>
+            <a:spLocks noGrp="1"/>
+          </p:cNvSpPr>
+          <p:nvPr>
+            <p:ph type="subTitle" idx="1"/>
+          </p:nvPr>
+        </p:nvSpPr>
+        <p:spPr/>
+        <p:txBody>
+          <a:bodyPr/>
+          <a:lstStyle/>
+          <a:p>
+            <a:endParaRPr lang="en-US"/>
+          </a:p>
+        </p:txBody>
+      </p:sp>
+      <p:sp>
+        <p:nvSpPr>
+          <p:cNvPr id="14" name="Text Placeholder 13"/>
+          <p:cNvSpPr>
+            <a:spLocks noGrp="1"/>
+          </p:cNvSpPr>
+          <p:nvPr>
+            <p:ph type="body" sz="quarter" idx="11"/>
+          </p:nvPr>
+        </p:nvSpPr>
+        <p:spPr/>
+        <p:txBody>
+          <a:bodyPr/>
+          <a:lstStyle/>
+          <a:p>
+            <a:endParaRPr lang="en-US"/>
+          </a:p>
+        </p:txBody>
+      </p:sp>
+      <p:sp>
+        <p:nvSpPr>
+          <p:cNvPr id="8" name="Title 7"/>
           <p:cNvSpPr>
             <a:spLocks noGrp="1"/>
           </p:cNvSpPr>
@@ -6434,69 +6580,27 @@
             <p:ph type="title"/>
           </p:nvPr>
         </p:nvSpPr>
-        <p:spPr/>
-        <p:txBody>
-          <a:bodyPr>
-            <a:normAutofit/>
-          </a:bodyPr>
-          <a:lstStyle/>
-          <a:p>
-            <a:r>
-              <a:rPr lang="en-US" dirty="0"/>
-              <a:t>String Calculations</a:t>
-            </a:r>
-          </a:p>
-          <a:p>
-            <a:endParaRPr lang="en-US" dirty="0"/>
-          </a:p>
-        </p:txBody>
-      </p:sp>
-      <p:sp>
-        <p:nvSpPr>
-          <p:cNvPr id="5" name="Text Placeholder 4"/>
-          <p:cNvSpPr>
-            <a:spLocks noGrp="1"/>
-          </p:cNvSpPr>
-          <p:nvPr>
-            <p:ph type="body" sz="quarter" idx="10"/>
-          </p:nvPr>
-        </p:nvSpPr>
-        <p:spPr/>
-        <p:txBody>
-          <a:bodyPr/>
-          <a:lstStyle/>
-          <a:p>
-            <a:endParaRPr lang="en-US"/>
-          </a:p>
-        </p:txBody>
-      </p:sp>
-      <p:sp>
-        <p:nvSpPr>
-          <p:cNvPr id="4" name="Slide Number Placeholder 3"/>
-          <p:cNvSpPr>
-            <a:spLocks noGrp="1"/>
-          </p:cNvSpPr>
-          <p:nvPr>
-            <p:ph type="sldNum" sz="quarter" idx="4294967295"/>
-          </p:nvPr>
-        </p:nvSpPr>
-        <p:spPr/>
-        <p:txBody>
-          <a:bodyPr/>
-          <a:lstStyle/>
-          <a:p>
-            <a:fld id="{4FAB73BC-B049-4115-A692-8D63A059BFB8}" type="slidenum">
-              <a:rPr lang="en-US" smtClean="0"/>
-              <a:t>33</a:t>
-            </a:fld>
-            <a:endParaRPr lang="en-US" dirty="0"/>
+        <p:spPr>
+          <a:xfrm>
+            <a:off x="762000" y="457200"/>
+            <a:ext cx="7239000" cy="1295400"/>
+          </a:xfrm>
+        </p:spPr>
+        <p:txBody>
+          <a:bodyPr/>
+          <a:lstStyle/>
+          <a:p>
+            <a:r>
+              <a:rPr lang="en-US" dirty="0"/>
+              <a:t>Lab 1: Getting started with Tableau Prep Builder</a:t>
+            </a:r>
           </a:p>
         </p:txBody>
       </p:sp>
     </p:spTree>
     <p:extLst>
       <p:ext uri="{BB962C8B-B14F-4D97-AF65-F5344CB8AC3E}">
-        <p14:creationId xmlns:p14="http://schemas.microsoft.com/office/powerpoint/2010/main" val="4039495164"/>
+        <p14:creationId xmlns:p14="http://schemas.microsoft.com/office/powerpoint/2010/main" val="390888726"/>
       </p:ext>
     </p:extLst>
   </p:cSld>
@@ -6525,45 +6629,7 @@
       </p:grpSpPr>
       <p:sp>
         <p:nvSpPr>
-          <p:cNvPr id="5" name="Subtitle 4"/>
-          <p:cNvSpPr>
-            <a:spLocks noGrp="1"/>
-          </p:cNvSpPr>
-          <p:nvPr>
-            <p:ph type="subTitle" idx="1"/>
-          </p:nvPr>
-        </p:nvSpPr>
-        <p:spPr/>
-        <p:txBody>
-          <a:bodyPr/>
-          <a:lstStyle/>
-          <a:p>
-            <a:endParaRPr lang="en-US"/>
-          </a:p>
-        </p:txBody>
-      </p:sp>
-      <p:sp>
-        <p:nvSpPr>
-          <p:cNvPr id="6" name="Text Placeholder 5"/>
-          <p:cNvSpPr>
-            <a:spLocks noGrp="1"/>
-          </p:cNvSpPr>
-          <p:nvPr>
-            <p:ph type="body" sz="quarter" idx="11"/>
-          </p:nvPr>
-        </p:nvSpPr>
-        <p:spPr/>
-        <p:txBody>
-          <a:bodyPr/>
-          <a:lstStyle/>
-          <a:p>
-            <a:endParaRPr lang="en-US"/>
-          </a:p>
-        </p:txBody>
-      </p:sp>
-      <p:sp>
-        <p:nvSpPr>
-          <p:cNvPr id="4" name="Title 3"/>
+          <p:cNvPr id="2" name="Title 1"/>
           <p:cNvSpPr>
             <a:spLocks noGrp="1"/>
           </p:cNvSpPr>
@@ -6573,17 +6639,48 @@
         </p:nvSpPr>
         <p:spPr/>
         <p:txBody>
-          <a:bodyPr/>
-          <a:lstStyle/>
-          <a:p>
-            <a:endParaRPr lang="en-US"/>
+          <a:bodyPr>
+            <a:normAutofit/>
+          </a:bodyPr>
+          <a:lstStyle/>
+          <a:p>
+            <a:r>
+              <a:rPr lang="en-US" dirty="0"/>
+              <a:t>Input and Output</a:t>
+            </a:r>
+          </a:p>
+          <a:p>
+            <a:endParaRPr lang="en-US" dirty="0"/>
+          </a:p>
+        </p:txBody>
+      </p:sp>
+      <p:sp>
+        <p:nvSpPr>
+          <p:cNvPr id="4" name="Slide Number Placeholder 3"/>
+          <p:cNvSpPr>
+            <a:spLocks noGrp="1"/>
+          </p:cNvSpPr>
+          <p:nvPr>
+            <p:ph type="sldNum" sz="quarter" idx="4294967295"/>
+          </p:nvPr>
+        </p:nvSpPr>
+        <p:spPr/>
+        <p:txBody>
+          <a:bodyPr/>
+          <a:lstStyle/>
+          <a:p>
+            <a:fld id="{4FAB73BC-B049-4115-A692-8D63A059BFB8}" type="slidenum">
+              <a:rPr lang="en-US" smtClean="0"/>
+              <a:t>34</a:t>
+            </a:fld>
+            <a:endParaRPr lang="en-US" dirty="0"/>
           </a:p>
         </p:txBody>
       </p:sp>
     </p:spTree>
     <p:extLst>
       <p:ext uri="{BB962C8B-B14F-4D97-AF65-F5344CB8AC3E}">
-        <p14:creationId xmlns:p14="http://schemas.microsoft.com/office/powerpoint/2010/main" val="4078939970"/>
+        <p14:creationId xmlns:p14="http://schemas.microsoft.com/office/powerpoint/2010/main" val="605862206"/>
       </p:ext>
     </p:extLst>
   </p:cSld>
@@ -6629,11 +6726,30 @@
           <a:p>
             <a:r>
               <a:rPr lang="en-US" dirty="0"/>
-              <a:t>Group and Replace</a:t>
+              <a:t>Connect to Microsoft Excel</a:t>
             </a:r>
           </a:p>
           <a:p>
             <a:endParaRPr lang="en-US" dirty="0"/>
+          </a:p>
+        </p:txBody>
+      </p:sp>
+      <p:sp>
+        <p:nvSpPr>
+          <p:cNvPr id="5" name="Text Placeholder 4"/>
+          <p:cNvSpPr>
+            <a:spLocks noGrp="1"/>
+          </p:cNvSpPr>
+          <p:nvPr>
+            <p:ph type="body" sz="quarter" idx="10"/>
+          </p:nvPr>
+        </p:nvSpPr>
+        <p:spPr/>
+        <p:txBody>
+          <a:bodyPr/>
+          <a:lstStyle/>
+          <a:p>
+            <a:endParaRPr lang="en-US"/>
           </a:p>
         </p:txBody>
       </p:sp>
@@ -6663,7 +6779,7 @@
     </p:spTree>
     <p:extLst>
       <p:ext uri="{BB962C8B-B14F-4D97-AF65-F5344CB8AC3E}">
-        <p14:creationId xmlns:p14="http://schemas.microsoft.com/office/powerpoint/2010/main" val="3690503997"/>
+        <p14:creationId xmlns:p14="http://schemas.microsoft.com/office/powerpoint/2010/main" val="908011306"/>
       </p:ext>
     </p:extLst>
   </p:cSld>
@@ -6702,12 +6818,14 @@
         </p:nvSpPr>
         <p:spPr/>
         <p:txBody>
-          <a:bodyPr/>
-          <a:lstStyle/>
-          <a:p>
-            <a:r>
-              <a:rPr lang="en-US"/>
-              <a:t>Automatic Group and Replace Functions</a:t>
+          <a:bodyPr>
+            <a:normAutofit/>
+          </a:bodyPr>
+          <a:lstStyle/>
+          <a:p>
+            <a:r>
+              <a:rPr lang="en-US" dirty="0"/>
+              <a:t>Data Interpreter</a:t>
             </a:r>
           </a:p>
           <a:p>
@@ -6717,7 +6835,7 @@
       </p:sp>
       <p:sp>
         <p:nvSpPr>
-          <p:cNvPr id="8" name="Text Placeholder 7"/>
+          <p:cNvPr id="5" name="Text Placeholder 4"/>
           <p:cNvSpPr>
             <a:spLocks noGrp="1"/>
           </p:cNvSpPr>
@@ -6751,7 +6869,6 @@
           <a:p>
             <a:fld id="{4FAB73BC-B049-4115-A692-8D63A059BFB8}" type="slidenum">
               <a:rPr lang="en-US" smtClean="0"/>
-              <a:pPr/>
               <a:t>36</a:t>
             </a:fld>
             <a:endParaRPr lang="en-US" dirty="0"/>
@@ -6761,7 +6878,7 @@
     </p:spTree>
     <p:extLst>
       <p:ext uri="{BB962C8B-B14F-4D97-AF65-F5344CB8AC3E}">
-        <p14:creationId xmlns:p14="http://schemas.microsoft.com/office/powerpoint/2010/main" val="2414697677"/>
+        <p14:creationId xmlns:p14="http://schemas.microsoft.com/office/powerpoint/2010/main" val="1285337620"/>
       </p:ext>
     </p:extLst>
   </p:cSld>
@@ -6800,12 +6917,14 @@
         </p:nvSpPr>
         <p:spPr/>
         <p:txBody>
-          <a:bodyPr/>
-          <a:lstStyle/>
-          <a:p>
-            <a:r>
-              <a:rPr lang="en-US"/>
-              <a:t>Manual Grouping</a:t>
+          <a:bodyPr>
+            <a:normAutofit/>
+          </a:bodyPr>
+          <a:lstStyle/>
+          <a:p>
+            <a:r>
+              <a:rPr lang="en-US" dirty="0"/>
+              <a:t>Configuration Window</a:t>
             </a:r>
           </a:p>
           <a:p>
@@ -6815,7 +6934,7 @@
       </p:sp>
       <p:sp>
         <p:nvSpPr>
-          <p:cNvPr id="8" name="Text Placeholder 7"/>
+          <p:cNvPr id="5" name="Text Placeholder 4"/>
           <p:cNvSpPr>
             <a:spLocks noGrp="1"/>
           </p:cNvSpPr>
@@ -6849,7 +6968,6 @@
           <a:p>
             <a:fld id="{4FAB73BC-B049-4115-A692-8D63A059BFB8}" type="slidenum">
               <a:rPr lang="en-US" smtClean="0"/>
-              <a:pPr/>
               <a:t>37</a:t>
             </a:fld>
             <a:endParaRPr lang="en-US" dirty="0"/>
@@ -6859,7 +6977,7 @@
     </p:spTree>
     <p:extLst>
       <p:ext uri="{BB962C8B-B14F-4D97-AF65-F5344CB8AC3E}">
-        <p14:creationId xmlns:p14="http://schemas.microsoft.com/office/powerpoint/2010/main" val="2177486930"/>
+        <p14:creationId xmlns:p14="http://schemas.microsoft.com/office/powerpoint/2010/main" val="481877264"/>
       </p:ext>
     </p:extLst>
   </p:cSld>
@@ -6898,12 +7016,14 @@
         </p:nvSpPr>
         <p:spPr/>
         <p:txBody>
-          <a:bodyPr/>
-          <a:lstStyle/>
-          <a:p>
-            <a:r>
-              <a:rPr lang="en-US"/>
-              <a:t>Examples</a:t>
+          <a:bodyPr>
+            <a:normAutofit/>
+          </a:bodyPr>
+          <a:lstStyle/>
+          <a:p>
+            <a:r>
+              <a:rPr lang="en-US" dirty="0"/>
+              <a:t>Data Sampling</a:t>
             </a:r>
           </a:p>
           <a:p>
@@ -6913,7 +7033,7 @@
       </p:sp>
       <p:sp>
         <p:nvSpPr>
-          <p:cNvPr id="8" name="Text Placeholder 7"/>
+          <p:cNvPr id="5" name="Text Placeholder 4"/>
           <p:cNvSpPr>
             <a:spLocks noGrp="1"/>
           </p:cNvSpPr>
@@ -6947,7 +7067,6 @@
           <a:p>
             <a:fld id="{4FAB73BC-B049-4115-A692-8D63A059BFB8}" type="slidenum">
               <a:rPr lang="en-US" smtClean="0"/>
-              <a:pPr/>
               <a:t>38</a:t>
             </a:fld>
             <a:endParaRPr lang="en-US" dirty="0"/>
@@ -6957,7 +7076,7 @@
     </p:spTree>
     <p:extLst>
       <p:ext uri="{BB962C8B-B14F-4D97-AF65-F5344CB8AC3E}">
-        <p14:creationId xmlns:p14="http://schemas.microsoft.com/office/powerpoint/2010/main" val="3724569971"/>
+        <p14:creationId xmlns:p14="http://schemas.microsoft.com/office/powerpoint/2010/main" val="2374453051"/>
       </p:ext>
     </p:extLst>
   </p:cSld>
@@ -6986,12 +7105,39 @@
       </p:grpSpPr>
       <p:sp>
         <p:nvSpPr>
-          <p:cNvPr id="2" name="Subtitle 1"/>
-          <p:cNvSpPr>
-            <a:spLocks noGrp="1"/>
-          </p:cNvSpPr>
-          <p:nvPr>
-            <p:ph type="subTitle" idx="1"/>
+          <p:cNvPr id="2" name="Title 1"/>
+          <p:cNvSpPr>
+            <a:spLocks noGrp="1"/>
+          </p:cNvSpPr>
+          <p:nvPr>
+            <p:ph type="title"/>
+          </p:nvPr>
+        </p:nvSpPr>
+        <p:spPr/>
+        <p:txBody>
+          <a:bodyPr>
+            <a:normAutofit/>
+          </a:bodyPr>
+          <a:lstStyle/>
+          <a:p>
+            <a:r>
+              <a:rPr lang="en-US" dirty="0"/>
+              <a:t>Connect to Tableau Data Extract File</a:t>
+            </a:r>
+          </a:p>
+          <a:p>
+            <a:endParaRPr lang="en-US" dirty="0"/>
+          </a:p>
+        </p:txBody>
+      </p:sp>
+      <p:sp>
+        <p:nvSpPr>
+          <p:cNvPr id="5" name="Text Placeholder 4"/>
+          <p:cNvSpPr>
+            <a:spLocks noGrp="1"/>
+          </p:cNvSpPr>
+          <p:nvPr>
+            <p:ph type="body" sz="quarter" idx="10"/>
           </p:nvPr>
         </p:nvSpPr>
         <p:spPr/>
@@ -7005,46 +7151,31 @@
       </p:sp>
       <p:sp>
         <p:nvSpPr>
-          <p:cNvPr id="3" name="Text Placeholder 2"/>
-          <p:cNvSpPr>
-            <a:spLocks noGrp="1"/>
-          </p:cNvSpPr>
-          <p:nvPr>
-            <p:ph type="body" sz="quarter" idx="11"/>
-          </p:nvPr>
-        </p:nvSpPr>
-        <p:spPr/>
-        <p:txBody>
-          <a:bodyPr/>
-          <a:lstStyle/>
-          <a:p>
-            <a:endParaRPr lang="en-US"/>
-          </a:p>
-        </p:txBody>
-      </p:sp>
-      <p:sp>
-        <p:nvSpPr>
-          <p:cNvPr id="4" name="Title 3"/>
-          <p:cNvSpPr>
-            <a:spLocks noGrp="1"/>
-          </p:cNvSpPr>
-          <p:nvPr>
-            <p:ph type="title"/>
-          </p:nvPr>
-        </p:nvSpPr>
-        <p:spPr/>
-        <p:txBody>
-          <a:bodyPr/>
-          <a:lstStyle/>
-          <a:p>
-            <a:endParaRPr lang="en-US"/>
+          <p:cNvPr id="4" name="Slide Number Placeholder 3"/>
+          <p:cNvSpPr>
+            <a:spLocks noGrp="1"/>
+          </p:cNvSpPr>
+          <p:nvPr>
+            <p:ph type="sldNum" sz="quarter" idx="4294967295"/>
+          </p:nvPr>
+        </p:nvSpPr>
+        <p:spPr/>
+        <p:txBody>
+          <a:bodyPr/>
+          <a:lstStyle/>
+          <a:p>
+            <a:fld id="{4FAB73BC-B049-4115-A692-8D63A059BFB8}" type="slidenum">
+              <a:rPr lang="en-US" smtClean="0"/>
+              <a:t>39</a:t>
+            </a:fld>
+            <a:endParaRPr lang="en-US" dirty="0"/>
           </a:p>
         </p:txBody>
       </p:sp>
     </p:spTree>
     <p:extLst>
       <p:ext uri="{BB962C8B-B14F-4D97-AF65-F5344CB8AC3E}">
-        <p14:creationId xmlns:p14="http://schemas.microsoft.com/office/powerpoint/2010/main" val="1648934747"/>
+        <p14:creationId xmlns:p14="http://schemas.microsoft.com/office/powerpoint/2010/main" val="4195757070"/>
       </p:ext>
     </p:extLst>
   </p:cSld>
@@ -7636,11 +7767,30 @@
           <a:p>
             <a:r>
               <a:rPr lang="en-US" dirty="0"/>
-              <a:t>Aggregation and Pivot</a:t>
+              <a:t>Connect to Text File</a:t>
             </a:r>
           </a:p>
           <a:p>
             <a:endParaRPr lang="en-US" dirty="0"/>
+          </a:p>
+        </p:txBody>
+      </p:sp>
+      <p:sp>
+        <p:nvSpPr>
+          <p:cNvPr id="5" name="Text Placeholder 4"/>
+          <p:cNvSpPr>
+            <a:spLocks noGrp="1"/>
+          </p:cNvSpPr>
+          <p:nvPr>
+            <p:ph type="body" sz="quarter" idx="10"/>
+          </p:nvPr>
+        </p:nvSpPr>
+        <p:spPr/>
+        <p:txBody>
+          <a:bodyPr/>
+          <a:lstStyle/>
+          <a:p>
+            <a:endParaRPr lang="en-US"/>
           </a:p>
         </p:txBody>
       </p:sp>
@@ -7670,7 +7820,7 @@
     </p:spTree>
     <p:extLst>
       <p:ext uri="{BB962C8B-B14F-4D97-AF65-F5344CB8AC3E}">
-        <p14:creationId xmlns:p14="http://schemas.microsoft.com/office/powerpoint/2010/main" val="1958751481"/>
+        <p14:creationId xmlns:p14="http://schemas.microsoft.com/office/powerpoint/2010/main" val="3357100315"/>
       </p:ext>
     </p:extLst>
   </p:cSld>
@@ -7716,7 +7866,7 @@
           <a:p>
             <a:r>
               <a:rPr lang="en-US" dirty="0"/>
-              <a:t>Aggregations</a:t>
+              <a:t>Other Features</a:t>
             </a:r>
           </a:p>
           <a:p>
@@ -7769,7 +7919,7 @@
     </p:spTree>
     <p:extLst>
       <p:ext uri="{BB962C8B-B14F-4D97-AF65-F5344CB8AC3E}">
-        <p14:creationId xmlns:p14="http://schemas.microsoft.com/office/powerpoint/2010/main" val="2391791631"/>
+        <p14:creationId xmlns:p14="http://schemas.microsoft.com/office/powerpoint/2010/main" val="1262942265"/>
       </p:ext>
     </p:extLst>
   </p:cSld>
@@ -7798,7 +7948,45 @@
       </p:grpSpPr>
       <p:sp>
         <p:nvSpPr>
-          <p:cNvPr id="2" name="Title 1"/>
+          <p:cNvPr id="2" name="Subtitle 1"/>
+          <p:cNvSpPr>
+            <a:spLocks noGrp="1"/>
+          </p:cNvSpPr>
+          <p:nvPr>
+            <p:ph type="subTitle" idx="1"/>
+          </p:nvPr>
+        </p:nvSpPr>
+        <p:spPr/>
+        <p:txBody>
+          <a:bodyPr/>
+          <a:lstStyle/>
+          <a:p>
+            <a:endParaRPr lang="en-US"/>
+          </a:p>
+        </p:txBody>
+      </p:sp>
+      <p:sp>
+        <p:nvSpPr>
+          <p:cNvPr id="3" name="Text Placeholder 2"/>
+          <p:cNvSpPr>
+            <a:spLocks noGrp="1"/>
+          </p:cNvSpPr>
+          <p:nvPr>
+            <p:ph type="body" sz="quarter" idx="11"/>
+          </p:nvPr>
+        </p:nvSpPr>
+        <p:spPr/>
+        <p:txBody>
+          <a:bodyPr/>
+          <a:lstStyle/>
+          <a:p>
+            <a:endParaRPr lang="en-US"/>
+          </a:p>
+        </p:txBody>
+      </p:sp>
+      <p:sp>
+        <p:nvSpPr>
+          <p:cNvPr id="4" name="Title 3"/>
           <p:cNvSpPr>
             <a:spLocks noGrp="1"/>
           </p:cNvSpPr>
@@ -7808,67 +7996,17 @@
         </p:nvSpPr>
         <p:spPr/>
         <p:txBody>
-          <a:bodyPr>
-            <a:normAutofit/>
-          </a:bodyPr>
-          <a:lstStyle/>
-          <a:p>
-            <a:r>
-              <a:rPr lang="en-US" dirty="0"/>
-              <a:t>Aggregation Functions</a:t>
-            </a:r>
-          </a:p>
-          <a:p>
-            <a:endParaRPr lang="en-US" dirty="0"/>
-          </a:p>
-        </p:txBody>
-      </p:sp>
-      <p:sp>
-        <p:nvSpPr>
-          <p:cNvPr id="5" name="Text Placeholder 4"/>
-          <p:cNvSpPr>
-            <a:spLocks noGrp="1"/>
-          </p:cNvSpPr>
-          <p:nvPr>
-            <p:ph type="body" sz="quarter" idx="10"/>
-          </p:nvPr>
-        </p:nvSpPr>
-        <p:spPr/>
-        <p:txBody>
           <a:bodyPr/>
           <a:lstStyle/>
           <a:p>
             <a:endParaRPr lang="en-US"/>
-          </a:p>
-        </p:txBody>
-      </p:sp>
-      <p:sp>
-        <p:nvSpPr>
-          <p:cNvPr id="4" name="Slide Number Placeholder 3"/>
-          <p:cNvSpPr>
-            <a:spLocks noGrp="1"/>
-          </p:cNvSpPr>
-          <p:nvPr>
-            <p:ph type="sldNum" sz="quarter" idx="4294967295"/>
-          </p:nvPr>
-        </p:nvSpPr>
-        <p:spPr/>
-        <p:txBody>
-          <a:bodyPr/>
-          <a:lstStyle/>
-          <a:p>
-            <a:fld id="{4FAB73BC-B049-4115-A692-8D63A059BFB8}" type="slidenum">
-              <a:rPr lang="en-US" smtClean="0"/>
-              <a:t>42</a:t>
-            </a:fld>
-            <a:endParaRPr lang="en-US" dirty="0"/>
           </a:p>
         </p:txBody>
       </p:sp>
     </p:spTree>
     <p:extLst>
       <p:ext uri="{BB962C8B-B14F-4D97-AF65-F5344CB8AC3E}">
-        <p14:creationId xmlns:p14="http://schemas.microsoft.com/office/powerpoint/2010/main" val="23337854"/>
+        <p14:creationId xmlns:p14="http://schemas.microsoft.com/office/powerpoint/2010/main" val="2350608883"/>
       </p:ext>
     </p:extLst>
   </p:cSld>
@@ -7914,30 +8052,11 @@
           <a:p>
             <a:r>
               <a:rPr lang="en-US" dirty="0"/>
-              <a:t>Group By</a:t>
+              <a:t>Data Cleaning</a:t>
             </a:r>
           </a:p>
           <a:p>
             <a:endParaRPr lang="en-US" dirty="0"/>
-          </a:p>
-        </p:txBody>
-      </p:sp>
-      <p:sp>
-        <p:nvSpPr>
-          <p:cNvPr id="5" name="Text Placeholder 4"/>
-          <p:cNvSpPr>
-            <a:spLocks noGrp="1"/>
-          </p:cNvSpPr>
-          <p:nvPr>
-            <p:ph type="body" sz="quarter" idx="10"/>
-          </p:nvPr>
-        </p:nvSpPr>
-        <p:spPr/>
-        <p:txBody>
-          <a:bodyPr/>
-          <a:lstStyle/>
-          <a:p>
-            <a:endParaRPr lang="en-US"/>
           </a:p>
         </p:txBody>
       </p:sp>
@@ -7967,7 +8086,7 @@
     </p:spTree>
     <p:extLst>
       <p:ext uri="{BB962C8B-B14F-4D97-AF65-F5344CB8AC3E}">
-        <p14:creationId xmlns:p14="http://schemas.microsoft.com/office/powerpoint/2010/main" val="1951688755"/>
+        <p14:creationId xmlns:p14="http://schemas.microsoft.com/office/powerpoint/2010/main" val="3574167115"/>
       </p:ext>
     </p:extLst>
   </p:cSld>
@@ -8013,7 +8132,7 @@
           <a:p>
             <a:r>
               <a:rPr lang="en-US" dirty="0"/>
-              <a:t>Examples</a:t>
+              <a:t>Profile Pane: An In-Depth Analysis</a:t>
             </a:r>
           </a:p>
           <a:p>
@@ -8066,7 +8185,7 @@
     </p:spTree>
     <p:extLst>
       <p:ext uri="{BB962C8B-B14F-4D97-AF65-F5344CB8AC3E}">
-        <p14:creationId xmlns:p14="http://schemas.microsoft.com/office/powerpoint/2010/main" val="2788349869"/>
+        <p14:creationId xmlns:p14="http://schemas.microsoft.com/office/powerpoint/2010/main" val="1414652983"/>
       </p:ext>
     </p:extLst>
   </p:cSld>
@@ -8112,7 +8231,7 @@
           <a:p>
             <a:r>
               <a:rPr lang="en-US" dirty="0"/>
-              <a:t>Pivot</a:t>
+              <a:t>Functions</a:t>
             </a:r>
           </a:p>
           <a:p>
@@ -8165,7 +8284,7 @@
     </p:spTree>
     <p:extLst>
       <p:ext uri="{BB962C8B-B14F-4D97-AF65-F5344CB8AC3E}">
-        <p14:creationId xmlns:p14="http://schemas.microsoft.com/office/powerpoint/2010/main" val="3940517650"/>
+        <p14:creationId xmlns:p14="http://schemas.microsoft.com/office/powerpoint/2010/main" val="1219868799"/>
       </p:ext>
     </p:extLst>
   </p:cSld>
@@ -8194,12 +8313,39 @@
       </p:grpSpPr>
       <p:sp>
         <p:nvSpPr>
-          <p:cNvPr id="2" name="Subtitle 1"/>
-          <p:cNvSpPr>
-            <a:spLocks noGrp="1"/>
-          </p:cNvSpPr>
-          <p:nvPr>
-            <p:ph type="subTitle" idx="1"/>
+          <p:cNvPr id="2" name="Title 1"/>
+          <p:cNvSpPr>
+            <a:spLocks noGrp="1"/>
+          </p:cNvSpPr>
+          <p:nvPr>
+            <p:ph type="title"/>
+          </p:nvPr>
+        </p:nvSpPr>
+        <p:spPr/>
+        <p:txBody>
+          <a:bodyPr>
+            <a:normAutofit/>
+          </a:bodyPr>
+          <a:lstStyle/>
+          <a:p>
+            <a:r>
+              <a:rPr lang="en-US" dirty="0"/>
+              <a:t>Tracking Changes</a:t>
+            </a:r>
+          </a:p>
+          <a:p>
+            <a:endParaRPr lang="en-US" dirty="0"/>
+          </a:p>
+        </p:txBody>
+      </p:sp>
+      <p:sp>
+        <p:nvSpPr>
+          <p:cNvPr id="5" name="Text Placeholder 4"/>
+          <p:cNvSpPr>
+            <a:spLocks noGrp="1"/>
+          </p:cNvSpPr>
+          <p:nvPr>
+            <p:ph type="body" sz="quarter" idx="10"/>
           </p:nvPr>
         </p:nvSpPr>
         <p:spPr/>
@@ -8213,46 +8359,31 @@
       </p:sp>
       <p:sp>
         <p:nvSpPr>
-          <p:cNvPr id="3" name="Text Placeholder 2"/>
-          <p:cNvSpPr>
-            <a:spLocks noGrp="1"/>
-          </p:cNvSpPr>
-          <p:nvPr>
-            <p:ph type="body" sz="quarter" idx="11"/>
-          </p:nvPr>
-        </p:nvSpPr>
-        <p:spPr/>
-        <p:txBody>
-          <a:bodyPr/>
-          <a:lstStyle/>
-          <a:p>
-            <a:endParaRPr lang="en-US"/>
-          </a:p>
-        </p:txBody>
-      </p:sp>
-      <p:sp>
-        <p:nvSpPr>
-          <p:cNvPr id="4" name="Title 3"/>
-          <p:cNvSpPr>
-            <a:spLocks noGrp="1"/>
-          </p:cNvSpPr>
-          <p:nvPr>
-            <p:ph type="title"/>
-          </p:nvPr>
-        </p:nvSpPr>
-        <p:spPr/>
-        <p:txBody>
-          <a:bodyPr/>
-          <a:lstStyle/>
-          <a:p>
-            <a:endParaRPr lang="en-US"/>
+          <p:cNvPr id="4" name="Slide Number Placeholder 3"/>
+          <p:cNvSpPr>
+            <a:spLocks noGrp="1"/>
+          </p:cNvSpPr>
+          <p:nvPr>
+            <p:ph type="sldNum" sz="quarter" idx="4294967295"/>
+          </p:nvPr>
+        </p:nvSpPr>
+        <p:spPr/>
+        <p:txBody>
+          <a:bodyPr/>
+          <a:lstStyle/>
+          <a:p>
+            <a:fld id="{4FAB73BC-B049-4115-A692-8D63A059BFB8}" type="slidenum">
+              <a:rPr lang="en-US" smtClean="0"/>
+              <a:t>46</a:t>
+            </a:fld>
+            <a:endParaRPr lang="en-US" dirty="0"/>
           </a:p>
         </p:txBody>
       </p:sp>
     </p:spTree>
     <p:extLst>
       <p:ext uri="{BB962C8B-B14F-4D97-AF65-F5344CB8AC3E}">
-        <p14:creationId xmlns:p14="http://schemas.microsoft.com/office/powerpoint/2010/main" val="2143564651"/>
+        <p14:creationId xmlns:p14="http://schemas.microsoft.com/office/powerpoint/2010/main" val="1777712413"/>
       </p:ext>
     </p:extLst>
   </p:cSld>
@@ -8298,11 +8429,30 @@
           <a:p>
             <a:r>
               <a:rPr lang="en-US" dirty="0"/>
-              <a:t>Joins and Unions</a:t>
+              <a:t>String Calculations</a:t>
             </a:r>
           </a:p>
           <a:p>
             <a:endParaRPr lang="en-US" dirty="0"/>
+          </a:p>
+        </p:txBody>
+      </p:sp>
+      <p:sp>
+        <p:nvSpPr>
+          <p:cNvPr id="5" name="Text Placeholder 4"/>
+          <p:cNvSpPr>
+            <a:spLocks noGrp="1"/>
+          </p:cNvSpPr>
+          <p:nvPr>
+            <p:ph type="body" sz="quarter" idx="10"/>
+          </p:nvPr>
+        </p:nvSpPr>
+        <p:spPr/>
+        <p:txBody>
+          <a:bodyPr/>
+          <a:lstStyle/>
+          <a:p>
+            <a:endParaRPr lang="en-US"/>
           </a:p>
         </p:txBody>
       </p:sp>
@@ -8332,7 +8482,7 @@
     </p:spTree>
     <p:extLst>
       <p:ext uri="{BB962C8B-B14F-4D97-AF65-F5344CB8AC3E}">
-        <p14:creationId xmlns:p14="http://schemas.microsoft.com/office/powerpoint/2010/main" val="1240370214"/>
+        <p14:creationId xmlns:p14="http://schemas.microsoft.com/office/powerpoint/2010/main" val="4039495164"/>
       </p:ext>
     </p:extLst>
   </p:cSld>
@@ -8361,7 +8511,45 @@
       </p:grpSpPr>
       <p:sp>
         <p:nvSpPr>
-          <p:cNvPr id="2" name="Title 1"/>
+          <p:cNvPr id="5" name="Subtitle 4"/>
+          <p:cNvSpPr>
+            <a:spLocks noGrp="1"/>
+          </p:cNvSpPr>
+          <p:nvPr>
+            <p:ph type="subTitle" idx="1"/>
+          </p:nvPr>
+        </p:nvSpPr>
+        <p:spPr/>
+        <p:txBody>
+          <a:bodyPr/>
+          <a:lstStyle/>
+          <a:p>
+            <a:endParaRPr lang="en-US"/>
+          </a:p>
+        </p:txBody>
+      </p:sp>
+      <p:sp>
+        <p:nvSpPr>
+          <p:cNvPr id="6" name="Text Placeholder 5"/>
+          <p:cNvSpPr>
+            <a:spLocks noGrp="1"/>
+          </p:cNvSpPr>
+          <p:nvPr>
+            <p:ph type="body" sz="quarter" idx="11"/>
+          </p:nvPr>
+        </p:nvSpPr>
+        <p:spPr/>
+        <p:txBody>
+          <a:bodyPr/>
+          <a:lstStyle/>
+          <a:p>
+            <a:endParaRPr lang="en-US"/>
+          </a:p>
+        </p:txBody>
+      </p:sp>
+      <p:sp>
+        <p:nvSpPr>
+          <p:cNvPr id="4" name="Title 3"/>
           <p:cNvSpPr>
             <a:spLocks noGrp="1"/>
           </p:cNvSpPr>
@@ -8371,67 +8559,17 @@
         </p:nvSpPr>
         <p:spPr/>
         <p:txBody>
-          <a:bodyPr>
-            <a:normAutofit/>
-          </a:bodyPr>
-          <a:lstStyle/>
-          <a:p>
-            <a:r>
-              <a:rPr lang="en-US" dirty="0"/>
-              <a:t>Join</a:t>
-            </a:r>
-          </a:p>
-          <a:p>
-            <a:endParaRPr lang="en-US" dirty="0"/>
-          </a:p>
-        </p:txBody>
-      </p:sp>
-      <p:sp>
-        <p:nvSpPr>
-          <p:cNvPr id="5" name="Text Placeholder 4"/>
-          <p:cNvSpPr>
-            <a:spLocks noGrp="1"/>
-          </p:cNvSpPr>
-          <p:nvPr>
-            <p:ph type="body" sz="quarter" idx="10"/>
-          </p:nvPr>
-        </p:nvSpPr>
-        <p:spPr/>
-        <p:txBody>
           <a:bodyPr/>
           <a:lstStyle/>
           <a:p>
             <a:endParaRPr lang="en-US"/>
-          </a:p>
-        </p:txBody>
-      </p:sp>
-      <p:sp>
-        <p:nvSpPr>
-          <p:cNvPr id="4" name="Slide Number Placeholder 3"/>
-          <p:cNvSpPr>
-            <a:spLocks noGrp="1"/>
-          </p:cNvSpPr>
-          <p:nvPr>
-            <p:ph type="sldNum" sz="quarter" idx="4294967295"/>
-          </p:nvPr>
-        </p:nvSpPr>
-        <p:spPr/>
-        <p:txBody>
-          <a:bodyPr/>
-          <a:lstStyle/>
-          <a:p>
-            <a:fld id="{4FAB73BC-B049-4115-A692-8D63A059BFB8}" type="slidenum">
-              <a:rPr lang="en-US" smtClean="0"/>
-              <a:t>48</a:t>
-            </a:fld>
-            <a:endParaRPr lang="en-US" dirty="0"/>
           </a:p>
         </p:txBody>
       </p:sp>
     </p:spTree>
     <p:extLst>
       <p:ext uri="{BB962C8B-B14F-4D97-AF65-F5344CB8AC3E}">
-        <p14:creationId xmlns:p14="http://schemas.microsoft.com/office/powerpoint/2010/main" val="2599561476"/>
+        <p14:creationId xmlns:p14="http://schemas.microsoft.com/office/powerpoint/2010/main" val="4078939970"/>
       </p:ext>
     </p:extLst>
   </p:cSld>
@@ -8477,30 +8615,11 @@
           <a:p>
             <a:r>
               <a:rPr lang="en-US" dirty="0"/>
-              <a:t>Types of Joins</a:t>
+              <a:t>Group and Replace</a:t>
             </a:r>
           </a:p>
           <a:p>
             <a:endParaRPr lang="en-US" dirty="0"/>
-          </a:p>
-        </p:txBody>
-      </p:sp>
-      <p:sp>
-        <p:nvSpPr>
-          <p:cNvPr id="5" name="Text Placeholder 4"/>
-          <p:cNvSpPr>
-            <a:spLocks noGrp="1"/>
-          </p:cNvSpPr>
-          <p:nvPr>
-            <p:ph type="body" sz="quarter" idx="10"/>
-          </p:nvPr>
-        </p:nvSpPr>
-        <p:spPr/>
-        <p:txBody>
-          <a:bodyPr/>
-          <a:lstStyle/>
-          <a:p>
-            <a:endParaRPr lang="en-US"/>
           </a:p>
         </p:txBody>
       </p:sp>
@@ -8530,7 +8649,7 @@
     </p:spTree>
     <p:extLst>
       <p:ext uri="{BB962C8B-B14F-4D97-AF65-F5344CB8AC3E}">
-        <p14:creationId xmlns:p14="http://schemas.microsoft.com/office/powerpoint/2010/main" val="3596709695"/>
+        <p14:creationId xmlns:p14="http://schemas.microsoft.com/office/powerpoint/2010/main" val="3690503997"/>
       </p:ext>
     </p:extLst>
   </p:cSld>
@@ -8630,6 +8749,10 @@
                 <a:hlinkClick r:id="rId2"/>
               </a:rPr>
               <a:t>http://bit.ly/ONLCXTBP10</a:t>
+            </a:r>
+            <a:r>
+              <a:rPr lang="en-US" dirty="0"/>
+              <a:t/>
             </a:r>
             <a:br>
               <a:rPr lang="en-US" dirty="0"/>
@@ -8746,14 +8869,12 @@
         </p:nvSpPr>
         <p:spPr/>
         <p:txBody>
-          <a:bodyPr>
-            <a:normAutofit/>
-          </a:bodyPr>
-          <a:lstStyle/>
-          <a:p>
-            <a:r>
-              <a:rPr lang="en-US" dirty="0"/>
-              <a:t>Example</a:t>
+          <a:bodyPr/>
+          <a:lstStyle/>
+          <a:p>
+            <a:r>
+              <a:rPr lang="en-US"/>
+              <a:t>Automatic Group and Replace Functions</a:t>
             </a:r>
           </a:p>
           <a:p>
@@ -8763,7 +8884,7 @@
       </p:sp>
       <p:sp>
         <p:nvSpPr>
-          <p:cNvPr id="5" name="Text Placeholder 4"/>
+          <p:cNvPr id="8" name="Text Placeholder 7"/>
           <p:cNvSpPr>
             <a:spLocks noGrp="1"/>
           </p:cNvSpPr>
@@ -8797,6 +8918,7 @@
           <a:p>
             <a:fld id="{4FAB73BC-B049-4115-A692-8D63A059BFB8}" type="slidenum">
               <a:rPr lang="en-US" smtClean="0"/>
+              <a:pPr/>
               <a:t>50</a:t>
             </a:fld>
             <a:endParaRPr lang="en-US" dirty="0"/>
@@ -8806,7 +8928,7 @@
     </p:spTree>
     <p:extLst>
       <p:ext uri="{BB962C8B-B14F-4D97-AF65-F5344CB8AC3E}">
-        <p14:creationId xmlns:p14="http://schemas.microsoft.com/office/powerpoint/2010/main" val="3653774116"/>
+        <p14:creationId xmlns:p14="http://schemas.microsoft.com/office/powerpoint/2010/main" val="2414697677"/>
       </p:ext>
     </p:extLst>
   </p:cSld>
@@ -8845,14 +8967,12 @@
         </p:nvSpPr>
         <p:spPr/>
         <p:txBody>
-          <a:bodyPr>
-            <a:normAutofit/>
-          </a:bodyPr>
-          <a:lstStyle/>
-          <a:p>
-            <a:r>
-              <a:rPr lang="en-US" dirty="0"/>
-              <a:t>Union</a:t>
+          <a:bodyPr/>
+          <a:lstStyle/>
+          <a:p>
+            <a:r>
+              <a:rPr lang="en-US"/>
+              <a:t>Manual Grouping</a:t>
             </a:r>
           </a:p>
           <a:p>
@@ -8862,7 +8982,7 @@
       </p:sp>
       <p:sp>
         <p:nvSpPr>
-          <p:cNvPr id="5" name="Text Placeholder 4"/>
+          <p:cNvPr id="8" name="Text Placeholder 7"/>
           <p:cNvSpPr>
             <a:spLocks noGrp="1"/>
           </p:cNvSpPr>
@@ -8896,6 +9016,7 @@
           <a:p>
             <a:fld id="{4FAB73BC-B049-4115-A692-8D63A059BFB8}" type="slidenum">
               <a:rPr lang="en-US" smtClean="0"/>
+              <a:pPr/>
               <a:t>51</a:t>
             </a:fld>
             <a:endParaRPr lang="en-US" dirty="0"/>
@@ -8905,7 +9026,7 @@
     </p:spTree>
     <p:extLst>
       <p:ext uri="{BB962C8B-B14F-4D97-AF65-F5344CB8AC3E}">
-        <p14:creationId xmlns:p14="http://schemas.microsoft.com/office/powerpoint/2010/main" val="1635834936"/>
+        <p14:creationId xmlns:p14="http://schemas.microsoft.com/office/powerpoint/2010/main" val="2177486930"/>
       </p:ext>
     </p:extLst>
   </p:cSld>
@@ -8944,14 +9065,12 @@
         </p:nvSpPr>
         <p:spPr/>
         <p:txBody>
-          <a:bodyPr>
-            <a:normAutofit/>
-          </a:bodyPr>
-          <a:lstStyle/>
-          <a:p>
-            <a:r>
-              <a:rPr lang="en-US" dirty="0"/>
-              <a:t>Example</a:t>
+          <a:bodyPr/>
+          <a:lstStyle/>
+          <a:p>
+            <a:r>
+              <a:rPr lang="en-US"/>
+              <a:t>Examples</a:t>
             </a:r>
           </a:p>
           <a:p>
@@ -8961,7 +9080,7 @@
       </p:sp>
       <p:sp>
         <p:nvSpPr>
-          <p:cNvPr id="5" name="Text Placeholder 4"/>
+          <p:cNvPr id="8" name="Text Placeholder 7"/>
           <p:cNvSpPr>
             <a:spLocks noGrp="1"/>
           </p:cNvSpPr>
@@ -8995,6 +9114,7 @@
           <a:p>
             <a:fld id="{4FAB73BC-B049-4115-A692-8D63A059BFB8}" type="slidenum">
               <a:rPr lang="en-US" smtClean="0"/>
+              <a:pPr/>
               <a:t>52</a:t>
             </a:fld>
             <a:endParaRPr lang="en-US" dirty="0"/>
@@ -9004,7 +9124,7 @@
     </p:spTree>
     <p:extLst>
       <p:ext uri="{BB962C8B-B14F-4D97-AF65-F5344CB8AC3E}">
-        <p14:creationId xmlns:p14="http://schemas.microsoft.com/office/powerpoint/2010/main" val="609212388"/>
+        <p14:creationId xmlns:p14="http://schemas.microsoft.com/office/powerpoint/2010/main" val="3724569971"/>
       </p:ext>
     </p:extLst>
   </p:cSld>
@@ -9091,7 +9211,7 @@
     </p:spTree>
     <p:extLst>
       <p:ext uri="{BB962C8B-B14F-4D97-AF65-F5344CB8AC3E}">
-        <p14:creationId xmlns:p14="http://schemas.microsoft.com/office/powerpoint/2010/main" val="2176800069"/>
+        <p14:creationId xmlns:p14="http://schemas.microsoft.com/office/powerpoint/2010/main" val="1648934747"/>
       </p:ext>
     </p:extLst>
   </p:cSld>
@@ -9137,7 +9257,7 @@
           <a:p>
             <a:r>
               <a:rPr lang="en-US" dirty="0"/>
-              <a:t>Tableau Prep Builder Conductor</a:t>
+              <a:t>Aggregation and Pivot</a:t>
             </a:r>
           </a:p>
           <a:p>
@@ -9171,7 +9291,7 @@
     </p:spTree>
     <p:extLst>
       <p:ext uri="{BB962C8B-B14F-4D97-AF65-F5344CB8AC3E}">
-        <p14:creationId xmlns:p14="http://schemas.microsoft.com/office/powerpoint/2010/main" val="710894456"/>
+        <p14:creationId xmlns:p14="http://schemas.microsoft.com/office/powerpoint/2010/main" val="1958751481"/>
       </p:ext>
     </p:extLst>
   </p:cSld>
@@ -9217,7 +9337,7 @@
           <a:p>
             <a:r>
               <a:rPr lang="en-US" dirty="0"/>
-              <a:t>Tableau Prep Builder Conductor</a:t>
+              <a:t>Aggregations</a:t>
             </a:r>
           </a:p>
           <a:p>
@@ -9270,7 +9390,7 @@
     </p:spTree>
     <p:extLst>
       <p:ext uri="{BB962C8B-B14F-4D97-AF65-F5344CB8AC3E}">
-        <p14:creationId xmlns:p14="http://schemas.microsoft.com/office/powerpoint/2010/main" val="3097242473"/>
+        <p14:creationId xmlns:p14="http://schemas.microsoft.com/office/powerpoint/2010/main" val="2391791631"/>
       </p:ext>
     </p:extLst>
   </p:cSld>
@@ -9316,7 +9436,7 @@
           <a:p>
             <a:r>
               <a:rPr lang="en-US" dirty="0"/>
-              <a:t>Prerequisites</a:t>
+              <a:t>Aggregation Functions</a:t>
             </a:r>
           </a:p>
           <a:p>
@@ -9369,7 +9489,7 @@
     </p:spTree>
     <p:extLst>
       <p:ext uri="{BB962C8B-B14F-4D97-AF65-F5344CB8AC3E}">
-        <p14:creationId xmlns:p14="http://schemas.microsoft.com/office/powerpoint/2010/main" val="2790491849"/>
+        <p14:creationId xmlns:p14="http://schemas.microsoft.com/office/powerpoint/2010/main" val="23337854"/>
       </p:ext>
     </p:extLst>
   </p:cSld>
@@ -9415,7 +9535,7 @@
           <a:p>
             <a:r>
               <a:rPr lang="en-US" dirty="0"/>
-              <a:t>Publishing Workflows to Server (Discussed)</a:t>
+              <a:t>Group By</a:t>
             </a:r>
           </a:p>
           <a:p>
@@ -9468,7 +9588,7 @@
     </p:spTree>
     <p:extLst>
       <p:ext uri="{BB962C8B-B14F-4D97-AF65-F5344CB8AC3E}">
-        <p14:creationId xmlns:p14="http://schemas.microsoft.com/office/powerpoint/2010/main" val="2246816309"/>
+        <p14:creationId xmlns:p14="http://schemas.microsoft.com/office/powerpoint/2010/main" val="1951688755"/>
       </p:ext>
     </p:extLst>
   </p:cSld>
@@ -9507,12 +9627,14 @@
         </p:nvSpPr>
         <p:spPr/>
         <p:txBody>
-          <a:bodyPr/>
-          <a:lstStyle/>
-          <a:p>
-            <a:r>
-              <a:rPr lang="en-US" dirty="0"/>
-              <a:t>Scheduling Workflows to Server (Discussed)</a:t>
+          <a:bodyPr>
+            <a:normAutofit/>
+          </a:bodyPr>
+          <a:lstStyle/>
+          <a:p>
+            <a:r>
+              <a:rPr lang="en-US" dirty="0"/>
+              <a:t>Examples</a:t>
             </a:r>
           </a:p>
           <a:p>
@@ -9565,7 +9687,7 @@
     </p:spTree>
     <p:extLst>
       <p:ext uri="{BB962C8B-B14F-4D97-AF65-F5344CB8AC3E}">
-        <p14:creationId xmlns:p14="http://schemas.microsoft.com/office/powerpoint/2010/main" val="2531394161"/>
+        <p14:creationId xmlns:p14="http://schemas.microsoft.com/office/powerpoint/2010/main" val="2788349869"/>
       </p:ext>
     </p:extLst>
   </p:cSld>
@@ -9594,12 +9716,39 @@
       </p:grpSpPr>
       <p:sp>
         <p:nvSpPr>
-          <p:cNvPr id="2" name="Subtitle 1"/>
-          <p:cNvSpPr>
-            <a:spLocks noGrp="1"/>
-          </p:cNvSpPr>
-          <p:nvPr>
-            <p:ph type="subTitle" idx="1"/>
+          <p:cNvPr id="2" name="Title 1"/>
+          <p:cNvSpPr>
+            <a:spLocks noGrp="1"/>
+          </p:cNvSpPr>
+          <p:nvPr>
+            <p:ph type="title"/>
+          </p:nvPr>
+        </p:nvSpPr>
+        <p:spPr/>
+        <p:txBody>
+          <a:bodyPr>
+            <a:normAutofit/>
+          </a:bodyPr>
+          <a:lstStyle/>
+          <a:p>
+            <a:r>
+              <a:rPr lang="en-US" dirty="0"/>
+              <a:t>Pivot</a:t>
+            </a:r>
+          </a:p>
+          <a:p>
+            <a:endParaRPr lang="en-US" dirty="0"/>
+          </a:p>
+        </p:txBody>
+      </p:sp>
+      <p:sp>
+        <p:nvSpPr>
+          <p:cNvPr id="5" name="Text Placeholder 4"/>
+          <p:cNvSpPr>
+            <a:spLocks noGrp="1"/>
+          </p:cNvSpPr>
+          <p:nvPr>
+            <p:ph type="body" sz="quarter" idx="10"/>
           </p:nvPr>
         </p:nvSpPr>
         <p:spPr/>
@@ -9613,46 +9762,31 @@
       </p:sp>
       <p:sp>
         <p:nvSpPr>
-          <p:cNvPr id="3" name="Text Placeholder 2"/>
-          <p:cNvSpPr>
-            <a:spLocks noGrp="1"/>
-          </p:cNvSpPr>
-          <p:nvPr>
-            <p:ph type="body" sz="quarter" idx="11"/>
-          </p:nvPr>
-        </p:nvSpPr>
-        <p:spPr/>
-        <p:txBody>
-          <a:bodyPr/>
-          <a:lstStyle/>
-          <a:p>
-            <a:endParaRPr lang="en-US"/>
-          </a:p>
-        </p:txBody>
-      </p:sp>
-      <p:sp>
-        <p:nvSpPr>
-          <p:cNvPr id="4" name="Title 3"/>
-          <p:cNvSpPr>
-            <a:spLocks noGrp="1"/>
-          </p:cNvSpPr>
-          <p:nvPr>
-            <p:ph type="title"/>
-          </p:nvPr>
-        </p:nvSpPr>
-        <p:spPr/>
-        <p:txBody>
-          <a:bodyPr/>
-          <a:lstStyle/>
-          <a:p>
-            <a:endParaRPr lang="en-US"/>
+          <p:cNvPr id="4" name="Slide Number Placeholder 3"/>
+          <p:cNvSpPr>
+            <a:spLocks noGrp="1"/>
+          </p:cNvSpPr>
+          <p:nvPr>
+            <p:ph type="sldNum" sz="quarter" idx="4294967295"/>
+          </p:nvPr>
+        </p:nvSpPr>
+        <p:spPr/>
+        <p:txBody>
+          <a:bodyPr/>
+          <a:lstStyle/>
+          <a:p>
+            <a:fld id="{4FAB73BC-B049-4115-A692-8D63A059BFB8}" type="slidenum">
+              <a:rPr lang="en-US" smtClean="0"/>
+              <a:t>59</a:t>
+            </a:fld>
+            <a:endParaRPr lang="en-US" dirty="0"/>
           </a:p>
         </p:txBody>
       </p:sp>
     </p:spTree>
     <p:extLst>
       <p:ext uri="{BB962C8B-B14F-4D97-AF65-F5344CB8AC3E}">
-        <p14:creationId xmlns:p14="http://schemas.microsoft.com/office/powerpoint/2010/main" val="3615799458"/>
+        <p14:creationId xmlns:p14="http://schemas.microsoft.com/office/powerpoint/2010/main" val="3940517650"/>
       </p:ext>
     </p:extLst>
   </p:cSld>
@@ -9791,29 +9925,7 @@
       </p:grpSpPr>
       <p:sp>
         <p:nvSpPr>
-          <p:cNvPr id="2" name="Title 1"/>
-          <p:cNvSpPr>
-            <a:spLocks noGrp="1"/>
-          </p:cNvSpPr>
-          <p:nvPr>
-            <p:ph type="ctrTitle"/>
-          </p:nvPr>
-        </p:nvSpPr>
-        <p:spPr/>
-        <p:txBody>
-          <a:bodyPr/>
-          <a:lstStyle/>
-          <a:p>
-            <a:r>
-              <a:rPr lang="en-US" dirty="0"/>
-              <a:t>Thank you!</a:t>
-            </a:r>
-          </a:p>
-        </p:txBody>
-      </p:sp>
-      <p:sp>
-        <p:nvSpPr>
-          <p:cNvPr id="5" name="Subtitle 4"/>
+          <p:cNvPr id="2" name="Subtitle 1"/>
           <p:cNvSpPr>
             <a:spLocks noGrp="1"/>
           </p:cNvSpPr>
@@ -9826,36 +9938,893 @@
           <a:bodyPr/>
           <a:lstStyle/>
           <a:p>
-            <a:r>
-              <a:rPr lang="en-US" dirty="0"/>
-              <a:t>Questions?</a:t>
-            </a:r>
-          </a:p>
-          <a:p>
-            <a:r>
-              <a:rPr lang="en-US" dirty="0"/>
-              <a:t>Survey: http://</a:t>
-            </a:r>
-            <a:r>
-              <a:rPr lang="en-US" dirty="0" err="1"/>
-              <a:t>www.onlc.com</a:t>
-            </a:r>
-            <a:r>
-              <a:rPr lang="en-US" dirty="0"/>
-              <a:t>/</a:t>
-            </a:r>
-            <a:r>
-              <a:rPr lang="en-US" dirty="0" err="1"/>
-              <a:t>eval</a:t>
-            </a:r>
-            <a:endParaRPr lang="en-US" dirty="0"/>
+            <a:endParaRPr lang="en-US"/>
+          </a:p>
+        </p:txBody>
+      </p:sp>
+      <p:sp>
+        <p:nvSpPr>
+          <p:cNvPr id="3" name="Text Placeholder 2"/>
+          <p:cNvSpPr>
+            <a:spLocks noGrp="1"/>
+          </p:cNvSpPr>
+          <p:nvPr>
+            <p:ph type="body" sz="quarter" idx="11"/>
+          </p:nvPr>
+        </p:nvSpPr>
+        <p:spPr/>
+        <p:txBody>
+          <a:bodyPr/>
+          <a:lstStyle/>
+          <a:p>
+            <a:endParaRPr lang="en-US"/>
+          </a:p>
+        </p:txBody>
+      </p:sp>
+      <p:sp>
+        <p:nvSpPr>
+          <p:cNvPr id="4" name="Title 3"/>
+          <p:cNvSpPr>
+            <a:spLocks noGrp="1"/>
+          </p:cNvSpPr>
+          <p:nvPr>
+            <p:ph type="title"/>
+          </p:nvPr>
+        </p:nvSpPr>
+        <p:spPr/>
+        <p:txBody>
+          <a:bodyPr/>
+          <a:lstStyle/>
+          <a:p>
+            <a:endParaRPr lang="en-US"/>
           </a:p>
         </p:txBody>
       </p:sp>
     </p:spTree>
     <p:extLst>
       <p:ext uri="{BB962C8B-B14F-4D97-AF65-F5344CB8AC3E}">
-        <p14:creationId xmlns:p14="http://schemas.microsoft.com/office/powerpoint/2010/main" val="1768650418"/>
+        <p14:creationId xmlns:p14="http://schemas.microsoft.com/office/powerpoint/2010/main" val="2143564651"/>
+      </p:ext>
+    </p:extLst>
+  </p:cSld>
+  <p:clrMapOvr>
+    <a:masterClrMapping/>
+  </p:clrMapOvr>
+</p:sld>
+</file>
+
+<file path=ppt/slides/slide61.xml><?xml version="1.0" encoding="utf-8"?>
+<p:sld xmlns:a="http://schemas.openxmlformats.org/drawingml/2006/main" xmlns:r="http://schemas.openxmlformats.org/officeDocument/2006/relationships" xmlns:p="http://schemas.openxmlformats.org/presentationml/2006/main">
+  <p:cSld>
+    <p:spTree>
+      <p:nvGrpSpPr>
+        <p:cNvPr id="1" name=""/>
+        <p:cNvGrpSpPr/>
+        <p:nvPr/>
+      </p:nvGrpSpPr>
+      <p:grpSpPr>
+        <a:xfrm>
+          <a:off x="0" y="0"/>
+          <a:ext cx="0" cy="0"/>
+          <a:chOff x="0" y="0"/>
+          <a:chExt cx="0" cy="0"/>
+        </a:xfrm>
+      </p:grpSpPr>
+      <p:sp>
+        <p:nvSpPr>
+          <p:cNvPr id="2" name="Title 1"/>
+          <p:cNvSpPr>
+            <a:spLocks noGrp="1"/>
+          </p:cNvSpPr>
+          <p:nvPr>
+            <p:ph type="title"/>
+          </p:nvPr>
+        </p:nvSpPr>
+        <p:spPr/>
+        <p:txBody>
+          <a:bodyPr>
+            <a:normAutofit/>
+          </a:bodyPr>
+          <a:lstStyle/>
+          <a:p>
+            <a:r>
+              <a:rPr lang="en-US" dirty="0"/>
+              <a:t>Joins and Unions</a:t>
+            </a:r>
+          </a:p>
+          <a:p>
+            <a:endParaRPr lang="en-US" dirty="0"/>
+          </a:p>
+        </p:txBody>
+      </p:sp>
+      <p:sp>
+        <p:nvSpPr>
+          <p:cNvPr id="4" name="Slide Number Placeholder 3"/>
+          <p:cNvSpPr>
+            <a:spLocks noGrp="1"/>
+          </p:cNvSpPr>
+          <p:nvPr>
+            <p:ph type="sldNum" sz="quarter" idx="4294967295"/>
+          </p:nvPr>
+        </p:nvSpPr>
+        <p:spPr/>
+        <p:txBody>
+          <a:bodyPr/>
+          <a:lstStyle/>
+          <a:p>
+            <a:fld id="{4FAB73BC-B049-4115-A692-8D63A059BFB8}" type="slidenum">
+              <a:rPr lang="en-US" smtClean="0"/>
+              <a:t>61</a:t>
+            </a:fld>
+            <a:endParaRPr lang="en-US" dirty="0"/>
+          </a:p>
+        </p:txBody>
+      </p:sp>
+    </p:spTree>
+    <p:extLst>
+      <p:ext uri="{BB962C8B-B14F-4D97-AF65-F5344CB8AC3E}">
+        <p14:creationId xmlns:p14="http://schemas.microsoft.com/office/powerpoint/2010/main" val="1240370214"/>
+      </p:ext>
+    </p:extLst>
+  </p:cSld>
+  <p:clrMapOvr>
+    <a:masterClrMapping/>
+  </p:clrMapOvr>
+</p:sld>
+</file>
+
+<file path=ppt/slides/slide62.xml><?xml version="1.0" encoding="utf-8"?>
+<p:sld xmlns:a="http://schemas.openxmlformats.org/drawingml/2006/main" xmlns:r="http://schemas.openxmlformats.org/officeDocument/2006/relationships" xmlns:p="http://schemas.openxmlformats.org/presentationml/2006/main">
+  <p:cSld>
+    <p:spTree>
+      <p:nvGrpSpPr>
+        <p:cNvPr id="1" name=""/>
+        <p:cNvGrpSpPr/>
+        <p:nvPr/>
+      </p:nvGrpSpPr>
+      <p:grpSpPr>
+        <a:xfrm>
+          <a:off x="0" y="0"/>
+          <a:ext cx="0" cy="0"/>
+          <a:chOff x="0" y="0"/>
+          <a:chExt cx="0" cy="0"/>
+        </a:xfrm>
+      </p:grpSpPr>
+      <p:sp>
+        <p:nvSpPr>
+          <p:cNvPr id="2" name="Title 1"/>
+          <p:cNvSpPr>
+            <a:spLocks noGrp="1"/>
+          </p:cNvSpPr>
+          <p:nvPr>
+            <p:ph type="title"/>
+          </p:nvPr>
+        </p:nvSpPr>
+        <p:spPr/>
+        <p:txBody>
+          <a:bodyPr>
+            <a:normAutofit/>
+          </a:bodyPr>
+          <a:lstStyle/>
+          <a:p>
+            <a:r>
+              <a:rPr lang="en-US" dirty="0"/>
+              <a:t>Join</a:t>
+            </a:r>
+          </a:p>
+          <a:p>
+            <a:endParaRPr lang="en-US" dirty="0"/>
+          </a:p>
+        </p:txBody>
+      </p:sp>
+      <p:sp>
+        <p:nvSpPr>
+          <p:cNvPr id="5" name="Text Placeholder 4"/>
+          <p:cNvSpPr>
+            <a:spLocks noGrp="1"/>
+          </p:cNvSpPr>
+          <p:nvPr>
+            <p:ph type="body" sz="quarter" idx="10"/>
+          </p:nvPr>
+        </p:nvSpPr>
+        <p:spPr/>
+        <p:txBody>
+          <a:bodyPr/>
+          <a:lstStyle/>
+          <a:p>
+            <a:endParaRPr lang="en-US"/>
+          </a:p>
+        </p:txBody>
+      </p:sp>
+      <p:sp>
+        <p:nvSpPr>
+          <p:cNvPr id="4" name="Slide Number Placeholder 3"/>
+          <p:cNvSpPr>
+            <a:spLocks noGrp="1"/>
+          </p:cNvSpPr>
+          <p:nvPr>
+            <p:ph type="sldNum" sz="quarter" idx="4294967295"/>
+          </p:nvPr>
+        </p:nvSpPr>
+        <p:spPr/>
+        <p:txBody>
+          <a:bodyPr/>
+          <a:lstStyle/>
+          <a:p>
+            <a:fld id="{4FAB73BC-B049-4115-A692-8D63A059BFB8}" type="slidenum">
+              <a:rPr lang="en-US" smtClean="0"/>
+              <a:t>62</a:t>
+            </a:fld>
+            <a:endParaRPr lang="en-US" dirty="0"/>
+          </a:p>
+        </p:txBody>
+      </p:sp>
+    </p:spTree>
+    <p:extLst>
+      <p:ext uri="{BB962C8B-B14F-4D97-AF65-F5344CB8AC3E}">
+        <p14:creationId xmlns:p14="http://schemas.microsoft.com/office/powerpoint/2010/main" val="2599561476"/>
+      </p:ext>
+    </p:extLst>
+  </p:cSld>
+  <p:clrMapOvr>
+    <a:masterClrMapping/>
+  </p:clrMapOvr>
+</p:sld>
+</file>
+
+<file path=ppt/slides/slide63.xml><?xml version="1.0" encoding="utf-8"?>
+<p:sld xmlns:a="http://schemas.openxmlformats.org/drawingml/2006/main" xmlns:r="http://schemas.openxmlformats.org/officeDocument/2006/relationships" xmlns:p="http://schemas.openxmlformats.org/presentationml/2006/main">
+  <p:cSld>
+    <p:spTree>
+      <p:nvGrpSpPr>
+        <p:cNvPr id="1" name=""/>
+        <p:cNvGrpSpPr/>
+        <p:nvPr/>
+      </p:nvGrpSpPr>
+      <p:grpSpPr>
+        <a:xfrm>
+          <a:off x="0" y="0"/>
+          <a:ext cx="0" cy="0"/>
+          <a:chOff x="0" y="0"/>
+          <a:chExt cx="0" cy="0"/>
+        </a:xfrm>
+      </p:grpSpPr>
+      <p:sp>
+        <p:nvSpPr>
+          <p:cNvPr id="2" name="Title 1"/>
+          <p:cNvSpPr>
+            <a:spLocks noGrp="1"/>
+          </p:cNvSpPr>
+          <p:nvPr>
+            <p:ph type="title"/>
+          </p:nvPr>
+        </p:nvSpPr>
+        <p:spPr/>
+        <p:txBody>
+          <a:bodyPr>
+            <a:normAutofit/>
+          </a:bodyPr>
+          <a:lstStyle/>
+          <a:p>
+            <a:r>
+              <a:rPr lang="en-US" dirty="0"/>
+              <a:t>Types of Joins</a:t>
+            </a:r>
+          </a:p>
+          <a:p>
+            <a:endParaRPr lang="en-US" dirty="0"/>
+          </a:p>
+        </p:txBody>
+      </p:sp>
+      <p:sp>
+        <p:nvSpPr>
+          <p:cNvPr id="5" name="Text Placeholder 4"/>
+          <p:cNvSpPr>
+            <a:spLocks noGrp="1"/>
+          </p:cNvSpPr>
+          <p:nvPr>
+            <p:ph type="body" sz="quarter" idx="10"/>
+          </p:nvPr>
+        </p:nvSpPr>
+        <p:spPr/>
+        <p:txBody>
+          <a:bodyPr/>
+          <a:lstStyle/>
+          <a:p>
+            <a:endParaRPr lang="en-US"/>
+          </a:p>
+        </p:txBody>
+      </p:sp>
+      <p:sp>
+        <p:nvSpPr>
+          <p:cNvPr id="4" name="Slide Number Placeholder 3"/>
+          <p:cNvSpPr>
+            <a:spLocks noGrp="1"/>
+          </p:cNvSpPr>
+          <p:nvPr>
+            <p:ph type="sldNum" sz="quarter" idx="4294967295"/>
+          </p:nvPr>
+        </p:nvSpPr>
+        <p:spPr/>
+        <p:txBody>
+          <a:bodyPr/>
+          <a:lstStyle/>
+          <a:p>
+            <a:fld id="{4FAB73BC-B049-4115-A692-8D63A059BFB8}" type="slidenum">
+              <a:rPr lang="en-US" smtClean="0"/>
+              <a:t>63</a:t>
+            </a:fld>
+            <a:endParaRPr lang="en-US" dirty="0"/>
+          </a:p>
+        </p:txBody>
+      </p:sp>
+    </p:spTree>
+    <p:extLst>
+      <p:ext uri="{BB962C8B-B14F-4D97-AF65-F5344CB8AC3E}">
+        <p14:creationId xmlns:p14="http://schemas.microsoft.com/office/powerpoint/2010/main" val="3596709695"/>
+      </p:ext>
+    </p:extLst>
+  </p:cSld>
+  <p:clrMapOvr>
+    <a:masterClrMapping/>
+  </p:clrMapOvr>
+</p:sld>
+</file>
+
+<file path=ppt/slides/slide64.xml><?xml version="1.0" encoding="utf-8"?>
+<p:sld xmlns:a="http://schemas.openxmlformats.org/drawingml/2006/main" xmlns:r="http://schemas.openxmlformats.org/officeDocument/2006/relationships" xmlns:p="http://schemas.openxmlformats.org/presentationml/2006/main">
+  <p:cSld>
+    <p:spTree>
+      <p:nvGrpSpPr>
+        <p:cNvPr id="1" name=""/>
+        <p:cNvGrpSpPr/>
+        <p:nvPr/>
+      </p:nvGrpSpPr>
+      <p:grpSpPr>
+        <a:xfrm>
+          <a:off x="0" y="0"/>
+          <a:ext cx="0" cy="0"/>
+          <a:chOff x="0" y="0"/>
+          <a:chExt cx="0" cy="0"/>
+        </a:xfrm>
+      </p:grpSpPr>
+      <p:sp>
+        <p:nvSpPr>
+          <p:cNvPr id="2" name="Title 1"/>
+          <p:cNvSpPr>
+            <a:spLocks noGrp="1"/>
+          </p:cNvSpPr>
+          <p:nvPr>
+            <p:ph type="title"/>
+          </p:nvPr>
+        </p:nvSpPr>
+        <p:spPr/>
+        <p:txBody>
+          <a:bodyPr>
+            <a:normAutofit/>
+          </a:bodyPr>
+          <a:lstStyle/>
+          <a:p>
+            <a:r>
+              <a:rPr lang="en-US" dirty="0"/>
+              <a:t>Example</a:t>
+            </a:r>
+          </a:p>
+          <a:p>
+            <a:endParaRPr lang="en-US" dirty="0"/>
+          </a:p>
+        </p:txBody>
+      </p:sp>
+      <p:sp>
+        <p:nvSpPr>
+          <p:cNvPr id="5" name="Text Placeholder 4"/>
+          <p:cNvSpPr>
+            <a:spLocks noGrp="1"/>
+          </p:cNvSpPr>
+          <p:nvPr>
+            <p:ph type="body" sz="quarter" idx="10"/>
+          </p:nvPr>
+        </p:nvSpPr>
+        <p:spPr/>
+        <p:txBody>
+          <a:bodyPr/>
+          <a:lstStyle/>
+          <a:p>
+            <a:endParaRPr lang="en-US"/>
+          </a:p>
+        </p:txBody>
+      </p:sp>
+      <p:sp>
+        <p:nvSpPr>
+          <p:cNvPr id="4" name="Slide Number Placeholder 3"/>
+          <p:cNvSpPr>
+            <a:spLocks noGrp="1"/>
+          </p:cNvSpPr>
+          <p:nvPr>
+            <p:ph type="sldNum" sz="quarter" idx="4294967295"/>
+          </p:nvPr>
+        </p:nvSpPr>
+        <p:spPr/>
+        <p:txBody>
+          <a:bodyPr/>
+          <a:lstStyle/>
+          <a:p>
+            <a:fld id="{4FAB73BC-B049-4115-A692-8D63A059BFB8}" type="slidenum">
+              <a:rPr lang="en-US" smtClean="0"/>
+              <a:t>64</a:t>
+            </a:fld>
+            <a:endParaRPr lang="en-US" dirty="0"/>
+          </a:p>
+        </p:txBody>
+      </p:sp>
+    </p:spTree>
+    <p:extLst>
+      <p:ext uri="{BB962C8B-B14F-4D97-AF65-F5344CB8AC3E}">
+        <p14:creationId xmlns:p14="http://schemas.microsoft.com/office/powerpoint/2010/main" val="3653774116"/>
+      </p:ext>
+    </p:extLst>
+  </p:cSld>
+  <p:clrMapOvr>
+    <a:masterClrMapping/>
+  </p:clrMapOvr>
+</p:sld>
+</file>
+
+<file path=ppt/slides/slide65.xml><?xml version="1.0" encoding="utf-8"?>
+<p:sld xmlns:a="http://schemas.openxmlformats.org/drawingml/2006/main" xmlns:r="http://schemas.openxmlformats.org/officeDocument/2006/relationships" xmlns:p="http://schemas.openxmlformats.org/presentationml/2006/main">
+  <p:cSld>
+    <p:spTree>
+      <p:nvGrpSpPr>
+        <p:cNvPr id="1" name=""/>
+        <p:cNvGrpSpPr/>
+        <p:nvPr/>
+      </p:nvGrpSpPr>
+      <p:grpSpPr>
+        <a:xfrm>
+          <a:off x="0" y="0"/>
+          <a:ext cx="0" cy="0"/>
+          <a:chOff x="0" y="0"/>
+          <a:chExt cx="0" cy="0"/>
+        </a:xfrm>
+      </p:grpSpPr>
+      <p:sp>
+        <p:nvSpPr>
+          <p:cNvPr id="2" name="Title 1"/>
+          <p:cNvSpPr>
+            <a:spLocks noGrp="1"/>
+          </p:cNvSpPr>
+          <p:nvPr>
+            <p:ph type="title"/>
+          </p:nvPr>
+        </p:nvSpPr>
+        <p:spPr/>
+        <p:txBody>
+          <a:bodyPr>
+            <a:normAutofit/>
+          </a:bodyPr>
+          <a:lstStyle/>
+          <a:p>
+            <a:r>
+              <a:rPr lang="en-US" dirty="0"/>
+              <a:t>Union</a:t>
+            </a:r>
+          </a:p>
+          <a:p>
+            <a:endParaRPr lang="en-US" dirty="0"/>
+          </a:p>
+        </p:txBody>
+      </p:sp>
+      <p:sp>
+        <p:nvSpPr>
+          <p:cNvPr id="5" name="Text Placeholder 4"/>
+          <p:cNvSpPr>
+            <a:spLocks noGrp="1"/>
+          </p:cNvSpPr>
+          <p:nvPr>
+            <p:ph type="body" sz="quarter" idx="10"/>
+          </p:nvPr>
+        </p:nvSpPr>
+        <p:spPr/>
+        <p:txBody>
+          <a:bodyPr/>
+          <a:lstStyle/>
+          <a:p>
+            <a:endParaRPr lang="en-US"/>
+          </a:p>
+        </p:txBody>
+      </p:sp>
+      <p:sp>
+        <p:nvSpPr>
+          <p:cNvPr id="4" name="Slide Number Placeholder 3"/>
+          <p:cNvSpPr>
+            <a:spLocks noGrp="1"/>
+          </p:cNvSpPr>
+          <p:nvPr>
+            <p:ph type="sldNum" sz="quarter" idx="4294967295"/>
+          </p:nvPr>
+        </p:nvSpPr>
+        <p:spPr/>
+        <p:txBody>
+          <a:bodyPr/>
+          <a:lstStyle/>
+          <a:p>
+            <a:fld id="{4FAB73BC-B049-4115-A692-8D63A059BFB8}" type="slidenum">
+              <a:rPr lang="en-US" smtClean="0"/>
+              <a:t>65</a:t>
+            </a:fld>
+            <a:endParaRPr lang="en-US" dirty="0"/>
+          </a:p>
+        </p:txBody>
+      </p:sp>
+    </p:spTree>
+    <p:extLst>
+      <p:ext uri="{BB962C8B-B14F-4D97-AF65-F5344CB8AC3E}">
+        <p14:creationId xmlns:p14="http://schemas.microsoft.com/office/powerpoint/2010/main" val="1635834936"/>
+      </p:ext>
+    </p:extLst>
+  </p:cSld>
+  <p:clrMapOvr>
+    <a:masterClrMapping/>
+  </p:clrMapOvr>
+</p:sld>
+</file>
+
+<file path=ppt/slides/slide66.xml><?xml version="1.0" encoding="utf-8"?>
+<p:sld xmlns:a="http://schemas.openxmlformats.org/drawingml/2006/main" xmlns:r="http://schemas.openxmlformats.org/officeDocument/2006/relationships" xmlns:p="http://schemas.openxmlformats.org/presentationml/2006/main">
+  <p:cSld>
+    <p:spTree>
+      <p:nvGrpSpPr>
+        <p:cNvPr id="1" name=""/>
+        <p:cNvGrpSpPr/>
+        <p:nvPr/>
+      </p:nvGrpSpPr>
+      <p:grpSpPr>
+        <a:xfrm>
+          <a:off x="0" y="0"/>
+          <a:ext cx="0" cy="0"/>
+          <a:chOff x="0" y="0"/>
+          <a:chExt cx="0" cy="0"/>
+        </a:xfrm>
+      </p:grpSpPr>
+      <p:sp>
+        <p:nvSpPr>
+          <p:cNvPr id="2" name="Title 1"/>
+          <p:cNvSpPr>
+            <a:spLocks noGrp="1"/>
+          </p:cNvSpPr>
+          <p:nvPr>
+            <p:ph type="title"/>
+          </p:nvPr>
+        </p:nvSpPr>
+        <p:spPr/>
+        <p:txBody>
+          <a:bodyPr>
+            <a:normAutofit/>
+          </a:bodyPr>
+          <a:lstStyle/>
+          <a:p>
+            <a:r>
+              <a:rPr lang="en-US" dirty="0"/>
+              <a:t>Example</a:t>
+            </a:r>
+          </a:p>
+          <a:p>
+            <a:endParaRPr lang="en-US" dirty="0"/>
+          </a:p>
+        </p:txBody>
+      </p:sp>
+      <p:sp>
+        <p:nvSpPr>
+          <p:cNvPr id="5" name="Text Placeholder 4"/>
+          <p:cNvSpPr>
+            <a:spLocks noGrp="1"/>
+          </p:cNvSpPr>
+          <p:nvPr>
+            <p:ph type="body" sz="quarter" idx="10"/>
+          </p:nvPr>
+        </p:nvSpPr>
+        <p:spPr/>
+        <p:txBody>
+          <a:bodyPr/>
+          <a:lstStyle/>
+          <a:p>
+            <a:endParaRPr lang="en-US"/>
+          </a:p>
+        </p:txBody>
+      </p:sp>
+      <p:sp>
+        <p:nvSpPr>
+          <p:cNvPr id="4" name="Slide Number Placeholder 3"/>
+          <p:cNvSpPr>
+            <a:spLocks noGrp="1"/>
+          </p:cNvSpPr>
+          <p:nvPr>
+            <p:ph type="sldNum" sz="quarter" idx="4294967295"/>
+          </p:nvPr>
+        </p:nvSpPr>
+        <p:spPr/>
+        <p:txBody>
+          <a:bodyPr/>
+          <a:lstStyle/>
+          <a:p>
+            <a:fld id="{4FAB73BC-B049-4115-A692-8D63A059BFB8}" type="slidenum">
+              <a:rPr lang="en-US" smtClean="0"/>
+              <a:t>66</a:t>
+            </a:fld>
+            <a:endParaRPr lang="en-US" dirty="0"/>
+          </a:p>
+        </p:txBody>
+      </p:sp>
+    </p:spTree>
+    <p:extLst>
+      <p:ext uri="{BB962C8B-B14F-4D97-AF65-F5344CB8AC3E}">
+        <p14:creationId xmlns:p14="http://schemas.microsoft.com/office/powerpoint/2010/main" val="609212388"/>
+      </p:ext>
+    </p:extLst>
+  </p:cSld>
+  <p:clrMapOvr>
+    <a:masterClrMapping/>
+  </p:clrMapOvr>
+</p:sld>
+</file>
+
+<file path=ppt/slides/slide67.xml><?xml version="1.0" encoding="utf-8"?>
+<p:sld xmlns:a="http://schemas.openxmlformats.org/drawingml/2006/main" xmlns:r="http://schemas.openxmlformats.org/officeDocument/2006/relationships" xmlns:p="http://schemas.openxmlformats.org/presentationml/2006/main">
+  <p:cSld>
+    <p:spTree>
+      <p:nvGrpSpPr>
+        <p:cNvPr id="1" name=""/>
+        <p:cNvGrpSpPr/>
+        <p:nvPr/>
+      </p:nvGrpSpPr>
+      <p:grpSpPr>
+        <a:xfrm>
+          <a:off x="0" y="0"/>
+          <a:ext cx="0" cy="0"/>
+          <a:chOff x="0" y="0"/>
+          <a:chExt cx="0" cy="0"/>
+        </a:xfrm>
+      </p:grpSpPr>
+      <p:sp>
+        <p:nvSpPr>
+          <p:cNvPr id="2" name="Subtitle 1"/>
+          <p:cNvSpPr>
+            <a:spLocks noGrp="1"/>
+          </p:cNvSpPr>
+          <p:nvPr>
+            <p:ph type="subTitle" idx="1"/>
+          </p:nvPr>
+        </p:nvSpPr>
+        <p:spPr/>
+        <p:txBody>
+          <a:bodyPr/>
+          <a:lstStyle/>
+          <a:p>
+            <a:endParaRPr lang="en-US"/>
+          </a:p>
+        </p:txBody>
+      </p:sp>
+      <p:sp>
+        <p:nvSpPr>
+          <p:cNvPr id="3" name="Text Placeholder 2"/>
+          <p:cNvSpPr>
+            <a:spLocks noGrp="1"/>
+          </p:cNvSpPr>
+          <p:nvPr>
+            <p:ph type="body" sz="quarter" idx="11"/>
+          </p:nvPr>
+        </p:nvSpPr>
+        <p:spPr/>
+        <p:txBody>
+          <a:bodyPr/>
+          <a:lstStyle/>
+          <a:p>
+            <a:endParaRPr lang="en-US"/>
+          </a:p>
+        </p:txBody>
+      </p:sp>
+      <p:sp>
+        <p:nvSpPr>
+          <p:cNvPr id="4" name="Title 3"/>
+          <p:cNvSpPr>
+            <a:spLocks noGrp="1"/>
+          </p:cNvSpPr>
+          <p:nvPr>
+            <p:ph type="title"/>
+          </p:nvPr>
+        </p:nvSpPr>
+        <p:spPr/>
+        <p:txBody>
+          <a:bodyPr/>
+          <a:lstStyle/>
+          <a:p>
+            <a:endParaRPr lang="en-US"/>
+          </a:p>
+        </p:txBody>
+      </p:sp>
+    </p:spTree>
+    <p:extLst>
+      <p:ext uri="{BB962C8B-B14F-4D97-AF65-F5344CB8AC3E}">
+        <p14:creationId xmlns:p14="http://schemas.microsoft.com/office/powerpoint/2010/main" val="2176800069"/>
+      </p:ext>
+    </p:extLst>
+  </p:cSld>
+  <p:clrMapOvr>
+    <a:masterClrMapping/>
+  </p:clrMapOvr>
+</p:sld>
+</file>
+
+<file path=ppt/slides/slide68.xml><?xml version="1.0" encoding="utf-8"?>
+<p:sld xmlns:a="http://schemas.openxmlformats.org/drawingml/2006/main" xmlns:r="http://schemas.openxmlformats.org/officeDocument/2006/relationships" xmlns:p="http://schemas.openxmlformats.org/presentationml/2006/main">
+  <p:cSld>
+    <p:spTree>
+      <p:nvGrpSpPr>
+        <p:cNvPr id="1" name=""/>
+        <p:cNvGrpSpPr/>
+        <p:nvPr/>
+      </p:nvGrpSpPr>
+      <p:grpSpPr>
+        <a:xfrm>
+          <a:off x="0" y="0"/>
+          <a:ext cx="0" cy="0"/>
+          <a:chOff x="0" y="0"/>
+          <a:chExt cx="0" cy="0"/>
+        </a:xfrm>
+      </p:grpSpPr>
+      <p:sp>
+        <p:nvSpPr>
+          <p:cNvPr id="2" name="Title 1"/>
+          <p:cNvSpPr>
+            <a:spLocks noGrp="1"/>
+          </p:cNvSpPr>
+          <p:nvPr>
+            <p:ph type="title"/>
+          </p:nvPr>
+        </p:nvSpPr>
+        <p:spPr/>
+        <p:txBody>
+          <a:bodyPr>
+            <a:normAutofit/>
+          </a:bodyPr>
+          <a:lstStyle/>
+          <a:p>
+            <a:r>
+              <a:rPr lang="en-US" dirty="0"/>
+              <a:t>Tableau Prep Builder Conductor</a:t>
+            </a:r>
+          </a:p>
+          <a:p>
+            <a:endParaRPr lang="en-US" dirty="0"/>
+          </a:p>
+        </p:txBody>
+      </p:sp>
+      <p:sp>
+        <p:nvSpPr>
+          <p:cNvPr id="4" name="Slide Number Placeholder 3"/>
+          <p:cNvSpPr>
+            <a:spLocks noGrp="1"/>
+          </p:cNvSpPr>
+          <p:nvPr>
+            <p:ph type="sldNum" sz="quarter" idx="4294967295"/>
+          </p:nvPr>
+        </p:nvSpPr>
+        <p:spPr/>
+        <p:txBody>
+          <a:bodyPr/>
+          <a:lstStyle/>
+          <a:p>
+            <a:fld id="{4FAB73BC-B049-4115-A692-8D63A059BFB8}" type="slidenum">
+              <a:rPr lang="en-US" smtClean="0"/>
+              <a:t>68</a:t>
+            </a:fld>
+            <a:endParaRPr lang="en-US" dirty="0"/>
+          </a:p>
+        </p:txBody>
+      </p:sp>
+    </p:spTree>
+    <p:extLst>
+      <p:ext uri="{BB962C8B-B14F-4D97-AF65-F5344CB8AC3E}">
+        <p14:creationId xmlns:p14="http://schemas.microsoft.com/office/powerpoint/2010/main" val="710894456"/>
+      </p:ext>
+    </p:extLst>
+  </p:cSld>
+  <p:clrMapOvr>
+    <a:masterClrMapping/>
+  </p:clrMapOvr>
+</p:sld>
+</file>
+
+<file path=ppt/slides/slide69.xml><?xml version="1.0" encoding="utf-8"?>
+<p:sld xmlns:a="http://schemas.openxmlformats.org/drawingml/2006/main" xmlns:r="http://schemas.openxmlformats.org/officeDocument/2006/relationships" xmlns:p="http://schemas.openxmlformats.org/presentationml/2006/main">
+  <p:cSld>
+    <p:spTree>
+      <p:nvGrpSpPr>
+        <p:cNvPr id="1" name=""/>
+        <p:cNvGrpSpPr/>
+        <p:nvPr/>
+      </p:nvGrpSpPr>
+      <p:grpSpPr>
+        <a:xfrm>
+          <a:off x="0" y="0"/>
+          <a:ext cx="0" cy="0"/>
+          <a:chOff x="0" y="0"/>
+          <a:chExt cx="0" cy="0"/>
+        </a:xfrm>
+      </p:grpSpPr>
+      <p:sp>
+        <p:nvSpPr>
+          <p:cNvPr id="2" name="Title 1"/>
+          <p:cNvSpPr>
+            <a:spLocks noGrp="1"/>
+          </p:cNvSpPr>
+          <p:nvPr>
+            <p:ph type="title"/>
+          </p:nvPr>
+        </p:nvSpPr>
+        <p:spPr/>
+        <p:txBody>
+          <a:bodyPr>
+            <a:normAutofit/>
+          </a:bodyPr>
+          <a:lstStyle/>
+          <a:p>
+            <a:r>
+              <a:rPr lang="en-US" dirty="0"/>
+              <a:t>Tableau Prep Builder Conductor</a:t>
+            </a:r>
+          </a:p>
+          <a:p>
+            <a:endParaRPr lang="en-US" dirty="0"/>
+          </a:p>
+        </p:txBody>
+      </p:sp>
+      <p:sp>
+        <p:nvSpPr>
+          <p:cNvPr id="5" name="Text Placeholder 4"/>
+          <p:cNvSpPr>
+            <a:spLocks noGrp="1"/>
+          </p:cNvSpPr>
+          <p:nvPr>
+            <p:ph type="body" sz="quarter" idx="10"/>
+          </p:nvPr>
+        </p:nvSpPr>
+        <p:spPr/>
+        <p:txBody>
+          <a:bodyPr/>
+          <a:lstStyle/>
+          <a:p>
+            <a:endParaRPr lang="en-US"/>
+          </a:p>
+        </p:txBody>
+      </p:sp>
+      <p:sp>
+        <p:nvSpPr>
+          <p:cNvPr id="4" name="Slide Number Placeholder 3"/>
+          <p:cNvSpPr>
+            <a:spLocks noGrp="1"/>
+          </p:cNvSpPr>
+          <p:nvPr>
+            <p:ph type="sldNum" sz="quarter" idx="4294967295"/>
+          </p:nvPr>
+        </p:nvSpPr>
+        <p:spPr/>
+        <p:txBody>
+          <a:bodyPr/>
+          <a:lstStyle/>
+          <a:p>
+            <a:fld id="{4FAB73BC-B049-4115-A692-8D63A059BFB8}" type="slidenum">
+              <a:rPr lang="en-US" smtClean="0"/>
+              <a:t>69</a:t>
+            </a:fld>
+            <a:endParaRPr lang="en-US" dirty="0"/>
+          </a:p>
+        </p:txBody>
+      </p:sp>
+    </p:spTree>
+    <p:extLst>
+      <p:ext uri="{BB962C8B-B14F-4D97-AF65-F5344CB8AC3E}">
+        <p14:creationId xmlns:p14="http://schemas.microsoft.com/office/powerpoint/2010/main" val="3097242473"/>
       </p:ext>
     </p:extLst>
   </p:cSld>
@@ -9960,6 +10929,10 @@
             <a:br>
               <a:rPr lang="en-US" dirty="0"/>
             </a:br>
+            <a:r>
+              <a:rPr lang="en-US" dirty="0"/>
+              <a:t/>
+            </a:r>
             <a:br>
               <a:rPr lang="en-US" dirty="0"/>
             </a:br>
@@ -10019,6 +10992,10 @@
             <a:br>
               <a:rPr lang="en-US" dirty="0"/>
             </a:br>
+            <a:r>
+              <a:rPr lang="en-US" dirty="0"/>
+              <a:t/>
+            </a:r>
             <a:br>
               <a:rPr lang="en-US" dirty="0"/>
             </a:br>
@@ -10066,6 +11043,10 @@
             <a:br>
               <a:rPr lang="en-US" dirty="0"/>
             </a:br>
+            <a:r>
+              <a:rPr lang="en-US" dirty="0"/>
+              <a:t/>
+            </a:r>
             <a:br>
               <a:rPr lang="en-US" dirty="0"/>
             </a:br>
@@ -10097,6 +11078,10 @@
             <a:br>
               <a:rPr lang="en-US" dirty="0"/>
             </a:br>
+            <a:r>
+              <a:rPr lang="en-US" dirty="0"/>
+              <a:t/>
+            </a:r>
             <a:br>
               <a:rPr lang="en-US" dirty="0"/>
             </a:br>
@@ -10142,6 +11127,10 @@
             <a:br>
               <a:rPr lang="en-US" dirty="0"/>
             </a:br>
+            <a:r>
+              <a:rPr lang="en-US" dirty="0"/>
+              <a:t/>
+            </a:r>
             <a:br>
               <a:rPr lang="en-US" dirty="0"/>
             </a:br>
@@ -10187,6 +11176,10 @@
             <a:br>
               <a:rPr lang="en-US" dirty="0"/>
             </a:br>
+            <a:r>
+              <a:rPr lang="en-US" dirty="0"/>
+              <a:t/>
+            </a:r>
             <a:br>
               <a:rPr lang="en-US" dirty="0"/>
             </a:br>
@@ -10253,6 +11246,481 @@
     <p:extLst>
       <p:ext uri="{BB962C8B-B14F-4D97-AF65-F5344CB8AC3E}">
         <p14:creationId xmlns:p14="http://schemas.microsoft.com/office/powerpoint/2010/main" val="2796521234"/>
+      </p:ext>
+    </p:extLst>
+  </p:cSld>
+  <p:clrMapOvr>
+    <a:masterClrMapping/>
+  </p:clrMapOvr>
+</p:sld>
+</file>
+
+<file path=ppt/slides/slide70.xml><?xml version="1.0" encoding="utf-8"?>
+<p:sld xmlns:a="http://schemas.openxmlformats.org/drawingml/2006/main" xmlns:r="http://schemas.openxmlformats.org/officeDocument/2006/relationships" xmlns:p="http://schemas.openxmlformats.org/presentationml/2006/main">
+  <p:cSld>
+    <p:spTree>
+      <p:nvGrpSpPr>
+        <p:cNvPr id="1" name=""/>
+        <p:cNvGrpSpPr/>
+        <p:nvPr/>
+      </p:nvGrpSpPr>
+      <p:grpSpPr>
+        <a:xfrm>
+          <a:off x="0" y="0"/>
+          <a:ext cx="0" cy="0"/>
+          <a:chOff x="0" y="0"/>
+          <a:chExt cx="0" cy="0"/>
+        </a:xfrm>
+      </p:grpSpPr>
+      <p:sp>
+        <p:nvSpPr>
+          <p:cNvPr id="2" name="Title 1"/>
+          <p:cNvSpPr>
+            <a:spLocks noGrp="1"/>
+          </p:cNvSpPr>
+          <p:nvPr>
+            <p:ph type="title"/>
+          </p:nvPr>
+        </p:nvSpPr>
+        <p:spPr/>
+        <p:txBody>
+          <a:bodyPr>
+            <a:normAutofit/>
+          </a:bodyPr>
+          <a:lstStyle/>
+          <a:p>
+            <a:r>
+              <a:rPr lang="en-US" dirty="0"/>
+              <a:t>Prerequisites</a:t>
+            </a:r>
+          </a:p>
+          <a:p>
+            <a:endParaRPr lang="en-US" dirty="0"/>
+          </a:p>
+        </p:txBody>
+      </p:sp>
+      <p:sp>
+        <p:nvSpPr>
+          <p:cNvPr id="5" name="Text Placeholder 4"/>
+          <p:cNvSpPr>
+            <a:spLocks noGrp="1"/>
+          </p:cNvSpPr>
+          <p:nvPr>
+            <p:ph type="body" sz="quarter" idx="10"/>
+          </p:nvPr>
+        </p:nvSpPr>
+        <p:spPr/>
+        <p:txBody>
+          <a:bodyPr/>
+          <a:lstStyle/>
+          <a:p>
+            <a:endParaRPr lang="en-US"/>
+          </a:p>
+        </p:txBody>
+      </p:sp>
+      <p:sp>
+        <p:nvSpPr>
+          <p:cNvPr id="4" name="Slide Number Placeholder 3"/>
+          <p:cNvSpPr>
+            <a:spLocks noGrp="1"/>
+          </p:cNvSpPr>
+          <p:nvPr>
+            <p:ph type="sldNum" sz="quarter" idx="4294967295"/>
+          </p:nvPr>
+        </p:nvSpPr>
+        <p:spPr/>
+        <p:txBody>
+          <a:bodyPr/>
+          <a:lstStyle/>
+          <a:p>
+            <a:fld id="{4FAB73BC-B049-4115-A692-8D63A059BFB8}" type="slidenum">
+              <a:rPr lang="en-US" smtClean="0"/>
+              <a:t>70</a:t>
+            </a:fld>
+            <a:endParaRPr lang="en-US" dirty="0"/>
+          </a:p>
+        </p:txBody>
+      </p:sp>
+    </p:spTree>
+    <p:extLst>
+      <p:ext uri="{BB962C8B-B14F-4D97-AF65-F5344CB8AC3E}">
+        <p14:creationId xmlns:p14="http://schemas.microsoft.com/office/powerpoint/2010/main" val="2790491849"/>
+      </p:ext>
+    </p:extLst>
+  </p:cSld>
+  <p:clrMapOvr>
+    <a:masterClrMapping/>
+  </p:clrMapOvr>
+</p:sld>
+</file>
+
+<file path=ppt/slides/slide71.xml><?xml version="1.0" encoding="utf-8"?>
+<p:sld xmlns:a="http://schemas.openxmlformats.org/drawingml/2006/main" xmlns:r="http://schemas.openxmlformats.org/officeDocument/2006/relationships" xmlns:p="http://schemas.openxmlformats.org/presentationml/2006/main">
+  <p:cSld>
+    <p:spTree>
+      <p:nvGrpSpPr>
+        <p:cNvPr id="1" name=""/>
+        <p:cNvGrpSpPr/>
+        <p:nvPr/>
+      </p:nvGrpSpPr>
+      <p:grpSpPr>
+        <a:xfrm>
+          <a:off x="0" y="0"/>
+          <a:ext cx="0" cy="0"/>
+          <a:chOff x="0" y="0"/>
+          <a:chExt cx="0" cy="0"/>
+        </a:xfrm>
+      </p:grpSpPr>
+      <p:sp>
+        <p:nvSpPr>
+          <p:cNvPr id="2" name="Title 1"/>
+          <p:cNvSpPr>
+            <a:spLocks noGrp="1"/>
+          </p:cNvSpPr>
+          <p:nvPr>
+            <p:ph type="title"/>
+          </p:nvPr>
+        </p:nvSpPr>
+        <p:spPr/>
+        <p:txBody>
+          <a:bodyPr>
+            <a:normAutofit/>
+          </a:bodyPr>
+          <a:lstStyle/>
+          <a:p>
+            <a:r>
+              <a:rPr lang="en-US" dirty="0"/>
+              <a:t>Publishing Workflows to Server (Discussed)</a:t>
+            </a:r>
+          </a:p>
+          <a:p>
+            <a:endParaRPr lang="en-US" dirty="0"/>
+          </a:p>
+        </p:txBody>
+      </p:sp>
+      <p:sp>
+        <p:nvSpPr>
+          <p:cNvPr id="5" name="Text Placeholder 4"/>
+          <p:cNvSpPr>
+            <a:spLocks noGrp="1"/>
+          </p:cNvSpPr>
+          <p:nvPr>
+            <p:ph type="body" sz="quarter" idx="10"/>
+          </p:nvPr>
+        </p:nvSpPr>
+        <p:spPr/>
+        <p:txBody>
+          <a:bodyPr/>
+          <a:lstStyle/>
+          <a:p>
+            <a:endParaRPr lang="en-US"/>
+          </a:p>
+        </p:txBody>
+      </p:sp>
+      <p:sp>
+        <p:nvSpPr>
+          <p:cNvPr id="4" name="Slide Number Placeholder 3"/>
+          <p:cNvSpPr>
+            <a:spLocks noGrp="1"/>
+          </p:cNvSpPr>
+          <p:nvPr>
+            <p:ph type="sldNum" sz="quarter" idx="4294967295"/>
+          </p:nvPr>
+        </p:nvSpPr>
+        <p:spPr/>
+        <p:txBody>
+          <a:bodyPr/>
+          <a:lstStyle/>
+          <a:p>
+            <a:fld id="{4FAB73BC-B049-4115-A692-8D63A059BFB8}" type="slidenum">
+              <a:rPr lang="en-US" smtClean="0"/>
+              <a:t>71</a:t>
+            </a:fld>
+            <a:endParaRPr lang="en-US" dirty="0"/>
+          </a:p>
+        </p:txBody>
+      </p:sp>
+    </p:spTree>
+    <p:extLst>
+      <p:ext uri="{BB962C8B-B14F-4D97-AF65-F5344CB8AC3E}">
+        <p14:creationId xmlns:p14="http://schemas.microsoft.com/office/powerpoint/2010/main" val="2246816309"/>
+      </p:ext>
+    </p:extLst>
+  </p:cSld>
+  <p:clrMapOvr>
+    <a:masterClrMapping/>
+  </p:clrMapOvr>
+</p:sld>
+</file>
+
+<file path=ppt/slides/slide72.xml><?xml version="1.0" encoding="utf-8"?>
+<p:sld xmlns:a="http://schemas.openxmlformats.org/drawingml/2006/main" xmlns:r="http://schemas.openxmlformats.org/officeDocument/2006/relationships" xmlns:p="http://schemas.openxmlformats.org/presentationml/2006/main">
+  <p:cSld>
+    <p:spTree>
+      <p:nvGrpSpPr>
+        <p:cNvPr id="1" name=""/>
+        <p:cNvGrpSpPr/>
+        <p:nvPr/>
+      </p:nvGrpSpPr>
+      <p:grpSpPr>
+        <a:xfrm>
+          <a:off x="0" y="0"/>
+          <a:ext cx="0" cy="0"/>
+          <a:chOff x="0" y="0"/>
+          <a:chExt cx="0" cy="0"/>
+        </a:xfrm>
+      </p:grpSpPr>
+      <p:sp>
+        <p:nvSpPr>
+          <p:cNvPr id="2" name="Title 1"/>
+          <p:cNvSpPr>
+            <a:spLocks noGrp="1"/>
+          </p:cNvSpPr>
+          <p:nvPr>
+            <p:ph type="title"/>
+          </p:nvPr>
+        </p:nvSpPr>
+        <p:spPr/>
+        <p:txBody>
+          <a:bodyPr/>
+          <a:lstStyle/>
+          <a:p>
+            <a:r>
+              <a:rPr lang="en-US" dirty="0"/>
+              <a:t>Scheduling Workflows to Server (Discussed)</a:t>
+            </a:r>
+          </a:p>
+          <a:p>
+            <a:endParaRPr lang="en-US" dirty="0"/>
+          </a:p>
+        </p:txBody>
+      </p:sp>
+      <p:sp>
+        <p:nvSpPr>
+          <p:cNvPr id="5" name="Text Placeholder 4"/>
+          <p:cNvSpPr>
+            <a:spLocks noGrp="1"/>
+          </p:cNvSpPr>
+          <p:nvPr>
+            <p:ph type="body" sz="quarter" idx="10"/>
+          </p:nvPr>
+        </p:nvSpPr>
+        <p:spPr/>
+        <p:txBody>
+          <a:bodyPr/>
+          <a:lstStyle/>
+          <a:p>
+            <a:endParaRPr lang="en-US"/>
+          </a:p>
+        </p:txBody>
+      </p:sp>
+      <p:sp>
+        <p:nvSpPr>
+          <p:cNvPr id="4" name="Slide Number Placeholder 3"/>
+          <p:cNvSpPr>
+            <a:spLocks noGrp="1"/>
+          </p:cNvSpPr>
+          <p:nvPr>
+            <p:ph type="sldNum" sz="quarter" idx="4294967295"/>
+          </p:nvPr>
+        </p:nvSpPr>
+        <p:spPr/>
+        <p:txBody>
+          <a:bodyPr/>
+          <a:lstStyle/>
+          <a:p>
+            <a:fld id="{4FAB73BC-B049-4115-A692-8D63A059BFB8}" type="slidenum">
+              <a:rPr lang="en-US" smtClean="0"/>
+              <a:t>72</a:t>
+            </a:fld>
+            <a:endParaRPr lang="en-US" dirty="0"/>
+          </a:p>
+        </p:txBody>
+      </p:sp>
+    </p:spTree>
+    <p:extLst>
+      <p:ext uri="{BB962C8B-B14F-4D97-AF65-F5344CB8AC3E}">
+        <p14:creationId xmlns:p14="http://schemas.microsoft.com/office/powerpoint/2010/main" val="2531394161"/>
+      </p:ext>
+    </p:extLst>
+  </p:cSld>
+  <p:clrMapOvr>
+    <a:masterClrMapping/>
+  </p:clrMapOvr>
+</p:sld>
+</file>
+
+<file path=ppt/slides/slide73.xml><?xml version="1.0" encoding="utf-8"?>
+<p:sld xmlns:a="http://schemas.openxmlformats.org/drawingml/2006/main" xmlns:r="http://schemas.openxmlformats.org/officeDocument/2006/relationships" xmlns:p="http://schemas.openxmlformats.org/presentationml/2006/main">
+  <p:cSld>
+    <p:spTree>
+      <p:nvGrpSpPr>
+        <p:cNvPr id="1" name=""/>
+        <p:cNvGrpSpPr/>
+        <p:nvPr/>
+      </p:nvGrpSpPr>
+      <p:grpSpPr>
+        <a:xfrm>
+          <a:off x="0" y="0"/>
+          <a:ext cx="0" cy="0"/>
+          <a:chOff x="0" y="0"/>
+          <a:chExt cx="0" cy="0"/>
+        </a:xfrm>
+      </p:grpSpPr>
+      <p:sp>
+        <p:nvSpPr>
+          <p:cNvPr id="2" name="Subtitle 1"/>
+          <p:cNvSpPr>
+            <a:spLocks noGrp="1"/>
+          </p:cNvSpPr>
+          <p:nvPr>
+            <p:ph type="subTitle" idx="1"/>
+          </p:nvPr>
+        </p:nvSpPr>
+        <p:spPr/>
+        <p:txBody>
+          <a:bodyPr/>
+          <a:lstStyle/>
+          <a:p>
+            <a:endParaRPr lang="en-US"/>
+          </a:p>
+        </p:txBody>
+      </p:sp>
+      <p:sp>
+        <p:nvSpPr>
+          <p:cNvPr id="3" name="Text Placeholder 2"/>
+          <p:cNvSpPr>
+            <a:spLocks noGrp="1"/>
+          </p:cNvSpPr>
+          <p:nvPr>
+            <p:ph type="body" sz="quarter" idx="11"/>
+          </p:nvPr>
+        </p:nvSpPr>
+        <p:spPr/>
+        <p:txBody>
+          <a:bodyPr/>
+          <a:lstStyle/>
+          <a:p>
+            <a:endParaRPr lang="en-US"/>
+          </a:p>
+        </p:txBody>
+      </p:sp>
+      <p:sp>
+        <p:nvSpPr>
+          <p:cNvPr id="4" name="Title 3"/>
+          <p:cNvSpPr>
+            <a:spLocks noGrp="1"/>
+          </p:cNvSpPr>
+          <p:nvPr>
+            <p:ph type="title"/>
+          </p:nvPr>
+        </p:nvSpPr>
+        <p:spPr/>
+        <p:txBody>
+          <a:bodyPr/>
+          <a:lstStyle/>
+          <a:p>
+            <a:endParaRPr lang="en-US"/>
+          </a:p>
+        </p:txBody>
+      </p:sp>
+    </p:spTree>
+    <p:extLst>
+      <p:ext uri="{BB962C8B-B14F-4D97-AF65-F5344CB8AC3E}">
+        <p14:creationId xmlns:p14="http://schemas.microsoft.com/office/powerpoint/2010/main" val="3615799458"/>
+      </p:ext>
+    </p:extLst>
+  </p:cSld>
+  <p:clrMapOvr>
+    <a:masterClrMapping/>
+  </p:clrMapOvr>
+</p:sld>
+</file>
+
+<file path=ppt/slides/slide74.xml><?xml version="1.0" encoding="utf-8"?>
+<p:sld xmlns:a="http://schemas.openxmlformats.org/drawingml/2006/main" xmlns:r="http://schemas.openxmlformats.org/officeDocument/2006/relationships" xmlns:p="http://schemas.openxmlformats.org/presentationml/2006/main">
+  <p:cSld>
+    <p:spTree>
+      <p:nvGrpSpPr>
+        <p:cNvPr id="1" name=""/>
+        <p:cNvGrpSpPr/>
+        <p:nvPr/>
+      </p:nvGrpSpPr>
+      <p:grpSpPr>
+        <a:xfrm>
+          <a:off x="0" y="0"/>
+          <a:ext cx="0" cy="0"/>
+          <a:chOff x="0" y="0"/>
+          <a:chExt cx="0" cy="0"/>
+        </a:xfrm>
+      </p:grpSpPr>
+      <p:sp>
+        <p:nvSpPr>
+          <p:cNvPr id="2" name="Title 1"/>
+          <p:cNvSpPr>
+            <a:spLocks noGrp="1"/>
+          </p:cNvSpPr>
+          <p:nvPr>
+            <p:ph type="ctrTitle"/>
+          </p:nvPr>
+        </p:nvSpPr>
+        <p:spPr/>
+        <p:txBody>
+          <a:bodyPr/>
+          <a:lstStyle/>
+          <a:p>
+            <a:r>
+              <a:rPr lang="en-US" dirty="0"/>
+              <a:t>Thank you!</a:t>
+            </a:r>
+          </a:p>
+        </p:txBody>
+      </p:sp>
+      <p:sp>
+        <p:nvSpPr>
+          <p:cNvPr id="5" name="Subtitle 4"/>
+          <p:cNvSpPr>
+            <a:spLocks noGrp="1"/>
+          </p:cNvSpPr>
+          <p:nvPr>
+            <p:ph type="subTitle" idx="1"/>
+          </p:nvPr>
+        </p:nvSpPr>
+        <p:spPr/>
+        <p:txBody>
+          <a:bodyPr/>
+          <a:lstStyle/>
+          <a:p>
+            <a:r>
+              <a:rPr lang="en-US" dirty="0"/>
+              <a:t>Questions?</a:t>
+            </a:r>
+          </a:p>
+          <a:p>
+            <a:r>
+              <a:rPr lang="en-US" dirty="0"/>
+              <a:t>Survey: http://</a:t>
+            </a:r>
+            <a:r>
+              <a:rPr lang="en-US" dirty="0" err="1"/>
+              <a:t>www.onlc.com</a:t>
+            </a:r>
+            <a:r>
+              <a:rPr lang="en-US" dirty="0"/>
+              <a:t>/</a:t>
+            </a:r>
+            <a:r>
+              <a:rPr lang="en-US" dirty="0" err="1"/>
+              <a:t>eval</a:t>
+            </a:r>
+            <a:endParaRPr lang="en-US" dirty="0"/>
+          </a:p>
+        </p:txBody>
+      </p:sp>
+    </p:spTree>
+    <p:extLst>
+      <p:ext uri="{BB962C8B-B14F-4D97-AF65-F5344CB8AC3E}">
+        <p14:creationId xmlns:p14="http://schemas.microsoft.com/office/powerpoint/2010/main" val="1768650418"/>
       </p:ext>
     </p:extLst>
   </p:cSld>
@@ -11680,6 +13148,12 @@
 </file>
 
 <file path=customXml/item1.xml><?xml version="1.0" encoding="utf-8"?>
+<p:properties xmlns:p="http://schemas.microsoft.com/office/2006/metadata/properties" xmlns:xsi="http://www.w3.org/2001/XMLSchema-instance" xmlns:pc="http://schemas.microsoft.com/office/infopath/2007/PartnerControls">
+  <documentManagement/>
+</p:properties>
+</file>
+
+<file path=customXml/item2.xml><?xml version="1.0" encoding="utf-8"?>
 <ct:contentTypeSchema xmlns:ct="http://schemas.microsoft.com/office/2006/metadata/contentType" xmlns:ma="http://schemas.microsoft.com/office/2006/metadata/properties/metaAttributes" ct:_="" ma:_="" ma:contentTypeName="Document" ma:contentTypeID="0x010100DF17D0A5D2A94D41851BD81F437949EB" ma:contentTypeVersion="4" ma:contentTypeDescription="Create a new document." ma:contentTypeScope="" ma:versionID="86394c489d6ea242463219402424de30">
   <xsd:schema xmlns:xsd="http://www.w3.org/2001/XMLSchema" xmlns:xs="http://www.w3.org/2001/XMLSchema" xmlns:p="http://schemas.microsoft.com/office/2006/metadata/properties" xmlns:ns2="8ae4afce-818c-4ab4-8e35-377c82201c18" xmlns:ns3="6549f357-ea04-4fdc-a4ff-01e398dbae1f" targetNamespace="http://schemas.microsoft.com/office/2006/metadata/properties" ma:root="true" ma:fieldsID="fe252f9ea815bb7a68216b40880644e9" ns2:_="" ns3:_="">
     <xsd:import namespace="8ae4afce-818c-4ab4-8e35-377c82201c18"/>
@@ -11844,7 +13318,7 @@
 </ct:contentTypeSchema>
 </file>
 
-<file path=customXml/item2.xml><?xml version="1.0" encoding="utf-8"?>
+<file path=customXml/item3.xml><?xml version="1.0" encoding="utf-8"?>
 <?mso-contentType ?>
 <FormTemplates xmlns="http://schemas.microsoft.com/sharepoint/v3/contenttype/forms">
   <Display>DocumentLibraryForm</Display>
@@ -11853,13 +13327,24 @@
 </FormTemplates>
 </file>
 
-<file path=customXml/item3.xml><?xml version="1.0" encoding="utf-8"?>
-<p:properties xmlns:p="http://schemas.microsoft.com/office/2006/metadata/properties" xmlns:xsi="http://www.w3.org/2001/XMLSchema-instance" xmlns:pc="http://schemas.microsoft.com/office/infopath/2007/PartnerControls">
-  <documentManagement/>
-</p:properties>
+<file path=customXml/itemProps1.xml><?xml version="1.0" encoding="utf-8"?>
+<ds:datastoreItem xmlns:ds="http://schemas.openxmlformats.org/officeDocument/2006/customXml" ds:itemID="{FF9AC6B8-7021-4B23-A9AF-61295A177099}">
+  <ds:schemaRefs>
+    <ds:schemaRef ds:uri="http://schemas.microsoft.com/office/infopath/2007/PartnerControls"/>
+    <ds:schemaRef ds:uri="http://purl.org/dc/dcmitype/"/>
+    <ds:schemaRef ds:uri="http://schemas.microsoft.com/office/2006/metadata/properties"/>
+    <ds:schemaRef ds:uri="http://www.w3.org/XML/1998/namespace"/>
+    <ds:schemaRef ds:uri="http://schemas.microsoft.com/office/2006/documentManagement/types"/>
+    <ds:schemaRef ds:uri="6549f357-ea04-4fdc-a4ff-01e398dbae1f"/>
+    <ds:schemaRef ds:uri="http://schemas.openxmlformats.org/package/2006/metadata/core-properties"/>
+    <ds:schemaRef ds:uri="8ae4afce-818c-4ab4-8e35-377c82201c18"/>
+    <ds:schemaRef ds:uri="http://purl.org/dc/terms/"/>
+    <ds:schemaRef ds:uri="http://purl.org/dc/elements/1.1/"/>
+  </ds:schemaRefs>
+</ds:datastoreItem>
 </file>
 
-<file path=customXml/itemProps1.xml><?xml version="1.0" encoding="utf-8"?>
+<file path=customXml/itemProps2.xml><?xml version="1.0" encoding="utf-8"?>
 <ds:datastoreItem xmlns:ds="http://schemas.openxmlformats.org/officeDocument/2006/customXml" ds:itemID="{5E59C5BB-F795-4F02-AFC2-70EF9316FDF1}">
   <ds:schemaRefs>
     <ds:schemaRef ds:uri="http://schemas.microsoft.com/office/2006/metadata/contentType"/>
@@ -11878,27 +13363,10 @@
 </ds:datastoreItem>
 </file>
 
-<file path=customXml/itemProps2.xml><?xml version="1.0" encoding="utf-8"?>
+<file path=customXml/itemProps3.xml><?xml version="1.0" encoding="utf-8"?>
 <ds:datastoreItem xmlns:ds="http://schemas.openxmlformats.org/officeDocument/2006/customXml" ds:itemID="{7FBE9ADF-F1D8-4E9F-83D5-C6625824914C}">
   <ds:schemaRefs>
     <ds:schemaRef ds:uri="http://schemas.microsoft.com/sharepoint/v3/contenttype/forms"/>
   </ds:schemaRefs>
 </ds:datastoreItem>
-</file>
-
-<file path=customXml/itemProps3.xml><?xml version="1.0" encoding="utf-8"?>
-<ds:datastoreItem xmlns:ds="http://schemas.openxmlformats.org/officeDocument/2006/customXml" ds:itemID="{FF9AC6B8-7021-4B23-A9AF-61295A177099}">
-  <ds:schemaRefs>
-    <ds:schemaRef ds:uri="http://schemas.microsoft.com/office/infopath/2007/PartnerControls"/>
-    <ds:schemaRef ds:uri="http://purl.org/dc/dcmitype/"/>
-    <ds:schemaRef ds:uri="http://schemas.microsoft.com/office/2006/metadata/properties"/>
-    <ds:schemaRef ds:uri="http://www.w3.org/XML/1998/namespace"/>
-    <ds:schemaRef ds:uri="http://schemas.microsoft.com/office/2006/documentManagement/types"/>
-    <ds:schemaRef ds:uri="6549f357-ea04-4fdc-a4ff-01e398dbae1f"/>
-    <ds:schemaRef ds:uri="http://schemas.openxmlformats.org/package/2006/metadata/core-properties"/>
-    <ds:schemaRef ds:uri="8ae4afce-818c-4ab4-8e35-377c82201c18"/>
-    <ds:schemaRef ds:uri="http://purl.org/dc/terms/"/>
-    <ds:schemaRef ds:uri="http://purl.org/dc/elements/1.1/"/>
-  </ds:schemaRefs>
-</ds:datastoreItem>
 </file>
</xml_diff>

<commit_message>
Updated ppt & .gitignore
</commit_message>
<xml_diff>
--- a/ppt/TableauPrepBuilderIntroV1_1.pptx
+++ b/ppt/TableauPrepBuilderIntroV1_1.pptx
@@ -27,63 +27,63 @@
     <p:sldId id="420" r:id="rId18"/>
     <p:sldId id="421" r:id="rId19"/>
     <p:sldId id="447" r:id="rId20"/>
-    <p:sldId id="422" r:id="rId21"/>
-    <p:sldId id="426" r:id="rId22"/>
-    <p:sldId id="423" r:id="rId23"/>
-    <p:sldId id="424" r:id="rId24"/>
-    <p:sldId id="425" r:id="rId25"/>
-    <p:sldId id="427" r:id="rId26"/>
-    <p:sldId id="428" r:id="rId27"/>
-    <p:sldId id="429" r:id="rId28"/>
-    <p:sldId id="430" r:id="rId29"/>
-    <p:sldId id="431" r:id="rId30"/>
-    <p:sldId id="432" r:id="rId31"/>
-    <p:sldId id="452" r:id="rId32"/>
-    <p:sldId id="433" r:id="rId33"/>
-    <p:sldId id="446" r:id="rId34"/>
-    <p:sldId id="448" r:id="rId35"/>
-    <p:sldId id="449" r:id="rId36"/>
-    <p:sldId id="450" r:id="rId37"/>
-    <p:sldId id="451" r:id="rId38"/>
-    <p:sldId id="453" r:id="rId39"/>
-    <p:sldId id="454" r:id="rId40"/>
-    <p:sldId id="455" r:id="rId41"/>
-    <p:sldId id="456" r:id="rId42"/>
-    <p:sldId id="457" r:id="rId43"/>
-    <p:sldId id="458" r:id="rId44"/>
-    <p:sldId id="459" r:id="rId45"/>
-    <p:sldId id="460" r:id="rId46"/>
-    <p:sldId id="461" r:id="rId47"/>
-    <p:sldId id="462" r:id="rId48"/>
-    <p:sldId id="463" r:id="rId49"/>
-    <p:sldId id="464" r:id="rId50"/>
-    <p:sldId id="465" r:id="rId51"/>
-    <p:sldId id="466" r:id="rId52"/>
-    <p:sldId id="467" r:id="rId53"/>
-    <p:sldId id="468" r:id="rId54"/>
-    <p:sldId id="469" r:id="rId55"/>
-    <p:sldId id="470" r:id="rId56"/>
-    <p:sldId id="471" r:id="rId57"/>
-    <p:sldId id="472" r:id="rId58"/>
-    <p:sldId id="473" r:id="rId59"/>
-    <p:sldId id="474" r:id="rId60"/>
-    <p:sldId id="475" r:id="rId61"/>
-    <p:sldId id="476" r:id="rId62"/>
-    <p:sldId id="477" r:id="rId63"/>
-    <p:sldId id="478" r:id="rId64"/>
-    <p:sldId id="479" r:id="rId65"/>
-    <p:sldId id="480" r:id="rId66"/>
-    <p:sldId id="481" r:id="rId67"/>
-    <p:sldId id="482" r:id="rId68"/>
-    <p:sldId id="483" r:id="rId69"/>
-    <p:sldId id="484" r:id="rId70"/>
-    <p:sldId id="485" r:id="rId71"/>
-    <p:sldId id="486" r:id="rId72"/>
-    <p:sldId id="487" r:id="rId73"/>
-    <p:sldId id="488" r:id="rId74"/>
-    <p:sldId id="489" r:id="rId75"/>
-    <p:sldId id="490" r:id="rId76"/>
-    <p:sldId id="381" r:id="rId77"/>
+    <p:sldId id="492" r:id="rId21"/>
+    <p:sldId id="422" r:id="rId22"/>
+    <p:sldId id="426" r:id="rId23"/>
+    <p:sldId id="423" r:id="rId24"/>
+    <p:sldId id="424" r:id="rId25"/>
+    <p:sldId id="425" r:id="rId26"/>
+    <p:sldId id="427" r:id="rId27"/>
+    <p:sldId id="428" r:id="rId28"/>
+    <p:sldId id="429" r:id="rId29"/>
+    <p:sldId id="430" r:id="rId30"/>
+    <p:sldId id="431" r:id="rId31"/>
+    <p:sldId id="432" r:id="rId32"/>
+    <p:sldId id="452" r:id="rId33"/>
+    <p:sldId id="433" r:id="rId34"/>
+    <p:sldId id="446" r:id="rId35"/>
+    <p:sldId id="448" r:id="rId36"/>
+    <p:sldId id="449" r:id="rId37"/>
+    <p:sldId id="450" r:id="rId38"/>
+    <p:sldId id="451" r:id="rId39"/>
+    <p:sldId id="453" r:id="rId40"/>
+    <p:sldId id="454" r:id="rId41"/>
+    <p:sldId id="455" r:id="rId42"/>
+    <p:sldId id="456" r:id="rId43"/>
+    <p:sldId id="457" r:id="rId44"/>
+    <p:sldId id="458" r:id="rId45"/>
+    <p:sldId id="459" r:id="rId46"/>
+    <p:sldId id="460" r:id="rId47"/>
+    <p:sldId id="461" r:id="rId48"/>
+    <p:sldId id="462" r:id="rId49"/>
+    <p:sldId id="463" r:id="rId50"/>
+    <p:sldId id="464" r:id="rId51"/>
+    <p:sldId id="465" r:id="rId52"/>
+    <p:sldId id="466" r:id="rId53"/>
+    <p:sldId id="467" r:id="rId54"/>
+    <p:sldId id="468" r:id="rId55"/>
+    <p:sldId id="469" r:id="rId56"/>
+    <p:sldId id="470" r:id="rId57"/>
+    <p:sldId id="471" r:id="rId58"/>
+    <p:sldId id="472" r:id="rId59"/>
+    <p:sldId id="473" r:id="rId60"/>
+    <p:sldId id="474" r:id="rId61"/>
+    <p:sldId id="475" r:id="rId62"/>
+    <p:sldId id="476" r:id="rId63"/>
+    <p:sldId id="477" r:id="rId64"/>
+    <p:sldId id="478" r:id="rId65"/>
+    <p:sldId id="479" r:id="rId66"/>
+    <p:sldId id="480" r:id="rId67"/>
+    <p:sldId id="481" r:id="rId68"/>
+    <p:sldId id="482" r:id="rId69"/>
+    <p:sldId id="483" r:id="rId70"/>
+    <p:sldId id="484" r:id="rId71"/>
+    <p:sldId id="485" r:id="rId72"/>
+    <p:sldId id="486" r:id="rId73"/>
+    <p:sldId id="487" r:id="rId74"/>
+    <p:sldId id="488" r:id="rId75"/>
+    <p:sldId id="489" r:id="rId76"/>
+    <p:sldId id="490" r:id="rId77"/>
     <p:sldId id="382" r:id="rId78"/>
     <p:sldId id="384" r:id="rId79"/>
     <p:sldId id="385" r:id="rId80"/>
@@ -246,6 +246,7 @@
         <p14:section name="Module 2: Connecting to Data" id="{19225261-5257-6949-A057-E085F2EAB919}">
           <p14:sldIdLst>
             <p14:sldId id="447"/>
+            <p14:sldId id="492"/>
             <p14:sldId id="422"/>
             <p14:sldId id="426"/>
             <p14:sldId id="423"/>
@@ -268,6 +269,10 @@
             <p14:sldId id="449"/>
             <p14:sldId id="450"/>
             <p14:sldId id="451"/>
+          </p14:sldIdLst>
+        </p14:section>
+        <p14:section name="Module 4: Joins" id="{07993798-6FD1-874A-AA23-ACA4277D161E}">
+          <p14:sldIdLst>
             <p14:sldId id="453"/>
             <p14:sldId id="454"/>
             <p14:sldId id="455"/>
@@ -281,6 +286,10 @@
             <p14:sldId id="463"/>
             <p14:sldId id="464"/>
             <p14:sldId id="465"/>
+          </p14:sldIdLst>
+        </p14:section>
+        <p14:section name="Module 5: Auditing &amp; Cleaning" id="{1BF98B12-6C3E-CE45-BB0A-8F1232F299D9}">
+          <p14:sldIdLst>
             <p14:sldId id="466"/>
             <p14:sldId id="467"/>
             <p14:sldId id="468"/>
@@ -291,29 +300,44 @@
             <p14:sldId id="473"/>
             <p14:sldId id="474"/>
             <p14:sldId id="475"/>
+          </p14:sldIdLst>
+        </p14:section>
+        <p14:section name="Module 6: Group and Replace" id="{983B8C1D-7380-2B4F-95FC-27AA743F4022}">
+          <p14:sldIdLst>
             <p14:sldId id="476"/>
             <p14:sldId id="477"/>
             <p14:sldId id="478"/>
             <p14:sldId id="479"/>
             <p14:sldId id="480"/>
             <p14:sldId id="481"/>
+          </p14:sldIdLst>
+        </p14:section>
+        <p14:section name="Module 7: Aggregating &amp; Pivoting Data" id="{0543B30F-16F3-BA42-B592-69FBA19F9C2C}">
+          <p14:sldIdLst>
             <p14:sldId id="482"/>
             <p14:sldId id="483"/>
             <p14:sldId id="484"/>
             <p14:sldId id="485"/>
+          </p14:sldIdLst>
+        </p14:section>
+        <p14:section name="Module 8: Output" id="{0466654E-BA6F-3742-B5A2-D2B9C1B39689}">
+          <p14:sldIdLst>
             <p14:sldId id="486"/>
             <p14:sldId id="487"/>
             <p14:sldId id="488"/>
             <p14:sldId id="489"/>
-            <p14:sldId id="490"/>
           </p14:sldIdLst>
         </p14:section>
-        <p14:section name="Module 7: Tableau Prep Builder Conductor" id="{A03F1157-B246-4852-A53A-4CEC99584E0B}">
+        <p14:section name="Module 9: Tableau Prep Builder Conductor" id="{A03F1157-B246-4852-A53A-4CEC99584E0B}">
           <p14:sldIdLst>
-            <p14:sldId id="381"/>
+            <p14:sldId id="490"/>
             <p14:sldId id="382"/>
             <p14:sldId id="384"/>
             <p14:sldId id="385"/>
+          </p14:sldIdLst>
+        </p14:section>
+        <p14:section name="Appendix: Preparing Data In Tableau" id="{F4494685-5EB9-C64C-B54A-24D4DA38DC63}">
+          <p14:sldIdLst>
             <p14:sldId id="491"/>
           </p14:sldIdLst>
         </p14:section>
@@ -1184,7 +1208,7 @@
               <a:pPr>
                 <a:defRPr/>
               </a:pPr>
-              <a:t>30</a:t>
+              <a:t>31</a:t>
             </a:fld>
             <a:endParaRPr lang="en-US"/>
           </a:p>
@@ -1274,7 +1298,7 @@
               <a:pPr>
                 <a:defRPr/>
               </a:pPr>
-              <a:t>31</a:t>
+              <a:t>32</a:t>
             </a:fld>
             <a:endParaRPr lang="en-US"/>
           </a:p>
@@ -1364,7 +1388,7 @@
               <a:pPr>
                 <a:defRPr/>
               </a:pPr>
-              <a:t>32</a:t>
+              <a:t>33</a:t>
             </a:fld>
             <a:endParaRPr lang="en-US"/>
           </a:p>
@@ -1454,7 +1478,7 @@
               <a:pPr>
                 <a:defRPr/>
               </a:pPr>
-              <a:t>33</a:t>
+              <a:t>34</a:t>
             </a:fld>
             <a:endParaRPr lang="en-US"/>
           </a:p>
@@ -1544,7 +1568,7 @@
               <a:pPr>
                 <a:defRPr/>
               </a:pPr>
-              <a:t>34</a:t>
+              <a:t>35</a:t>
             </a:fld>
             <a:endParaRPr lang="en-US"/>
           </a:p>
@@ -1634,7 +1658,7 @@
               <a:pPr>
                 <a:defRPr/>
               </a:pPr>
-              <a:t>35</a:t>
+              <a:t>36</a:t>
             </a:fld>
             <a:endParaRPr lang="en-US"/>
           </a:p>
@@ -1724,7 +1748,7 @@
               <a:pPr>
                 <a:defRPr/>
               </a:pPr>
-              <a:t>36</a:t>
+              <a:t>37</a:t>
             </a:fld>
             <a:endParaRPr lang="en-US"/>
           </a:p>
@@ -1814,7 +1838,7 @@
               <a:pPr>
                 <a:defRPr/>
               </a:pPr>
-              <a:t>37</a:t>
+              <a:t>38</a:t>
             </a:fld>
             <a:endParaRPr lang="en-US"/>
           </a:p>
@@ -1904,7 +1928,7 @@
               <a:pPr>
                 <a:defRPr/>
               </a:pPr>
-              <a:t>38</a:t>
+              <a:t>39</a:t>
             </a:fld>
             <a:endParaRPr lang="en-US"/>
           </a:p>
@@ -1994,7 +2018,7 @@
               <a:pPr>
                 <a:defRPr/>
               </a:pPr>
-              <a:t>39</a:t>
+              <a:t>40</a:t>
             </a:fld>
             <a:endParaRPr lang="en-US"/>
           </a:p>
@@ -2266,7 +2290,7 @@
               <a:pPr>
                 <a:defRPr/>
               </a:pPr>
-              <a:t>40</a:t>
+              <a:t>41</a:t>
             </a:fld>
             <a:endParaRPr lang="en-US"/>
           </a:p>
@@ -2356,7 +2380,7 @@
               <a:pPr>
                 <a:defRPr/>
               </a:pPr>
-              <a:t>41</a:t>
+              <a:t>42</a:t>
             </a:fld>
             <a:endParaRPr lang="en-US"/>
           </a:p>
@@ -2446,7 +2470,7 @@
               <a:pPr>
                 <a:defRPr/>
               </a:pPr>
-              <a:t>42</a:t>
+              <a:t>43</a:t>
             </a:fld>
             <a:endParaRPr lang="en-US"/>
           </a:p>
@@ -2536,7 +2560,7 @@
               <a:pPr>
                 <a:defRPr/>
               </a:pPr>
-              <a:t>43</a:t>
+              <a:t>44</a:t>
             </a:fld>
             <a:endParaRPr lang="en-US"/>
           </a:p>
@@ -2626,7 +2650,7 @@
               <a:pPr>
                 <a:defRPr/>
               </a:pPr>
-              <a:t>44</a:t>
+              <a:t>45</a:t>
             </a:fld>
             <a:endParaRPr lang="en-US"/>
           </a:p>
@@ -2716,7 +2740,7 @@
               <a:pPr>
                 <a:defRPr/>
               </a:pPr>
-              <a:t>45</a:t>
+              <a:t>46</a:t>
             </a:fld>
             <a:endParaRPr lang="en-US"/>
           </a:p>
@@ -2806,7 +2830,7 @@
               <a:pPr>
                 <a:defRPr/>
               </a:pPr>
-              <a:t>46</a:t>
+              <a:t>47</a:t>
             </a:fld>
             <a:endParaRPr lang="en-US"/>
           </a:p>
@@ -2896,7 +2920,7 @@
               <a:pPr>
                 <a:defRPr/>
               </a:pPr>
-              <a:t>47</a:t>
+              <a:t>48</a:t>
             </a:fld>
             <a:endParaRPr lang="en-US"/>
           </a:p>
@@ -2986,7 +3010,7 @@
               <a:pPr>
                 <a:defRPr/>
               </a:pPr>
-              <a:t>48</a:t>
+              <a:t>49</a:t>
             </a:fld>
             <a:endParaRPr lang="en-US"/>
           </a:p>
@@ -3076,7 +3100,7 @@
               <a:pPr>
                 <a:defRPr/>
               </a:pPr>
-              <a:t>49</a:t>
+              <a:t>50</a:t>
             </a:fld>
             <a:endParaRPr lang="en-US"/>
           </a:p>
@@ -3367,7 +3391,7 @@
               <a:pPr>
                 <a:defRPr/>
               </a:pPr>
-              <a:t>50</a:t>
+              <a:t>51</a:t>
             </a:fld>
             <a:endParaRPr lang="en-US"/>
           </a:p>
@@ -3457,7 +3481,7 @@
               <a:pPr>
                 <a:defRPr/>
               </a:pPr>
-              <a:t>51</a:t>
+              <a:t>52</a:t>
             </a:fld>
             <a:endParaRPr lang="en-US"/>
           </a:p>
@@ -3547,7 +3571,7 @@
               <a:pPr>
                 <a:defRPr/>
               </a:pPr>
-              <a:t>52</a:t>
+              <a:t>53</a:t>
             </a:fld>
             <a:endParaRPr lang="en-US"/>
           </a:p>
@@ -3637,7 +3661,7 @@
               <a:pPr>
                 <a:defRPr/>
               </a:pPr>
-              <a:t>53</a:t>
+              <a:t>54</a:t>
             </a:fld>
             <a:endParaRPr lang="en-US"/>
           </a:p>
@@ -3727,7 +3751,7 @@
               <a:pPr>
                 <a:defRPr/>
               </a:pPr>
-              <a:t>54</a:t>
+              <a:t>55</a:t>
             </a:fld>
             <a:endParaRPr lang="en-US"/>
           </a:p>
@@ -3817,7 +3841,7 @@
               <a:pPr>
                 <a:defRPr/>
               </a:pPr>
-              <a:t>55</a:t>
+              <a:t>56</a:t>
             </a:fld>
             <a:endParaRPr lang="en-US"/>
           </a:p>
@@ -3907,7 +3931,7 @@
               <a:pPr>
                 <a:defRPr/>
               </a:pPr>
-              <a:t>56</a:t>
+              <a:t>57</a:t>
             </a:fld>
             <a:endParaRPr lang="en-US"/>
           </a:p>
@@ -3997,7 +4021,7 @@
               <a:pPr>
                 <a:defRPr/>
               </a:pPr>
-              <a:t>57</a:t>
+              <a:t>58</a:t>
             </a:fld>
             <a:endParaRPr lang="en-US"/>
           </a:p>
@@ -4087,7 +4111,7 @@
               <a:pPr>
                 <a:defRPr/>
               </a:pPr>
-              <a:t>58</a:t>
+              <a:t>59</a:t>
             </a:fld>
             <a:endParaRPr lang="en-US"/>
           </a:p>
@@ -4177,7 +4201,7 @@
               <a:pPr>
                 <a:defRPr/>
               </a:pPr>
-              <a:t>59</a:t>
+              <a:t>60</a:t>
             </a:fld>
             <a:endParaRPr lang="en-US"/>
           </a:p>
@@ -4357,7 +4381,7 @@
               <a:pPr>
                 <a:defRPr/>
               </a:pPr>
-              <a:t>60</a:t>
+              <a:t>61</a:t>
             </a:fld>
             <a:endParaRPr lang="en-US"/>
           </a:p>
@@ -4447,7 +4471,7 @@
               <a:pPr>
                 <a:defRPr/>
               </a:pPr>
-              <a:t>61</a:t>
+              <a:t>62</a:t>
             </a:fld>
             <a:endParaRPr lang="en-US"/>
           </a:p>
@@ -4537,7 +4561,7 @@
               <a:pPr>
                 <a:defRPr/>
               </a:pPr>
-              <a:t>62</a:t>
+              <a:t>63</a:t>
             </a:fld>
             <a:endParaRPr lang="en-US"/>
           </a:p>
@@ -4627,7 +4651,7 @@
               <a:pPr>
                 <a:defRPr/>
               </a:pPr>
-              <a:t>63</a:t>
+              <a:t>64</a:t>
             </a:fld>
             <a:endParaRPr lang="en-US"/>
           </a:p>
@@ -4717,7 +4741,7 @@
               <a:pPr>
                 <a:defRPr/>
               </a:pPr>
-              <a:t>64</a:t>
+              <a:t>65</a:t>
             </a:fld>
             <a:endParaRPr lang="en-US"/>
           </a:p>
@@ -4807,7 +4831,7 @@
               <a:pPr>
                 <a:defRPr/>
               </a:pPr>
-              <a:t>65</a:t>
+              <a:t>66</a:t>
             </a:fld>
             <a:endParaRPr lang="en-US"/>
           </a:p>
@@ -4897,7 +4921,7 @@
               <a:pPr>
                 <a:defRPr/>
               </a:pPr>
-              <a:t>66</a:t>
+              <a:t>67</a:t>
             </a:fld>
             <a:endParaRPr lang="en-US"/>
           </a:p>
@@ -4987,7 +5011,7 @@
               <a:pPr>
                 <a:defRPr/>
               </a:pPr>
-              <a:t>67</a:t>
+              <a:t>68</a:t>
             </a:fld>
             <a:endParaRPr lang="en-US"/>
           </a:p>
@@ -5077,7 +5101,7 @@
               <a:pPr>
                 <a:defRPr/>
               </a:pPr>
-              <a:t>68</a:t>
+              <a:t>69</a:t>
             </a:fld>
             <a:endParaRPr lang="en-US"/>
           </a:p>
@@ -5167,7 +5191,7 @@
               <a:pPr>
                 <a:defRPr/>
               </a:pPr>
-              <a:t>69</a:t>
+              <a:t>70</a:t>
             </a:fld>
             <a:endParaRPr lang="en-US"/>
           </a:p>
@@ -5347,7 +5371,7 @@
               <a:pPr>
                 <a:defRPr/>
               </a:pPr>
-              <a:t>70</a:t>
+              <a:t>71</a:t>
             </a:fld>
             <a:endParaRPr lang="en-US"/>
           </a:p>
@@ -5437,7 +5461,7 @@
               <a:pPr>
                 <a:defRPr/>
               </a:pPr>
-              <a:t>71</a:t>
+              <a:t>72</a:t>
             </a:fld>
             <a:endParaRPr lang="en-US"/>
           </a:p>
@@ -5527,7 +5551,7 @@
               <a:pPr>
                 <a:defRPr/>
               </a:pPr>
-              <a:t>72</a:t>
+              <a:t>73</a:t>
             </a:fld>
             <a:endParaRPr lang="en-US"/>
           </a:p>
@@ -5617,7 +5641,7 @@
               <a:pPr>
                 <a:defRPr/>
               </a:pPr>
-              <a:t>73</a:t>
+              <a:t>74</a:t>
             </a:fld>
             <a:endParaRPr lang="en-US"/>
           </a:p>
@@ -5626,7 +5650,7 @@
     </p:spTree>
     <p:extLst>
       <p:ext uri="{BB962C8B-B14F-4D97-AF65-F5344CB8AC3E}">
-        <p14:creationId xmlns:p14="http://schemas.microsoft.com/office/powerpoint/2010/main" val="3685360639"/>
+        <p14:creationId xmlns:p14="http://schemas.microsoft.com/office/powerpoint/2010/main" val="3916772145"/>
       </p:ext>
     </p:extLst>
   </p:cSld>
@@ -5707,7 +5731,7 @@
               <a:pPr>
                 <a:defRPr/>
               </a:pPr>
-              <a:t>74</a:t>
+              <a:t>75</a:t>
             </a:fld>
             <a:endParaRPr lang="en-US"/>
           </a:p>
@@ -5716,7 +5740,7 @@
     </p:spTree>
     <p:extLst>
       <p:ext uri="{BB962C8B-B14F-4D97-AF65-F5344CB8AC3E}">
-        <p14:creationId xmlns:p14="http://schemas.microsoft.com/office/powerpoint/2010/main" val="3916772145"/>
+        <p14:creationId xmlns:p14="http://schemas.microsoft.com/office/powerpoint/2010/main" val="3016050643"/>
       </p:ext>
     </p:extLst>
   </p:cSld>
@@ -5797,7 +5821,7 @@
               <a:pPr>
                 <a:defRPr/>
               </a:pPr>
-              <a:t>75</a:t>
+              <a:t>76</a:t>
             </a:fld>
             <a:endParaRPr lang="en-US"/>
           </a:p>
@@ -5806,7 +5830,7 @@
     </p:spTree>
     <p:extLst>
       <p:ext uri="{BB962C8B-B14F-4D97-AF65-F5344CB8AC3E}">
-        <p14:creationId xmlns:p14="http://schemas.microsoft.com/office/powerpoint/2010/main" val="3016050643"/>
+        <p14:creationId xmlns:p14="http://schemas.microsoft.com/office/powerpoint/2010/main" val="1940669753"/>
       </p:ext>
     </p:extLst>
   </p:cSld>
@@ -5887,96 +5911,6 @@
               <a:pPr>
                 <a:defRPr/>
               </a:pPr>
-              <a:t>76</a:t>
-            </a:fld>
-            <a:endParaRPr lang="en-US"/>
-          </a:p>
-        </p:txBody>
-      </p:sp>
-    </p:spTree>
-    <p:extLst>
-      <p:ext uri="{BB962C8B-B14F-4D97-AF65-F5344CB8AC3E}">
-        <p14:creationId xmlns:p14="http://schemas.microsoft.com/office/powerpoint/2010/main" val="1940669753"/>
-      </p:ext>
-    </p:extLst>
-  </p:cSld>
-  <p:clrMapOvr>
-    <a:masterClrMapping/>
-  </p:clrMapOvr>
-</p:notes>
-</file>
-
-<file path=ppt/notesSlides/notesSlide57.xml><?xml version="1.0" encoding="utf-8"?>
-<p:notes xmlns:a="http://schemas.openxmlformats.org/drawingml/2006/main" xmlns:r="http://schemas.openxmlformats.org/officeDocument/2006/relationships" xmlns:p="http://schemas.openxmlformats.org/presentationml/2006/main">
-  <p:cSld>
-    <p:spTree>
-      <p:nvGrpSpPr>
-        <p:cNvPr id="1" name=""/>
-        <p:cNvGrpSpPr/>
-        <p:nvPr/>
-      </p:nvGrpSpPr>
-      <p:grpSpPr>
-        <a:xfrm>
-          <a:off x="0" y="0"/>
-          <a:ext cx="0" cy="0"/>
-          <a:chOff x="0" y="0"/>
-          <a:chExt cx="0" cy="0"/>
-        </a:xfrm>
-      </p:grpSpPr>
-      <p:sp>
-        <p:nvSpPr>
-          <p:cNvPr id="2" name="Slide Image Placeholder 1"/>
-          <p:cNvSpPr>
-            <a:spLocks noGrp="1" noRot="1" noChangeAspect="1"/>
-          </p:cNvSpPr>
-          <p:nvPr>
-            <p:ph type="sldImg"/>
-          </p:nvPr>
-        </p:nvSpPr>
-        <p:spPr/>
-      </p:sp>
-      <p:sp>
-        <p:nvSpPr>
-          <p:cNvPr id="3" name="Notes Placeholder 2"/>
-          <p:cNvSpPr>
-            <a:spLocks noGrp="1"/>
-          </p:cNvSpPr>
-          <p:nvPr>
-            <p:ph type="body" idx="1"/>
-          </p:nvPr>
-        </p:nvSpPr>
-        <p:spPr/>
-        <p:txBody>
-          <a:bodyPr/>
-          <a:lstStyle/>
-          <a:p>
-            <a:endParaRPr lang="en-US"/>
-          </a:p>
-        </p:txBody>
-      </p:sp>
-      <p:sp>
-        <p:nvSpPr>
-          <p:cNvPr id="4" name="Slide Number Placeholder 3"/>
-          <p:cNvSpPr>
-            <a:spLocks noGrp="1"/>
-          </p:cNvSpPr>
-          <p:nvPr>
-            <p:ph type="sldNum" sz="quarter" idx="5"/>
-          </p:nvPr>
-        </p:nvSpPr>
-        <p:spPr/>
-        <p:txBody>
-          <a:bodyPr/>
-          <a:lstStyle/>
-          <a:p>
-            <a:pPr>
-              <a:defRPr/>
-            </a:pPr>
-            <a:fld id="{673C55C6-0635-4FFD-BEAC-5E6F89DDB24B}" type="slidenum">
-              <a:rPr lang="en-US" smtClean="0"/>
-              <a:pPr>
-                <a:defRPr/>
-              </a:pPr>
               <a:t>77</a:t>
             </a:fld>
             <a:endParaRPr lang="en-US"/>
@@ -5996,7 +5930,7 @@
 </p:notes>
 </file>
 
-<file path=ppt/notesSlides/notesSlide58.xml><?xml version="1.0" encoding="utf-8"?>
+<file path=ppt/notesSlides/notesSlide57.xml><?xml version="1.0" encoding="utf-8"?>
 <p:notes xmlns:a="http://schemas.openxmlformats.org/drawingml/2006/main" xmlns:r="http://schemas.openxmlformats.org/officeDocument/2006/relationships" xmlns:p="http://schemas.openxmlformats.org/presentationml/2006/main">
   <p:cSld>
     <p:spTree>
@@ -6157,7 +6091,7 @@
               <a:pPr>
                 <a:defRPr/>
               </a:pPr>
-              <a:t>17</a:t>
+              <a:t>18</a:t>
             </a:fld>
             <a:endParaRPr lang="en-US"/>
           </a:p>
@@ -6247,7 +6181,7 @@
               <a:pPr>
                 <a:defRPr/>
               </a:pPr>
-              <a:t>27</a:t>
+              <a:t>28</a:t>
             </a:fld>
             <a:endParaRPr lang="en-US"/>
           </a:p>
@@ -6337,7 +6271,7 @@
               <a:pPr>
                 <a:defRPr/>
               </a:pPr>
-              <a:t>28</a:t>
+              <a:t>29</a:t>
             </a:fld>
             <a:endParaRPr lang="en-US"/>
           </a:p>
@@ -6427,7 +6361,7 @@
               <a:pPr>
                 <a:defRPr/>
               </a:pPr>
-              <a:t>29</a:t>
+              <a:t>30</a:t>
             </a:fld>
             <a:endParaRPr lang="en-US"/>
           </a:p>
@@ -9125,7 +9059,7 @@
           <a:p>
             <a:r>
               <a:rPr lang="en-US" dirty="0"/>
-              <a:t>ETL</a:t>
+              <a:t>Module 1: ETL &amp; Demo Data</a:t>
             </a:r>
           </a:p>
         </p:txBody>
@@ -9678,31 +9612,6 @@
           </a:p>
         </p:txBody>
       </p:sp>
-      <p:sp>
-        <p:nvSpPr>
-          <p:cNvPr id="3" name="Text Placeholder 2">
-            <a:extLst>
-              <a:ext uri="{FF2B5EF4-FFF2-40B4-BE49-F238E27FC236}">
-                <a16:creationId xmlns:a16="http://schemas.microsoft.com/office/drawing/2014/main" id="{2C338366-4CD9-0C4B-B9C8-7B5068AEDA0B}"/>
-              </a:ext>
-            </a:extLst>
-          </p:cNvPr>
-          <p:cNvSpPr>
-            <a:spLocks noGrp="1"/>
-          </p:cNvSpPr>
-          <p:nvPr>
-            <p:ph type="body" sz="quarter" idx="10"/>
-          </p:nvPr>
-        </p:nvSpPr>
-        <p:spPr/>
-        <p:txBody>
-          <a:bodyPr/>
-          <a:lstStyle/>
-          <a:p>
-            <a:endParaRPr lang="en-US"/>
-          </a:p>
-        </p:txBody>
-      </p:sp>
     </p:spTree>
     <p:extLst>
       <p:ext uri="{BB962C8B-B14F-4D97-AF65-F5344CB8AC3E}">
@@ -9717,6 +9626,64 @@
 </file>
 
 <file path=ppt/slides/slide17.xml><?xml version="1.0" encoding="utf-8"?>
+<p:sld xmlns:a="http://schemas.openxmlformats.org/drawingml/2006/main" xmlns:r="http://schemas.openxmlformats.org/officeDocument/2006/relationships" xmlns:p="http://schemas.openxmlformats.org/presentationml/2006/main">
+  <p:cSld>
+    <p:spTree>
+      <p:nvGrpSpPr>
+        <p:cNvPr id="1" name=""/>
+        <p:cNvGrpSpPr/>
+        <p:nvPr/>
+      </p:nvGrpSpPr>
+      <p:grpSpPr>
+        <a:xfrm>
+          <a:off x="0" y="0"/>
+          <a:ext cx="0" cy="0"/>
+          <a:chOff x="0" y="0"/>
+          <a:chExt cx="0" cy="0"/>
+        </a:xfrm>
+      </p:grpSpPr>
+      <p:sp>
+        <p:nvSpPr>
+          <p:cNvPr id="2" name="Title 1">
+            <a:extLst>
+              <a:ext uri="{FF2B5EF4-FFF2-40B4-BE49-F238E27FC236}">
+                <a16:creationId xmlns:a16="http://schemas.microsoft.com/office/drawing/2014/main" id="{992CB1AB-C077-6F4D-9364-4D6903E3E3E6}"/>
+              </a:ext>
+            </a:extLst>
+          </p:cNvPr>
+          <p:cNvSpPr>
+            <a:spLocks noGrp="1"/>
+          </p:cNvSpPr>
+          <p:nvPr>
+            <p:ph type="title"/>
+          </p:nvPr>
+        </p:nvSpPr>
+        <p:spPr/>
+        <p:txBody>
+          <a:bodyPr/>
+          <a:lstStyle/>
+          <a:p>
+            <a:r>
+              <a:rPr lang="en-US" dirty="0"/>
+              <a:t>Module 2: Connecting to Data</a:t>
+            </a:r>
+          </a:p>
+        </p:txBody>
+      </p:sp>
+    </p:spTree>
+    <p:extLst>
+      <p:ext uri="{BB962C8B-B14F-4D97-AF65-F5344CB8AC3E}">
+        <p14:creationId xmlns:p14="http://schemas.microsoft.com/office/powerpoint/2010/main" val="3314587122"/>
+      </p:ext>
+    </p:extLst>
+  </p:cSld>
+  <p:clrMapOvr>
+    <a:masterClrMapping/>
+  </p:clrMapOvr>
+</p:sld>
+</file>
+
+<file path=ppt/slides/slide18.xml><?xml version="1.0" encoding="utf-8"?>
 <p:sld xmlns:a="http://schemas.openxmlformats.org/drawingml/2006/main" xmlns:r="http://schemas.openxmlformats.org/officeDocument/2006/relationships" xmlns:p="http://schemas.openxmlformats.org/presentationml/2006/main">
   <p:cSld>
     <p:spTree>
@@ -9816,7 +9783,7 @@
 </p:sld>
 </file>
 
-<file path=ppt/slides/slide18.xml><?xml version="1.0" encoding="utf-8"?>
+<file path=ppt/slides/slide19.xml><?xml version="1.0" encoding="utf-8"?>
 <p:sld xmlns:a="http://schemas.openxmlformats.org/drawingml/2006/main" xmlns:r="http://schemas.openxmlformats.org/officeDocument/2006/relationships" xmlns:p="http://schemas.openxmlformats.org/presentationml/2006/main">
   <p:cSld>
     <p:spTree>
@@ -9892,7 +9859,59 @@
 </p:sld>
 </file>
 
-<file path=ppt/slides/slide19.xml><?xml version="1.0" encoding="utf-8"?>
+<file path=ppt/slides/slide2.xml><?xml version="1.0" encoding="utf-8"?>
+<p:sld xmlns:a="http://schemas.openxmlformats.org/drawingml/2006/main" xmlns:r="http://schemas.openxmlformats.org/officeDocument/2006/relationships" xmlns:p="http://schemas.openxmlformats.org/presentationml/2006/main">
+  <p:cSld>
+    <p:spTree>
+      <p:nvGrpSpPr>
+        <p:cNvPr id="1" name=""/>
+        <p:cNvGrpSpPr/>
+        <p:nvPr/>
+      </p:nvGrpSpPr>
+      <p:grpSpPr>
+        <a:xfrm>
+          <a:off x="0" y="0"/>
+          <a:ext cx="0" cy="0"/>
+          <a:chOff x="0" y="0"/>
+          <a:chExt cx="0" cy="0"/>
+        </a:xfrm>
+      </p:grpSpPr>
+      <p:sp>
+        <p:nvSpPr>
+          <p:cNvPr id="3" name="Text Placeholder 2"/>
+          <p:cNvSpPr>
+            <a:spLocks noGrp="1"/>
+          </p:cNvSpPr>
+          <p:nvPr>
+            <p:ph type="body" sz="quarter" idx="11"/>
+          </p:nvPr>
+        </p:nvSpPr>
+        <p:spPr/>
+        <p:txBody>
+          <a:bodyPr/>
+          <a:lstStyle/>
+          <a:p>
+            <a:r>
+              <a:rPr lang="en-US" dirty="0"/>
+              <a:t>Introduction to Tableau Prep</a:t>
+            </a:r>
+          </a:p>
+        </p:txBody>
+      </p:sp>
+    </p:spTree>
+    <p:extLst>
+      <p:ext uri="{BB962C8B-B14F-4D97-AF65-F5344CB8AC3E}">
+        <p14:creationId xmlns:p14="http://schemas.microsoft.com/office/powerpoint/2010/main" val="3917667801"/>
+      </p:ext>
+    </p:extLst>
+  </p:cSld>
+  <p:clrMapOvr>
+    <a:masterClrMapping/>
+  </p:clrMapOvr>
+</p:sld>
+</file>
+
+<file path=ppt/slides/slide20.xml><?xml version="1.0" encoding="utf-8"?>
 <p:sld xmlns:a="http://schemas.openxmlformats.org/drawingml/2006/main" xmlns:r="http://schemas.openxmlformats.org/officeDocument/2006/relationships" xmlns:p="http://schemas.openxmlformats.org/presentationml/2006/main">
   <p:cSld>
     <p:spTree>
@@ -10059,59 +10078,7 @@
 </p:sld>
 </file>
 
-<file path=ppt/slides/slide2.xml><?xml version="1.0" encoding="utf-8"?>
-<p:sld xmlns:a="http://schemas.openxmlformats.org/drawingml/2006/main" xmlns:r="http://schemas.openxmlformats.org/officeDocument/2006/relationships" xmlns:p="http://schemas.openxmlformats.org/presentationml/2006/main">
-  <p:cSld>
-    <p:spTree>
-      <p:nvGrpSpPr>
-        <p:cNvPr id="1" name=""/>
-        <p:cNvGrpSpPr/>
-        <p:nvPr/>
-      </p:nvGrpSpPr>
-      <p:grpSpPr>
-        <a:xfrm>
-          <a:off x="0" y="0"/>
-          <a:ext cx="0" cy="0"/>
-          <a:chOff x="0" y="0"/>
-          <a:chExt cx="0" cy="0"/>
-        </a:xfrm>
-      </p:grpSpPr>
-      <p:sp>
-        <p:nvSpPr>
-          <p:cNvPr id="3" name="Text Placeholder 2"/>
-          <p:cNvSpPr>
-            <a:spLocks noGrp="1"/>
-          </p:cNvSpPr>
-          <p:nvPr>
-            <p:ph type="body" sz="quarter" idx="11"/>
-          </p:nvPr>
-        </p:nvSpPr>
-        <p:spPr/>
-        <p:txBody>
-          <a:bodyPr/>
-          <a:lstStyle/>
-          <a:p>
-            <a:r>
-              <a:rPr lang="en-US" dirty="0"/>
-              <a:t>Introduction to Tableau Prep</a:t>
-            </a:r>
-          </a:p>
-        </p:txBody>
-      </p:sp>
-    </p:spTree>
-    <p:extLst>
-      <p:ext uri="{BB962C8B-B14F-4D97-AF65-F5344CB8AC3E}">
-        <p14:creationId xmlns:p14="http://schemas.microsoft.com/office/powerpoint/2010/main" val="3917667801"/>
-      </p:ext>
-    </p:extLst>
-  </p:cSld>
-  <p:clrMapOvr>
-    <a:masterClrMapping/>
-  </p:clrMapOvr>
-</p:sld>
-</file>
-
-<file path=ppt/slides/slide20.xml><?xml version="1.0" encoding="utf-8"?>
+<file path=ppt/slides/slide21.xml><?xml version="1.0" encoding="utf-8"?>
 <p:sld xmlns:a="http://schemas.openxmlformats.org/drawingml/2006/main" xmlns:r="http://schemas.openxmlformats.org/officeDocument/2006/relationships" xmlns:p="http://schemas.openxmlformats.org/presentationml/2006/main">
   <p:cSld>
     <p:spTree>
@@ -10327,77 +10294,6 @@
 </p:sld>
 </file>
 
-<file path=ppt/slides/slide21.xml><?xml version="1.0" encoding="utf-8"?>
-<p:sld xmlns:a="http://schemas.openxmlformats.org/drawingml/2006/main" xmlns:r="http://schemas.openxmlformats.org/officeDocument/2006/relationships" xmlns:p="http://schemas.openxmlformats.org/presentationml/2006/main">
-  <p:cSld>
-    <p:spTree>
-      <p:nvGrpSpPr>
-        <p:cNvPr id="1" name=""/>
-        <p:cNvGrpSpPr/>
-        <p:nvPr/>
-      </p:nvGrpSpPr>
-      <p:grpSpPr>
-        <a:xfrm>
-          <a:off x="0" y="0"/>
-          <a:ext cx="0" cy="0"/>
-          <a:chOff x="0" y="0"/>
-          <a:chExt cx="0" cy="0"/>
-        </a:xfrm>
-      </p:grpSpPr>
-      <p:sp>
-        <p:nvSpPr>
-          <p:cNvPr id="2" name="Title 1"/>
-          <p:cNvSpPr>
-            <a:spLocks noGrp="1"/>
-          </p:cNvSpPr>
-          <p:nvPr>
-            <p:ph type="title"/>
-          </p:nvPr>
-        </p:nvSpPr>
-        <p:spPr/>
-        <p:txBody>
-          <a:bodyPr/>
-          <a:lstStyle/>
-          <a:p>
-            <a:r>
-              <a:rPr lang="en-US" dirty="0"/>
-              <a:t>Working with Tableau Data Extracts</a:t>
-            </a:r>
-          </a:p>
-        </p:txBody>
-      </p:sp>
-      <p:sp>
-        <p:nvSpPr>
-          <p:cNvPr id="3" name="Text Placeholder 2"/>
-          <p:cNvSpPr>
-            <a:spLocks noGrp="1"/>
-          </p:cNvSpPr>
-          <p:nvPr>
-            <p:ph type="body" sz="quarter" idx="10"/>
-          </p:nvPr>
-        </p:nvSpPr>
-        <p:spPr/>
-        <p:txBody>
-          <a:bodyPr/>
-          <a:lstStyle/>
-          <a:p>
-            <a:endParaRPr lang="en-US"/>
-          </a:p>
-        </p:txBody>
-      </p:sp>
-    </p:spTree>
-    <p:extLst>
-      <p:ext uri="{BB962C8B-B14F-4D97-AF65-F5344CB8AC3E}">
-        <p14:creationId xmlns:p14="http://schemas.microsoft.com/office/powerpoint/2010/main" val="2251478041"/>
-      </p:ext>
-    </p:extLst>
-  </p:cSld>
-  <p:clrMapOvr>
-    <a:masterClrMapping/>
-  </p:clrMapOvr>
-</p:sld>
-</file>
-
 <file path=ppt/slides/slide22.xml><?xml version="1.0" encoding="utf-8"?>
 <p:sld xmlns:a="http://schemas.openxmlformats.org/drawingml/2006/main" xmlns:r="http://schemas.openxmlformats.org/officeDocument/2006/relationships" xmlns:p="http://schemas.openxmlformats.org/presentationml/2006/main">
   <p:cSld>
@@ -10432,7 +10328,7 @@
           <a:p>
             <a:r>
               <a:rPr lang="en-US" dirty="0"/>
-              <a:t>Working with File-Based Data Sources</a:t>
+              <a:t>Working with Tableau Data Extracts</a:t>
             </a:r>
           </a:p>
         </p:txBody>
@@ -10459,7 +10355,7 @@
     </p:spTree>
     <p:extLst>
       <p:ext uri="{BB962C8B-B14F-4D97-AF65-F5344CB8AC3E}">
-        <p14:creationId xmlns:p14="http://schemas.microsoft.com/office/powerpoint/2010/main" val="2267059166"/>
+        <p14:creationId xmlns:p14="http://schemas.microsoft.com/office/powerpoint/2010/main" val="2251478041"/>
       </p:ext>
     </p:extLst>
   </p:cSld>
@@ -10503,7 +10399,7 @@
           <a:p>
             <a:r>
               <a:rPr lang="en-US" dirty="0"/>
-              <a:t>Connecting to Microsoft Access</a:t>
+              <a:t>Working with File-Based Data Sources</a:t>
             </a:r>
           </a:p>
         </p:txBody>
@@ -10530,7 +10426,7 @@
     </p:spTree>
     <p:extLst>
       <p:ext uri="{BB962C8B-B14F-4D97-AF65-F5344CB8AC3E}">
-        <p14:creationId xmlns:p14="http://schemas.microsoft.com/office/powerpoint/2010/main" val="1215057158"/>
+        <p14:creationId xmlns:p14="http://schemas.microsoft.com/office/powerpoint/2010/main" val="2267059166"/>
       </p:ext>
     </p:extLst>
   </p:cSld>
@@ -10574,7 +10470,7 @@
           <a:p>
             <a:r>
               <a:rPr lang="en-US" dirty="0"/>
-              <a:t>Connecting to Microsoft Excel</a:t>
+              <a:t>Connecting to Microsoft Access</a:t>
             </a:r>
           </a:p>
         </p:txBody>
@@ -10601,7 +10497,7 @@
     </p:spTree>
     <p:extLst>
       <p:ext uri="{BB962C8B-B14F-4D97-AF65-F5344CB8AC3E}">
-        <p14:creationId xmlns:p14="http://schemas.microsoft.com/office/powerpoint/2010/main" val="1885312738"/>
+        <p14:creationId xmlns:p14="http://schemas.microsoft.com/office/powerpoint/2010/main" val="1215057158"/>
       </p:ext>
     </p:extLst>
   </p:cSld>
@@ -10645,7 +10541,7 @@
           <a:p>
             <a:r>
               <a:rPr lang="en-US" dirty="0"/>
-              <a:t>Connecting to PDF Files</a:t>
+              <a:t>Connecting to Microsoft Excel</a:t>
             </a:r>
           </a:p>
         </p:txBody>
@@ -10672,7 +10568,7 @@
     </p:spTree>
     <p:extLst>
       <p:ext uri="{BB962C8B-B14F-4D97-AF65-F5344CB8AC3E}">
-        <p14:creationId xmlns:p14="http://schemas.microsoft.com/office/powerpoint/2010/main" val="88523654"/>
+        <p14:creationId xmlns:p14="http://schemas.microsoft.com/office/powerpoint/2010/main" val="1885312738"/>
       </p:ext>
     </p:extLst>
   </p:cSld>
@@ -10716,13 +10612,8 @@
           <a:p>
             <a:r>
               <a:rPr lang="en-US" dirty="0"/>
-              <a:t>Connecting</a:t>
-            </a:r>
-            <a:r>
-              <a:rPr lang="en-US" baseline="0" dirty="0"/>
-              <a:t> to Text Files</a:t>
-            </a:r>
-            <a:endParaRPr lang="en-US" dirty="0"/>
+              <a:t>Connecting to PDF Files</a:t>
+            </a:r>
           </a:p>
         </p:txBody>
       </p:sp>
@@ -10748,7 +10639,7 @@
     </p:spTree>
     <p:extLst>
       <p:ext uri="{BB962C8B-B14F-4D97-AF65-F5344CB8AC3E}">
-        <p14:creationId xmlns:p14="http://schemas.microsoft.com/office/powerpoint/2010/main" val="3719378937"/>
+        <p14:creationId xmlns:p14="http://schemas.microsoft.com/office/powerpoint/2010/main" val="88523654"/>
       </p:ext>
     </p:extLst>
   </p:cSld>
@@ -10792,8 +10683,13 @@
           <a:p>
             <a:r>
               <a:rPr lang="en-US" dirty="0"/>
-              <a:t>Module 3: UNION Joins</a:t>
-            </a:r>
+              <a:t>Connecting</a:t>
+            </a:r>
+            <a:r>
+              <a:rPr lang="en-US" baseline="0" dirty="0"/>
+              <a:t> to Text Files</a:t>
+            </a:r>
+            <a:endParaRPr lang="en-US" dirty="0"/>
           </a:p>
         </p:txBody>
       </p:sp>
@@ -10819,7 +10715,7 @@
     </p:spTree>
     <p:extLst>
       <p:ext uri="{BB962C8B-B14F-4D97-AF65-F5344CB8AC3E}">
-        <p14:creationId xmlns:p14="http://schemas.microsoft.com/office/powerpoint/2010/main" val="4266211854"/>
+        <p14:creationId xmlns:p14="http://schemas.microsoft.com/office/powerpoint/2010/main" val="3719378937"/>
       </p:ext>
     </p:extLst>
   </p:cSld>
@@ -10848,13 +10744,7 @@
       </p:grpSpPr>
       <p:sp>
         <p:nvSpPr>
-          <p:cNvPr id="2" name="Title 1">
-            <a:extLst>
-              <a:ext uri="{FF2B5EF4-FFF2-40B4-BE49-F238E27FC236}">
-                <a16:creationId xmlns:a16="http://schemas.microsoft.com/office/drawing/2014/main" id="{0A759684-435C-494B-AE1E-AAC97A368594}"/>
-              </a:ext>
-            </a:extLst>
-          </p:cNvPr>
+          <p:cNvPr id="2" name="Title 1"/>
           <p:cNvSpPr>
             <a:spLocks noGrp="1"/>
           </p:cNvSpPr>
@@ -10869,45 +10759,15 @@
           <a:p>
             <a:r>
               <a:rPr lang="en-US" dirty="0"/>
-              <a:t>UNION</a:t>
-            </a:r>
-            <a:r>
-              <a:rPr lang="en-US" baseline="0" dirty="0"/>
-              <a:t> Joins</a:t>
-            </a:r>
-            <a:endParaRPr lang="en-US" dirty="0"/>
-          </a:p>
-        </p:txBody>
-      </p:sp>
-      <p:sp>
-        <p:nvSpPr>
-          <p:cNvPr id="3" name="Text Placeholder 2">
-            <a:extLst>
-              <a:ext uri="{FF2B5EF4-FFF2-40B4-BE49-F238E27FC236}">
-                <a16:creationId xmlns:a16="http://schemas.microsoft.com/office/drawing/2014/main" id="{1DE58651-9EBB-0A4A-8424-84C3ADDAC864}"/>
-              </a:ext>
-            </a:extLst>
-          </p:cNvPr>
-          <p:cNvSpPr>
-            <a:spLocks noGrp="1"/>
-          </p:cNvSpPr>
-          <p:nvPr>
-            <p:ph type="body" sz="quarter" idx="10"/>
-          </p:nvPr>
-        </p:nvSpPr>
-        <p:spPr/>
-        <p:txBody>
-          <a:bodyPr/>
-          <a:lstStyle/>
-          <a:p>
-            <a:endParaRPr lang="en-US"/>
+              <a:t>Module 3: UNION Joins</a:t>
+            </a:r>
           </a:p>
         </p:txBody>
       </p:sp>
     </p:spTree>
     <p:extLst>
       <p:ext uri="{BB962C8B-B14F-4D97-AF65-F5344CB8AC3E}">
-        <p14:creationId xmlns:p14="http://schemas.microsoft.com/office/powerpoint/2010/main" val="2085875749"/>
+        <p14:creationId xmlns:p14="http://schemas.microsoft.com/office/powerpoint/2010/main" val="4266211854"/>
       </p:ext>
     </p:extLst>
   </p:cSld>
@@ -10936,7 +10796,13 @@
       </p:grpSpPr>
       <p:sp>
         <p:nvSpPr>
-          <p:cNvPr id="2" name="Title 1"/>
+          <p:cNvPr id="2" name="Title 1">
+            <a:extLst>
+              <a:ext uri="{FF2B5EF4-FFF2-40B4-BE49-F238E27FC236}">
+                <a16:creationId xmlns:a16="http://schemas.microsoft.com/office/drawing/2014/main" id="{0A759684-435C-494B-AE1E-AAC97A368594}"/>
+              </a:ext>
+            </a:extLst>
+          </p:cNvPr>
           <p:cNvSpPr>
             <a:spLocks noGrp="1"/>
           </p:cNvSpPr>
@@ -10951,14 +10817,25 @@
           <a:p>
             <a:r>
               <a:rPr lang="en-US" dirty="0"/>
-              <a:t>The Data Preview Pane</a:t>
-            </a:r>
-          </a:p>
-        </p:txBody>
-      </p:sp>
-      <p:sp>
-        <p:nvSpPr>
-          <p:cNvPr id="3" name="Text Placeholder 2"/>
+              <a:t>UNION</a:t>
+            </a:r>
+            <a:r>
+              <a:rPr lang="en-US" baseline="0" dirty="0"/>
+              <a:t> Joins</a:t>
+            </a:r>
+            <a:endParaRPr lang="en-US" dirty="0"/>
+          </a:p>
+        </p:txBody>
+      </p:sp>
+      <p:sp>
+        <p:nvSpPr>
+          <p:cNvPr id="3" name="Text Placeholder 2">
+            <a:extLst>
+              <a:ext uri="{FF2B5EF4-FFF2-40B4-BE49-F238E27FC236}">
+                <a16:creationId xmlns:a16="http://schemas.microsoft.com/office/drawing/2014/main" id="{1DE58651-9EBB-0A4A-8424-84C3ADDAC864}"/>
+              </a:ext>
+            </a:extLst>
+          </p:cNvPr>
           <p:cNvSpPr>
             <a:spLocks noGrp="1"/>
           </p:cNvSpPr>
@@ -10978,7 +10855,7 @@
     </p:spTree>
     <p:extLst>
       <p:ext uri="{BB962C8B-B14F-4D97-AF65-F5344CB8AC3E}">
-        <p14:creationId xmlns:p14="http://schemas.microsoft.com/office/powerpoint/2010/main" val="1963526926"/>
+        <p14:creationId xmlns:p14="http://schemas.microsoft.com/office/powerpoint/2010/main" val="2085875749"/>
       </p:ext>
     </p:extLst>
   </p:cSld>
@@ -11117,63 +10994,7 @@
       </p:grpSpPr>
       <p:sp>
         <p:nvSpPr>
-          <p:cNvPr id="2" name="Subtitle 1">
-            <a:extLst>
-              <a:ext uri="{FF2B5EF4-FFF2-40B4-BE49-F238E27FC236}">
-                <a16:creationId xmlns:a16="http://schemas.microsoft.com/office/drawing/2014/main" id="{115D9100-9FE2-7D4A-B51F-3D960A8C03B8}"/>
-              </a:ext>
-            </a:extLst>
-          </p:cNvPr>
-          <p:cNvSpPr>
-            <a:spLocks noGrp="1"/>
-          </p:cNvSpPr>
-          <p:nvPr>
-            <p:ph type="subTitle" idx="1"/>
-          </p:nvPr>
-        </p:nvSpPr>
-        <p:spPr/>
-        <p:txBody>
-          <a:bodyPr/>
-          <a:lstStyle/>
-          <a:p>
-            <a:endParaRPr lang="en-US"/>
-          </a:p>
-        </p:txBody>
-      </p:sp>
-      <p:sp>
-        <p:nvSpPr>
-          <p:cNvPr id="3" name="Text Placeholder 2">
-            <a:extLst>
-              <a:ext uri="{FF2B5EF4-FFF2-40B4-BE49-F238E27FC236}">
-                <a16:creationId xmlns:a16="http://schemas.microsoft.com/office/drawing/2014/main" id="{9EE74537-D19A-A348-8084-99D92D6B319D}"/>
-              </a:ext>
-            </a:extLst>
-          </p:cNvPr>
-          <p:cNvSpPr>
-            <a:spLocks noGrp="1"/>
-          </p:cNvSpPr>
-          <p:nvPr>
-            <p:ph type="body" sz="quarter" idx="11"/>
-          </p:nvPr>
-        </p:nvSpPr>
-        <p:spPr/>
-        <p:txBody>
-          <a:bodyPr/>
-          <a:lstStyle/>
-          <a:p>
-            <a:endParaRPr lang="en-US"/>
-          </a:p>
-        </p:txBody>
-      </p:sp>
-      <p:sp>
-        <p:nvSpPr>
-          <p:cNvPr id="4" name="Title 3">
-            <a:extLst>
-              <a:ext uri="{FF2B5EF4-FFF2-40B4-BE49-F238E27FC236}">
-                <a16:creationId xmlns:a16="http://schemas.microsoft.com/office/drawing/2014/main" id="{12CB095F-F2FA-DE4B-A962-73D921102700}"/>
-              </a:ext>
-            </a:extLst>
-          </p:cNvPr>
+          <p:cNvPr id="2" name="Title 1"/>
           <p:cNvSpPr>
             <a:spLocks noGrp="1"/>
           </p:cNvSpPr>
@@ -11188,15 +11009,34 @@
           <a:p>
             <a:r>
               <a:rPr lang="en-US" dirty="0"/>
-              <a:t>Data Types</a:t>
-            </a:r>
+              <a:t>The Data Preview Pane</a:t>
+            </a:r>
+          </a:p>
+        </p:txBody>
+      </p:sp>
+      <p:sp>
+        <p:nvSpPr>
+          <p:cNvPr id="3" name="Text Placeholder 2"/>
+          <p:cNvSpPr>
+            <a:spLocks noGrp="1"/>
+          </p:cNvSpPr>
+          <p:nvPr>
+            <p:ph type="body" sz="quarter" idx="10"/>
+          </p:nvPr>
+        </p:nvSpPr>
+        <p:spPr/>
+        <p:txBody>
+          <a:bodyPr/>
+          <a:lstStyle/>
+          <a:p>
+            <a:endParaRPr lang="en-US"/>
           </a:p>
         </p:txBody>
       </p:sp>
     </p:spTree>
     <p:extLst>
       <p:ext uri="{BB962C8B-B14F-4D97-AF65-F5344CB8AC3E}">
-        <p14:creationId xmlns:p14="http://schemas.microsoft.com/office/powerpoint/2010/main" val="1227333314"/>
+        <p14:creationId xmlns:p14="http://schemas.microsoft.com/office/powerpoint/2010/main" val="1963526926"/>
       </p:ext>
     </p:extLst>
   </p:cSld>
@@ -11228,7 +11068,7 @@
           <p:cNvPr id="2" name="Subtitle 1">
             <a:extLst>
               <a:ext uri="{FF2B5EF4-FFF2-40B4-BE49-F238E27FC236}">
-                <a16:creationId xmlns:a16="http://schemas.microsoft.com/office/drawing/2014/main" id="{DA6D074F-B87C-4F4C-940C-F72EB3D7020D}"/>
+                <a16:creationId xmlns:a16="http://schemas.microsoft.com/office/drawing/2014/main" id="{115D9100-9FE2-7D4A-B51F-3D960A8C03B8}"/>
               </a:ext>
             </a:extLst>
           </p:cNvPr>
@@ -11253,7 +11093,7 @@
           <p:cNvPr id="3" name="Text Placeholder 2">
             <a:extLst>
               <a:ext uri="{FF2B5EF4-FFF2-40B4-BE49-F238E27FC236}">
-                <a16:creationId xmlns:a16="http://schemas.microsoft.com/office/drawing/2014/main" id="{C5CF72B8-0EA9-7F45-B44B-F281732DFFD9}"/>
+                <a16:creationId xmlns:a16="http://schemas.microsoft.com/office/drawing/2014/main" id="{9EE74537-D19A-A348-8084-99D92D6B319D}"/>
               </a:ext>
             </a:extLst>
           </p:cNvPr>
@@ -11278,7 +11118,7 @@
           <p:cNvPr id="4" name="Title 3">
             <a:extLst>
               <a:ext uri="{FF2B5EF4-FFF2-40B4-BE49-F238E27FC236}">
-                <a16:creationId xmlns:a16="http://schemas.microsoft.com/office/drawing/2014/main" id="{1B038B5B-7922-C842-9C66-5752419CA5E7}"/>
+                <a16:creationId xmlns:a16="http://schemas.microsoft.com/office/drawing/2014/main" id="{12CB095F-F2FA-DE4B-A962-73D921102700}"/>
               </a:ext>
             </a:extLst>
           </p:cNvPr>
@@ -11296,7 +11136,7 @@
           <a:p>
             <a:r>
               <a:rPr lang="en-US" dirty="0"/>
-              <a:t>Changes</a:t>
+              <a:t>Data Types</a:t>
             </a:r>
           </a:p>
         </p:txBody>
@@ -11304,7 +11144,7 @@
     </p:spTree>
     <p:extLst>
       <p:ext uri="{BB962C8B-B14F-4D97-AF65-F5344CB8AC3E}">
-        <p14:creationId xmlns:p14="http://schemas.microsoft.com/office/powerpoint/2010/main" val="1890150800"/>
+        <p14:creationId xmlns:p14="http://schemas.microsoft.com/office/powerpoint/2010/main" val="1227333314"/>
       </p:ext>
     </p:extLst>
   </p:cSld>
@@ -11336,7 +11176,7 @@
           <p:cNvPr id="2" name="Subtitle 1">
             <a:extLst>
               <a:ext uri="{FF2B5EF4-FFF2-40B4-BE49-F238E27FC236}">
-                <a16:creationId xmlns:a16="http://schemas.microsoft.com/office/drawing/2014/main" id="{7C5AFA44-3757-D347-93D8-4FA8FFBAFB33}"/>
+                <a16:creationId xmlns:a16="http://schemas.microsoft.com/office/drawing/2014/main" id="{DA6D074F-B87C-4F4C-940C-F72EB3D7020D}"/>
               </a:ext>
             </a:extLst>
           </p:cNvPr>
@@ -11361,7 +11201,7 @@
           <p:cNvPr id="3" name="Text Placeholder 2">
             <a:extLst>
               <a:ext uri="{FF2B5EF4-FFF2-40B4-BE49-F238E27FC236}">
-                <a16:creationId xmlns:a16="http://schemas.microsoft.com/office/drawing/2014/main" id="{DFE6DA2C-DE55-8B43-BE4B-29FA34359AB0}"/>
+                <a16:creationId xmlns:a16="http://schemas.microsoft.com/office/drawing/2014/main" id="{C5CF72B8-0EA9-7F45-B44B-F281732DFFD9}"/>
               </a:ext>
             </a:extLst>
           </p:cNvPr>
@@ -11386,7 +11226,7 @@
           <p:cNvPr id="4" name="Title 3">
             <a:extLst>
               <a:ext uri="{FF2B5EF4-FFF2-40B4-BE49-F238E27FC236}">
-                <a16:creationId xmlns:a16="http://schemas.microsoft.com/office/drawing/2014/main" id="{4763A78A-C1AE-6D40-A375-990181AACD65}"/>
+                <a16:creationId xmlns:a16="http://schemas.microsoft.com/office/drawing/2014/main" id="{1B038B5B-7922-C842-9C66-5752419CA5E7}"/>
               </a:ext>
             </a:extLst>
           </p:cNvPr>
@@ -11404,20 +11244,15 @@
           <a:p>
             <a:r>
               <a:rPr lang="en-US" dirty="0"/>
-              <a:t>Reviewing the Union</a:t>
-            </a:r>
-            <a:r>
-              <a:rPr lang="en-US" baseline="0" dirty="0"/>
-              <a:t> Step</a:t>
-            </a:r>
-            <a:endParaRPr lang="en-US" dirty="0"/>
+              <a:t>Changes</a:t>
+            </a:r>
           </a:p>
         </p:txBody>
       </p:sp>
     </p:spTree>
     <p:extLst>
       <p:ext uri="{BB962C8B-B14F-4D97-AF65-F5344CB8AC3E}">
-        <p14:creationId xmlns:p14="http://schemas.microsoft.com/office/powerpoint/2010/main" val="3564736276"/>
+        <p14:creationId xmlns:p14="http://schemas.microsoft.com/office/powerpoint/2010/main" val="1890150800"/>
       </p:ext>
     </p:extLst>
   </p:cSld>
@@ -11449,7 +11284,7 @@
           <p:cNvPr id="2" name="Subtitle 1">
             <a:extLst>
               <a:ext uri="{FF2B5EF4-FFF2-40B4-BE49-F238E27FC236}">
-                <a16:creationId xmlns:a16="http://schemas.microsoft.com/office/drawing/2014/main" id="{10E586FF-BE6A-8841-8761-0711CC85F918}"/>
+                <a16:creationId xmlns:a16="http://schemas.microsoft.com/office/drawing/2014/main" id="{7C5AFA44-3757-D347-93D8-4FA8FFBAFB33}"/>
               </a:ext>
             </a:extLst>
           </p:cNvPr>
@@ -11474,7 +11309,7 @@
           <p:cNvPr id="3" name="Text Placeholder 2">
             <a:extLst>
               <a:ext uri="{FF2B5EF4-FFF2-40B4-BE49-F238E27FC236}">
-                <a16:creationId xmlns:a16="http://schemas.microsoft.com/office/drawing/2014/main" id="{8C9183B9-4A6F-934C-895F-94E4989F02C5}"/>
+                <a16:creationId xmlns:a16="http://schemas.microsoft.com/office/drawing/2014/main" id="{DFE6DA2C-DE55-8B43-BE4B-29FA34359AB0}"/>
               </a:ext>
             </a:extLst>
           </p:cNvPr>
@@ -11499,7 +11334,7 @@
           <p:cNvPr id="4" name="Title 3">
             <a:extLst>
               <a:ext uri="{FF2B5EF4-FFF2-40B4-BE49-F238E27FC236}">
-                <a16:creationId xmlns:a16="http://schemas.microsoft.com/office/drawing/2014/main" id="{9D22851B-CAA5-5841-A154-53FC902626D7}"/>
+                <a16:creationId xmlns:a16="http://schemas.microsoft.com/office/drawing/2014/main" id="{4763A78A-C1AE-6D40-A375-990181AACD65}"/>
               </a:ext>
             </a:extLst>
           </p:cNvPr>
@@ -11517,11 +11352,11 @@
           <a:p>
             <a:r>
               <a:rPr lang="en-US" dirty="0"/>
-              <a:t>Wildcard</a:t>
+              <a:t>Reviewing the Union</a:t>
             </a:r>
             <a:r>
               <a:rPr lang="en-US" baseline="0" dirty="0"/>
-              <a:t> Union Joins</a:t>
+              <a:t> Step</a:t>
             </a:r>
             <a:endParaRPr lang="en-US" dirty="0"/>
           </a:p>
@@ -11530,7 +11365,7 @@
     </p:spTree>
     <p:extLst>
       <p:ext uri="{BB962C8B-B14F-4D97-AF65-F5344CB8AC3E}">
-        <p14:creationId xmlns:p14="http://schemas.microsoft.com/office/powerpoint/2010/main" val="1700663258"/>
+        <p14:creationId xmlns:p14="http://schemas.microsoft.com/office/powerpoint/2010/main" val="3564736276"/>
       </p:ext>
     </p:extLst>
   </p:cSld>
@@ -11562,7 +11397,7 @@
           <p:cNvPr id="2" name="Subtitle 1">
             <a:extLst>
               <a:ext uri="{FF2B5EF4-FFF2-40B4-BE49-F238E27FC236}">
-                <a16:creationId xmlns:a16="http://schemas.microsoft.com/office/drawing/2014/main" id="{6AE0CC47-794E-4944-8D70-71842D295C85}"/>
+                <a16:creationId xmlns:a16="http://schemas.microsoft.com/office/drawing/2014/main" id="{10E586FF-BE6A-8841-8761-0711CC85F918}"/>
               </a:ext>
             </a:extLst>
           </p:cNvPr>
@@ -11587,7 +11422,7 @@
           <p:cNvPr id="3" name="Text Placeholder 2">
             <a:extLst>
               <a:ext uri="{FF2B5EF4-FFF2-40B4-BE49-F238E27FC236}">
-                <a16:creationId xmlns:a16="http://schemas.microsoft.com/office/drawing/2014/main" id="{E1C4BBA1-37CC-0F43-9299-BE1EE027FFEE}"/>
+                <a16:creationId xmlns:a16="http://schemas.microsoft.com/office/drawing/2014/main" id="{8C9183B9-4A6F-934C-895F-94E4989F02C5}"/>
               </a:ext>
             </a:extLst>
           </p:cNvPr>
@@ -11612,7 +11447,7 @@
           <p:cNvPr id="4" name="Title 3">
             <a:extLst>
               <a:ext uri="{FF2B5EF4-FFF2-40B4-BE49-F238E27FC236}">
-                <a16:creationId xmlns:a16="http://schemas.microsoft.com/office/drawing/2014/main" id="{F48C7965-0EC8-CF4E-94D4-3E5D48D199A8}"/>
+                <a16:creationId xmlns:a16="http://schemas.microsoft.com/office/drawing/2014/main" id="{9D22851B-CAA5-5841-A154-53FC902626D7}"/>
               </a:ext>
             </a:extLst>
           </p:cNvPr>
@@ -11630,11 +11465,11 @@
           <a:p>
             <a:r>
               <a:rPr lang="en-US" dirty="0"/>
-              <a:t>Which Is</a:t>
+              <a:t>Wildcard</a:t>
             </a:r>
             <a:r>
               <a:rPr lang="en-US" baseline="0" dirty="0"/>
-              <a:t> Better?</a:t>
+              <a:t> Union Joins</a:t>
             </a:r>
             <a:endParaRPr lang="en-US" dirty="0"/>
           </a:p>
@@ -11643,7 +11478,7 @@
     </p:spTree>
     <p:extLst>
       <p:ext uri="{BB962C8B-B14F-4D97-AF65-F5344CB8AC3E}">
-        <p14:creationId xmlns:p14="http://schemas.microsoft.com/office/powerpoint/2010/main" val="307961116"/>
+        <p14:creationId xmlns:p14="http://schemas.microsoft.com/office/powerpoint/2010/main" val="1700663258"/>
       </p:ext>
     </p:extLst>
   </p:cSld>
@@ -11675,7 +11510,7 @@
           <p:cNvPr id="2" name="Subtitle 1">
             <a:extLst>
               <a:ext uri="{FF2B5EF4-FFF2-40B4-BE49-F238E27FC236}">
-                <a16:creationId xmlns:a16="http://schemas.microsoft.com/office/drawing/2014/main" id="{BA10675A-30F9-9641-9BE5-9DE41DA7C4AD}"/>
+                <a16:creationId xmlns:a16="http://schemas.microsoft.com/office/drawing/2014/main" id="{6AE0CC47-794E-4944-8D70-71842D295C85}"/>
               </a:ext>
             </a:extLst>
           </p:cNvPr>
@@ -11700,7 +11535,7 @@
           <p:cNvPr id="3" name="Text Placeholder 2">
             <a:extLst>
               <a:ext uri="{FF2B5EF4-FFF2-40B4-BE49-F238E27FC236}">
-                <a16:creationId xmlns:a16="http://schemas.microsoft.com/office/drawing/2014/main" id="{45D6EA76-7E3D-DF4B-917A-2A04595B625A}"/>
+                <a16:creationId xmlns:a16="http://schemas.microsoft.com/office/drawing/2014/main" id="{E1C4BBA1-37CC-0F43-9299-BE1EE027FFEE}"/>
               </a:ext>
             </a:extLst>
           </p:cNvPr>
@@ -11725,7 +11560,7 @@
           <p:cNvPr id="4" name="Title 3">
             <a:extLst>
               <a:ext uri="{FF2B5EF4-FFF2-40B4-BE49-F238E27FC236}">
-                <a16:creationId xmlns:a16="http://schemas.microsoft.com/office/drawing/2014/main" id="{EC9E8605-E358-464D-AAD9-D0215FA11FBC}"/>
+                <a16:creationId xmlns:a16="http://schemas.microsoft.com/office/drawing/2014/main" id="{F48C7965-0EC8-CF4E-94D4-3E5D48D199A8}"/>
               </a:ext>
             </a:extLst>
           </p:cNvPr>
@@ -11743,15 +11578,20 @@
           <a:p>
             <a:r>
               <a:rPr lang="en-US" dirty="0"/>
-              <a:t>Module 4: Joins</a:t>
-            </a:r>
+              <a:t>Which Is</a:t>
+            </a:r>
+            <a:r>
+              <a:rPr lang="en-US" baseline="0" dirty="0"/>
+              <a:t> Better?</a:t>
+            </a:r>
+            <a:endParaRPr lang="en-US" dirty="0"/>
           </a:p>
         </p:txBody>
       </p:sp>
     </p:spTree>
     <p:extLst>
       <p:ext uri="{BB962C8B-B14F-4D97-AF65-F5344CB8AC3E}">
-        <p14:creationId xmlns:p14="http://schemas.microsoft.com/office/powerpoint/2010/main" val="1266696213"/>
+        <p14:creationId xmlns:p14="http://schemas.microsoft.com/office/powerpoint/2010/main" val="307961116"/>
       </p:ext>
     </p:extLst>
   </p:cSld>
@@ -11780,10 +11620,10 @@
       </p:grpSpPr>
       <p:sp>
         <p:nvSpPr>
-          <p:cNvPr id="2" name="Subtitle 1">
+          <p:cNvPr id="4" name="Title 3">
             <a:extLst>
               <a:ext uri="{FF2B5EF4-FFF2-40B4-BE49-F238E27FC236}">
-                <a16:creationId xmlns:a16="http://schemas.microsoft.com/office/drawing/2014/main" id="{5F844C00-2365-8C42-9B8E-2EE752FA5167}"/>
+                <a16:creationId xmlns:a16="http://schemas.microsoft.com/office/drawing/2014/main" id="{EC9E8605-E358-464D-AAD9-D0215FA11FBC}"/>
               </a:ext>
             </a:extLst>
           </p:cNvPr>
@@ -11791,56 +11631,6 @@
             <a:spLocks noGrp="1"/>
           </p:cNvSpPr>
           <p:nvPr>
-            <p:ph type="subTitle" idx="1"/>
-          </p:nvPr>
-        </p:nvSpPr>
-        <p:spPr/>
-        <p:txBody>
-          <a:bodyPr/>
-          <a:lstStyle/>
-          <a:p>
-            <a:endParaRPr lang="en-US"/>
-          </a:p>
-        </p:txBody>
-      </p:sp>
-      <p:sp>
-        <p:nvSpPr>
-          <p:cNvPr id="3" name="Text Placeholder 2">
-            <a:extLst>
-              <a:ext uri="{FF2B5EF4-FFF2-40B4-BE49-F238E27FC236}">
-                <a16:creationId xmlns:a16="http://schemas.microsoft.com/office/drawing/2014/main" id="{CC5EDF85-B4DA-D74A-A46B-499695758923}"/>
-              </a:ext>
-            </a:extLst>
-          </p:cNvPr>
-          <p:cNvSpPr>
-            <a:spLocks noGrp="1"/>
-          </p:cNvSpPr>
-          <p:nvPr>
-            <p:ph type="body" sz="quarter" idx="11"/>
-          </p:nvPr>
-        </p:nvSpPr>
-        <p:spPr/>
-        <p:txBody>
-          <a:bodyPr/>
-          <a:lstStyle/>
-          <a:p>
-            <a:endParaRPr lang="en-US"/>
-          </a:p>
-        </p:txBody>
-      </p:sp>
-      <p:sp>
-        <p:nvSpPr>
-          <p:cNvPr id="4" name="Title 3">
-            <a:extLst>
-              <a:ext uri="{FF2B5EF4-FFF2-40B4-BE49-F238E27FC236}">
-                <a16:creationId xmlns:a16="http://schemas.microsoft.com/office/drawing/2014/main" id="{E5F5CC58-AE7F-E341-A1DB-0D166A32EC89}"/>
-              </a:ext>
-            </a:extLst>
-          </p:cNvPr>
-          <p:cNvSpPr>
-            <a:spLocks noGrp="1"/>
-          </p:cNvSpPr>
-          <p:nvPr>
             <p:ph type="title"/>
           </p:nvPr>
         </p:nvSpPr>
@@ -11851,7 +11641,7 @@
           <a:p>
             <a:r>
               <a:rPr lang="en-US" dirty="0"/>
-              <a:t>What is a Table?</a:t>
+              <a:t>Module 4: Joins</a:t>
             </a:r>
           </a:p>
         </p:txBody>
@@ -11859,7 +11649,7 @@
     </p:spTree>
     <p:extLst>
       <p:ext uri="{BB962C8B-B14F-4D97-AF65-F5344CB8AC3E}">
-        <p14:creationId xmlns:p14="http://schemas.microsoft.com/office/powerpoint/2010/main" val="2545081252"/>
+        <p14:creationId xmlns:p14="http://schemas.microsoft.com/office/powerpoint/2010/main" val="1266696213"/>
       </p:ext>
     </p:extLst>
   </p:cSld>
@@ -11891,7 +11681,7 @@
           <p:cNvPr id="2" name="Subtitle 1">
             <a:extLst>
               <a:ext uri="{FF2B5EF4-FFF2-40B4-BE49-F238E27FC236}">
-                <a16:creationId xmlns:a16="http://schemas.microsoft.com/office/drawing/2014/main" id="{423D4CE7-A624-1F49-B9F9-D86681FE8855}"/>
+                <a16:creationId xmlns:a16="http://schemas.microsoft.com/office/drawing/2014/main" id="{5F844C00-2365-8C42-9B8E-2EE752FA5167}"/>
               </a:ext>
             </a:extLst>
           </p:cNvPr>
@@ -11916,7 +11706,7 @@
           <p:cNvPr id="3" name="Text Placeholder 2">
             <a:extLst>
               <a:ext uri="{FF2B5EF4-FFF2-40B4-BE49-F238E27FC236}">
-                <a16:creationId xmlns:a16="http://schemas.microsoft.com/office/drawing/2014/main" id="{8D6C3E21-876D-1D42-9F86-BF55739AEBC8}"/>
+                <a16:creationId xmlns:a16="http://schemas.microsoft.com/office/drawing/2014/main" id="{CC5EDF85-B4DA-D74A-A46B-499695758923}"/>
               </a:ext>
             </a:extLst>
           </p:cNvPr>
@@ -11941,7 +11731,7 @@
           <p:cNvPr id="4" name="Title 3">
             <a:extLst>
               <a:ext uri="{FF2B5EF4-FFF2-40B4-BE49-F238E27FC236}">
-                <a16:creationId xmlns:a16="http://schemas.microsoft.com/office/drawing/2014/main" id="{A4A2B281-DC7F-FE4E-81DA-200FBDA2A690}"/>
+                <a16:creationId xmlns:a16="http://schemas.microsoft.com/office/drawing/2014/main" id="{E5F5CC58-AE7F-E341-A1DB-0D166A32EC89}"/>
               </a:ext>
             </a:extLst>
           </p:cNvPr>
@@ -11959,7 +11749,7 @@
           <a:p>
             <a:r>
               <a:rPr lang="en-US" dirty="0"/>
-              <a:t>Equijoins</a:t>
+              <a:t>What is a Table?</a:t>
             </a:r>
           </a:p>
         </p:txBody>
@@ -11967,7 +11757,7 @@
     </p:spTree>
     <p:extLst>
       <p:ext uri="{BB962C8B-B14F-4D97-AF65-F5344CB8AC3E}">
-        <p14:creationId xmlns:p14="http://schemas.microsoft.com/office/powerpoint/2010/main" val="1488510711"/>
+        <p14:creationId xmlns:p14="http://schemas.microsoft.com/office/powerpoint/2010/main" val="2545081252"/>
       </p:ext>
     </p:extLst>
   </p:cSld>
@@ -11999,7 +11789,7 @@
           <p:cNvPr id="2" name="Subtitle 1">
             <a:extLst>
               <a:ext uri="{FF2B5EF4-FFF2-40B4-BE49-F238E27FC236}">
-                <a16:creationId xmlns:a16="http://schemas.microsoft.com/office/drawing/2014/main" id="{37953D94-6636-EB4D-B539-DC5B6D267A0B}"/>
+                <a16:creationId xmlns:a16="http://schemas.microsoft.com/office/drawing/2014/main" id="{423D4CE7-A624-1F49-B9F9-D86681FE8855}"/>
               </a:ext>
             </a:extLst>
           </p:cNvPr>
@@ -12024,7 +11814,7 @@
           <p:cNvPr id="3" name="Text Placeholder 2">
             <a:extLst>
               <a:ext uri="{FF2B5EF4-FFF2-40B4-BE49-F238E27FC236}">
-                <a16:creationId xmlns:a16="http://schemas.microsoft.com/office/drawing/2014/main" id="{88191254-061B-3E43-9347-C296346C809B}"/>
+                <a16:creationId xmlns:a16="http://schemas.microsoft.com/office/drawing/2014/main" id="{8D6C3E21-876D-1D42-9F86-BF55739AEBC8}"/>
               </a:ext>
             </a:extLst>
           </p:cNvPr>
@@ -12049,7 +11839,7 @@
           <p:cNvPr id="4" name="Title 3">
             <a:extLst>
               <a:ext uri="{FF2B5EF4-FFF2-40B4-BE49-F238E27FC236}">
-                <a16:creationId xmlns:a16="http://schemas.microsoft.com/office/drawing/2014/main" id="{E16B13A9-922B-DA4A-9F55-8E286CBCB4F9}"/>
+                <a16:creationId xmlns:a16="http://schemas.microsoft.com/office/drawing/2014/main" id="{A4A2B281-DC7F-FE4E-81DA-200FBDA2A690}"/>
               </a:ext>
             </a:extLst>
           </p:cNvPr>
@@ -12067,7 +11857,7 @@
           <a:p>
             <a:r>
               <a:rPr lang="en-US" dirty="0"/>
-              <a:t>Join Types</a:t>
+              <a:t>Equijoins</a:t>
             </a:r>
           </a:p>
         </p:txBody>
@@ -12075,7 +11865,7 @@
     </p:spTree>
     <p:extLst>
       <p:ext uri="{BB962C8B-B14F-4D97-AF65-F5344CB8AC3E}">
-        <p14:creationId xmlns:p14="http://schemas.microsoft.com/office/powerpoint/2010/main" val="2594980728"/>
+        <p14:creationId xmlns:p14="http://schemas.microsoft.com/office/powerpoint/2010/main" val="1488510711"/>
       </p:ext>
     </p:extLst>
   </p:cSld>
@@ -12107,7 +11897,7 @@
           <p:cNvPr id="2" name="Subtitle 1">
             <a:extLst>
               <a:ext uri="{FF2B5EF4-FFF2-40B4-BE49-F238E27FC236}">
-                <a16:creationId xmlns:a16="http://schemas.microsoft.com/office/drawing/2014/main" id="{21E6FD3F-3A28-AA47-A971-90E2F63E6D64}"/>
+                <a16:creationId xmlns:a16="http://schemas.microsoft.com/office/drawing/2014/main" id="{37953D94-6636-EB4D-B539-DC5B6D267A0B}"/>
               </a:ext>
             </a:extLst>
           </p:cNvPr>
@@ -12132,7 +11922,7 @@
           <p:cNvPr id="3" name="Text Placeholder 2">
             <a:extLst>
               <a:ext uri="{FF2B5EF4-FFF2-40B4-BE49-F238E27FC236}">
-                <a16:creationId xmlns:a16="http://schemas.microsoft.com/office/drawing/2014/main" id="{B165E966-009A-0B46-A81C-B42539BA9554}"/>
+                <a16:creationId xmlns:a16="http://schemas.microsoft.com/office/drawing/2014/main" id="{88191254-061B-3E43-9347-C296346C809B}"/>
               </a:ext>
             </a:extLst>
           </p:cNvPr>
@@ -12157,7 +11947,7 @@
           <p:cNvPr id="4" name="Title 3">
             <a:extLst>
               <a:ext uri="{FF2B5EF4-FFF2-40B4-BE49-F238E27FC236}">
-                <a16:creationId xmlns:a16="http://schemas.microsoft.com/office/drawing/2014/main" id="{B6793C40-AB58-464E-89C2-B817BED1ECC5}"/>
+                <a16:creationId xmlns:a16="http://schemas.microsoft.com/office/drawing/2014/main" id="{E16B13A9-922B-DA4A-9F55-8E286CBCB4F9}"/>
               </a:ext>
             </a:extLst>
           </p:cNvPr>
@@ -12175,7 +11965,7 @@
           <a:p>
             <a:r>
               <a:rPr lang="en-US" dirty="0"/>
-              <a:t>Inner Joins</a:t>
+              <a:t>Join Types</a:t>
             </a:r>
           </a:p>
         </p:txBody>
@@ -12183,7 +11973,7 @@
     </p:spTree>
     <p:extLst>
       <p:ext uri="{BB962C8B-B14F-4D97-AF65-F5344CB8AC3E}">
-        <p14:creationId xmlns:p14="http://schemas.microsoft.com/office/powerpoint/2010/main" val="570540719"/>
+        <p14:creationId xmlns:p14="http://schemas.microsoft.com/office/powerpoint/2010/main" val="2594980728"/>
       </p:ext>
     </p:extLst>
   </p:cSld>
@@ -12761,7 +12551,7 @@
           <p:cNvPr id="2" name="Subtitle 1">
             <a:extLst>
               <a:ext uri="{FF2B5EF4-FFF2-40B4-BE49-F238E27FC236}">
-                <a16:creationId xmlns:a16="http://schemas.microsoft.com/office/drawing/2014/main" id="{C0FDDA91-6F16-474A-B2C2-D541B2C6DC11}"/>
+                <a16:creationId xmlns:a16="http://schemas.microsoft.com/office/drawing/2014/main" id="{21E6FD3F-3A28-AA47-A971-90E2F63E6D64}"/>
               </a:ext>
             </a:extLst>
           </p:cNvPr>
@@ -12786,7 +12576,7 @@
           <p:cNvPr id="3" name="Text Placeholder 2">
             <a:extLst>
               <a:ext uri="{FF2B5EF4-FFF2-40B4-BE49-F238E27FC236}">
-                <a16:creationId xmlns:a16="http://schemas.microsoft.com/office/drawing/2014/main" id="{44800744-B562-7D4D-95DC-16B212585877}"/>
+                <a16:creationId xmlns:a16="http://schemas.microsoft.com/office/drawing/2014/main" id="{B165E966-009A-0B46-A81C-B42539BA9554}"/>
               </a:ext>
             </a:extLst>
           </p:cNvPr>
@@ -12811,7 +12601,7 @@
           <p:cNvPr id="4" name="Title 3">
             <a:extLst>
               <a:ext uri="{FF2B5EF4-FFF2-40B4-BE49-F238E27FC236}">
-                <a16:creationId xmlns:a16="http://schemas.microsoft.com/office/drawing/2014/main" id="{3851C2E4-3439-FC42-92E4-8AD466B1C754}"/>
+                <a16:creationId xmlns:a16="http://schemas.microsoft.com/office/drawing/2014/main" id="{B6793C40-AB58-464E-89C2-B817BED1ECC5}"/>
               </a:ext>
             </a:extLst>
           </p:cNvPr>
@@ -12829,7 +12619,7 @@
           <a:p>
             <a:r>
               <a:rPr lang="en-US" dirty="0"/>
-              <a:t>Left Joins</a:t>
+              <a:t>Inner Joins</a:t>
             </a:r>
           </a:p>
         </p:txBody>
@@ -12837,7 +12627,7 @@
     </p:spTree>
     <p:extLst>
       <p:ext uri="{BB962C8B-B14F-4D97-AF65-F5344CB8AC3E}">
-        <p14:creationId xmlns:p14="http://schemas.microsoft.com/office/powerpoint/2010/main" val="600015680"/>
+        <p14:creationId xmlns:p14="http://schemas.microsoft.com/office/powerpoint/2010/main" val="570540719"/>
       </p:ext>
     </p:extLst>
   </p:cSld>
@@ -12869,7 +12659,7 @@
           <p:cNvPr id="2" name="Subtitle 1">
             <a:extLst>
               <a:ext uri="{FF2B5EF4-FFF2-40B4-BE49-F238E27FC236}">
-                <a16:creationId xmlns:a16="http://schemas.microsoft.com/office/drawing/2014/main" id="{764E9717-32A5-204C-99BF-6241B2BA2C91}"/>
+                <a16:creationId xmlns:a16="http://schemas.microsoft.com/office/drawing/2014/main" id="{C0FDDA91-6F16-474A-B2C2-D541B2C6DC11}"/>
               </a:ext>
             </a:extLst>
           </p:cNvPr>
@@ -12894,7 +12684,7 @@
           <p:cNvPr id="3" name="Text Placeholder 2">
             <a:extLst>
               <a:ext uri="{FF2B5EF4-FFF2-40B4-BE49-F238E27FC236}">
-                <a16:creationId xmlns:a16="http://schemas.microsoft.com/office/drawing/2014/main" id="{96990DFE-A586-E247-815B-802AB3CE06D3}"/>
+                <a16:creationId xmlns:a16="http://schemas.microsoft.com/office/drawing/2014/main" id="{44800744-B562-7D4D-95DC-16B212585877}"/>
               </a:ext>
             </a:extLst>
           </p:cNvPr>
@@ -12919,7 +12709,7 @@
           <p:cNvPr id="4" name="Title 3">
             <a:extLst>
               <a:ext uri="{FF2B5EF4-FFF2-40B4-BE49-F238E27FC236}">
-                <a16:creationId xmlns:a16="http://schemas.microsoft.com/office/drawing/2014/main" id="{4C84724E-AE55-6B42-B5F9-3AF88CAEA3CD}"/>
+                <a16:creationId xmlns:a16="http://schemas.microsoft.com/office/drawing/2014/main" id="{3851C2E4-3439-FC42-92E4-8AD466B1C754}"/>
               </a:ext>
             </a:extLst>
           </p:cNvPr>
@@ -12937,7 +12727,7 @@
           <a:p>
             <a:r>
               <a:rPr lang="en-US" dirty="0"/>
-              <a:t>Right Joins</a:t>
+              <a:t>Left Joins</a:t>
             </a:r>
           </a:p>
         </p:txBody>
@@ -12945,7 +12735,7 @@
     </p:spTree>
     <p:extLst>
       <p:ext uri="{BB962C8B-B14F-4D97-AF65-F5344CB8AC3E}">
-        <p14:creationId xmlns:p14="http://schemas.microsoft.com/office/powerpoint/2010/main" val="2679670341"/>
+        <p14:creationId xmlns:p14="http://schemas.microsoft.com/office/powerpoint/2010/main" val="600015680"/>
       </p:ext>
     </p:extLst>
   </p:cSld>
@@ -12977,7 +12767,7 @@
           <p:cNvPr id="2" name="Subtitle 1">
             <a:extLst>
               <a:ext uri="{FF2B5EF4-FFF2-40B4-BE49-F238E27FC236}">
-                <a16:creationId xmlns:a16="http://schemas.microsoft.com/office/drawing/2014/main" id="{3BF363DC-AFB9-5747-892F-AAA5BD482BDD}"/>
+                <a16:creationId xmlns:a16="http://schemas.microsoft.com/office/drawing/2014/main" id="{764E9717-32A5-204C-99BF-6241B2BA2C91}"/>
               </a:ext>
             </a:extLst>
           </p:cNvPr>
@@ -13002,7 +12792,7 @@
           <p:cNvPr id="3" name="Text Placeholder 2">
             <a:extLst>
               <a:ext uri="{FF2B5EF4-FFF2-40B4-BE49-F238E27FC236}">
-                <a16:creationId xmlns:a16="http://schemas.microsoft.com/office/drawing/2014/main" id="{AB12E9FE-045D-9446-9034-B6BD944C8BC5}"/>
+                <a16:creationId xmlns:a16="http://schemas.microsoft.com/office/drawing/2014/main" id="{96990DFE-A586-E247-815B-802AB3CE06D3}"/>
               </a:ext>
             </a:extLst>
           </p:cNvPr>
@@ -13027,7 +12817,7 @@
           <p:cNvPr id="4" name="Title 3">
             <a:extLst>
               <a:ext uri="{FF2B5EF4-FFF2-40B4-BE49-F238E27FC236}">
-                <a16:creationId xmlns:a16="http://schemas.microsoft.com/office/drawing/2014/main" id="{1BED0FA6-ED76-7E49-AC9D-C3AD978AA6E4}"/>
+                <a16:creationId xmlns:a16="http://schemas.microsoft.com/office/drawing/2014/main" id="{4C84724E-AE55-6B42-B5F9-3AF88CAEA3CD}"/>
               </a:ext>
             </a:extLst>
           </p:cNvPr>
@@ -13045,7 +12835,7 @@
           <a:p>
             <a:r>
               <a:rPr lang="en-US" dirty="0"/>
-              <a:t>Outer Joins</a:t>
+              <a:t>Right Joins</a:t>
             </a:r>
           </a:p>
         </p:txBody>
@@ -13053,7 +12843,7 @@
     </p:spTree>
     <p:extLst>
       <p:ext uri="{BB962C8B-B14F-4D97-AF65-F5344CB8AC3E}">
-        <p14:creationId xmlns:p14="http://schemas.microsoft.com/office/powerpoint/2010/main" val="1136354697"/>
+        <p14:creationId xmlns:p14="http://schemas.microsoft.com/office/powerpoint/2010/main" val="2679670341"/>
       </p:ext>
     </p:extLst>
   </p:cSld>
@@ -13085,7 +12875,7 @@
           <p:cNvPr id="2" name="Subtitle 1">
             <a:extLst>
               <a:ext uri="{FF2B5EF4-FFF2-40B4-BE49-F238E27FC236}">
-                <a16:creationId xmlns:a16="http://schemas.microsoft.com/office/drawing/2014/main" id="{D6CE2481-2E49-BB44-9D6E-A58E29003D70}"/>
+                <a16:creationId xmlns:a16="http://schemas.microsoft.com/office/drawing/2014/main" id="{3BF363DC-AFB9-5747-892F-AAA5BD482BDD}"/>
               </a:ext>
             </a:extLst>
           </p:cNvPr>
@@ -13110,7 +12900,7 @@
           <p:cNvPr id="3" name="Text Placeholder 2">
             <a:extLst>
               <a:ext uri="{FF2B5EF4-FFF2-40B4-BE49-F238E27FC236}">
-                <a16:creationId xmlns:a16="http://schemas.microsoft.com/office/drawing/2014/main" id="{85D1720F-4013-894E-8999-1DE42EA799D1}"/>
+                <a16:creationId xmlns:a16="http://schemas.microsoft.com/office/drawing/2014/main" id="{AB12E9FE-045D-9446-9034-B6BD944C8BC5}"/>
               </a:ext>
             </a:extLst>
           </p:cNvPr>
@@ -13135,7 +12925,7 @@
           <p:cNvPr id="4" name="Title 3">
             <a:extLst>
               <a:ext uri="{FF2B5EF4-FFF2-40B4-BE49-F238E27FC236}">
-                <a16:creationId xmlns:a16="http://schemas.microsoft.com/office/drawing/2014/main" id="{F40906B0-F382-D94A-99D7-F0A5538FEFF2}"/>
+                <a16:creationId xmlns:a16="http://schemas.microsoft.com/office/drawing/2014/main" id="{1BED0FA6-ED76-7E49-AC9D-C3AD978AA6E4}"/>
               </a:ext>
             </a:extLst>
           </p:cNvPr>
@@ -13153,20 +12943,15 @@
           <a:p>
             <a:r>
               <a:rPr lang="en-US" dirty="0"/>
-              <a:t>The Shape of Your</a:t>
-            </a:r>
-            <a:r>
-              <a:rPr lang="en-US" baseline="0" dirty="0"/>
-              <a:t> Data</a:t>
-            </a:r>
-            <a:endParaRPr lang="en-US" dirty="0"/>
+              <a:t>Outer Joins</a:t>
+            </a:r>
           </a:p>
         </p:txBody>
       </p:sp>
     </p:spTree>
     <p:extLst>
       <p:ext uri="{BB962C8B-B14F-4D97-AF65-F5344CB8AC3E}">
-        <p14:creationId xmlns:p14="http://schemas.microsoft.com/office/powerpoint/2010/main" val="3021186209"/>
+        <p14:creationId xmlns:p14="http://schemas.microsoft.com/office/powerpoint/2010/main" val="1136354697"/>
       </p:ext>
     </p:extLst>
   </p:cSld>
@@ -13198,7 +12983,7 @@
           <p:cNvPr id="2" name="Subtitle 1">
             <a:extLst>
               <a:ext uri="{FF2B5EF4-FFF2-40B4-BE49-F238E27FC236}">
-                <a16:creationId xmlns:a16="http://schemas.microsoft.com/office/drawing/2014/main" id="{9D046E31-E6B2-424A-AD01-24DC6A841514}"/>
+                <a16:creationId xmlns:a16="http://schemas.microsoft.com/office/drawing/2014/main" id="{D6CE2481-2E49-BB44-9D6E-A58E29003D70}"/>
               </a:ext>
             </a:extLst>
           </p:cNvPr>
@@ -13223,7 +13008,7 @@
           <p:cNvPr id="3" name="Text Placeholder 2">
             <a:extLst>
               <a:ext uri="{FF2B5EF4-FFF2-40B4-BE49-F238E27FC236}">
-                <a16:creationId xmlns:a16="http://schemas.microsoft.com/office/drawing/2014/main" id="{1ABADC0C-5EB1-E742-9C50-DC80F72FCAC8}"/>
+                <a16:creationId xmlns:a16="http://schemas.microsoft.com/office/drawing/2014/main" id="{85D1720F-4013-894E-8999-1DE42EA799D1}"/>
               </a:ext>
             </a:extLst>
           </p:cNvPr>
@@ -13248,7 +13033,7 @@
           <p:cNvPr id="4" name="Title 3">
             <a:extLst>
               <a:ext uri="{FF2B5EF4-FFF2-40B4-BE49-F238E27FC236}">
-                <a16:creationId xmlns:a16="http://schemas.microsoft.com/office/drawing/2014/main" id="{91923162-363D-1B4C-8F78-0991C5D9D29E}"/>
+                <a16:creationId xmlns:a16="http://schemas.microsoft.com/office/drawing/2014/main" id="{F40906B0-F382-D94A-99D7-F0A5538FEFF2}"/>
               </a:ext>
             </a:extLst>
           </p:cNvPr>
@@ -13266,15 +13051,20 @@
           <a:p>
             <a:r>
               <a:rPr lang="en-US" dirty="0"/>
-              <a:t>Missing Data</a:t>
-            </a:r>
+              <a:t>The Shape of Your</a:t>
+            </a:r>
+            <a:r>
+              <a:rPr lang="en-US" baseline="0" dirty="0"/>
+              <a:t> Data</a:t>
+            </a:r>
+            <a:endParaRPr lang="en-US" dirty="0"/>
           </a:p>
         </p:txBody>
       </p:sp>
     </p:spTree>
     <p:extLst>
       <p:ext uri="{BB962C8B-B14F-4D97-AF65-F5344CB8AC3E}">
-        <p14:creationId xmlns:p14="http://schemas.microsoft.com/office/powerpoint/2010/main" val="3069741555"/>
+        <p14:creationId xmlns:p14="http://schemas.microsoft.com/office/powerpoint/2010/main" val="3021186209"/>
       </p:ext>
     </p:extLst>
   </p:cSld>
@@ -13306,7 +13096,7 @@
           <p:cNvPr id="2" name="Subtitle 1">
             <a:extLst>
               <a:ext uri="{FF2B5EF4-FFF2-40B4-BE49-F238E27FC236}">
-                <a16:creationId xmlns:a16="http://schemas.microsoft.com/office/drawing/2014/main" id="{A5058F48-D219-7545-9150-CF37C9DA6679}"/>
+                <a16:creationId xmlns:a16="http://schemas.microsoft.com/office/drawing/2014/main" id="{9D046E31-E6B2-424A-AD01-24DC6A841514}"/>
               </a:ext>
             </a:extLst>
           </p:cNvPr>
@@ -13331,7 +13121,7 @@
           <p:cNvPr id="3" name="Text Placeholder 2">
             <a:extLst>
               <a:ext uri="{FF2B5EF4-FFF2-40B4-BE49-F238E27FC236}">
-                <a16:creationId xmlns:a16="http://schemas.microsoft.com/office/drawing/2014/main" id="{1FDFA2B8-FC1D-D24E-92AF-C85916024258}"/>
+                <a16:creationId xmlns:a16="http://schemas.microsoft.com/office/drawing/2014/main" id="{1ABADC0C-5EB1-E742-9C50-DC80F72FCAC8}"/>
               </a:ext>
             </a:extLst>
           </p:cNvPr>
@@ -13356,7 +13146,7 @@
           <p:cNvPr id="4" name="Title 3">
             <a:extLst>
               <a:ext uri="{FF2B5EF4-FFF2-40B4-BE49-F238E27FC236}">
-                <a16:creationId xmlns:a16="http://schemas.microsoft.com/office/drawing/2014/main" id="{261279C3-A262-E741-8313-4A5E1F8CEAAE}"/>
+                <a16:creationId xmlns:a16="http://schemas.microsoft.com/office/drawing/2014/main" id="{91923162-363D-1B4C-8F78-0991C5D9D29E}"/>
               </a:ext>
             </a:extLst>
           </p:cNvPr>
@@ -13374,20 +13164,15 @@
           <a:p>
             <a:r>
               <a:rPr lang="en-US" dirty="0"/>
-              <a:t>Finding</a:t>
-            </a:r>
-            <a:r>
-              <a:rPr lang="en-US" baseline="0" dirty="0"/>
-              <a:t> Missing Records</a:t>
-            </a:r>
-            <a:endParaRPr lang="en-US" dirty="0"/>
+              <a:t>Missing Data</a:t>
+            </a:r>
           </a:p>
         </p:txBody>
       </p:sp>
     </p:spTree>
     <p:extLst>
       <p:ext uri="{BB962C8B-B14F-4D97-AF65-F5344CB8AC3E}">
-        <p14:creationId xmlns:p14="http://schemas.microsoft.com/office/powerpoint/2010/main" val="4028250988"/>
+        <p14:creationId xmlns:p14="http://schemas.microsoft.com/office/powerpoint/2010/main" val="3069741555"/>
       </p:ext>
     </p:extLst>
   </p:cSld>
@@ -13419,7 +13204,7 @@
           <p:cNvPr id="2" name="Subtitle 1">
             <a:extLst>
               <a:ext uri="{FF2B5EF4-FFF2-40B4-BE49-F238E27FC236}">
-                <a16:creationId xmlns:a16="http://schemas.microsoft.com/office/drawing/2014/main" id="{383E0E86-9364-D544-9A33-2CBCED5E4D08}"/>
+                <a16:creationId xmlns:a16="http://schemas.microsoft.com/office/drawing/2014/main" id="{A5058F48-D219-7545-9150-CF37C9DA6679}"/>
               </a:ext>
             </a:extLst>
           </p:cNvPr>
@@ -13444,7 +13229,7 @@
           <p:cNvPr id="3" name="Text Placeholder 2">
             <a:extLst>
               <a:ext uri="{FF2B5EF4-FFF2-40B4-BE49-F238E27FC236}">
-                <a16:creationId xmlns:a16="http://schemas.microsoft.com/office/drawing/2014/main" id="{6E386924-6B21-1B45-93FB-2073DC8EA8B5}"/>
+                <a16:creationId xmlns:a16="http://schemas.microsoft.com/office/drawing/2014/main" id="{1FDFA2B8-FC1D-D24E-92AF-C85916024258}"/>
               </a:ext>
             </a:extLst>
           </p:cNvPr>
@@ -13469,7 +13254,7 @@
           <p:cNvPr id="4" name="Title 3">
             <a:extLst>
               <a:ext uri="{FF2B5EF4-FFF2-40B4-BE49-F238E27FC236}">
-                <a16:creationId xmlns:a16="http://schemas.microsoft.com/office/drawing/2014/main" id="{5F8B3FAC-76B5-1B44-ACE1-4D3D0E1DE523}"/>
+                <a16:creationId xmlns:a16="http://schemas.microsoft.com/office/drawing/2014/main" id="{261279C3-A262-E741-8313-4A5E1F8CEAAE}"/>
               </a:ext>
             </a:extLst>
           </p:cNvPr>
@@ -13487,15 +13272,20 @@
           <a:p>
             <a:r>
               <a:rPr lang="en-US" dirty="0"/>
-              <a:t>Bringing It All Together</a:t>
-            </a:r>
+              <a:t>Finding</a:t>
+            </a:r>
+            <a:r>
+              <a:rPr lang="en-US" baseline="0" dirty="0"/>
+              <a:t> Missing Records</a:t>
+            </a:r>
+            <a:endParaRPr lang="en-US" dirty="0"/>
           </a:p>
         </p:txBody>
       </p:sp>
     </p:spTree>
     <p:extLst>
       <p:ext uri="{BB962C8B-B14F-4D97-AF65-F5344CB8AC3E}">
-        <p14:creationId xmlns:p14="http://schemas.microsoft.com/office/powerpoint/2010/main" val="130460662"/>
+        <p14:creationId xmlns:p14="http://schemas.microsoft.com/office/powerpoint/2010/main" val="4028250988"/>
       </p:ext>
     </p:extLst>
   </p:cSld>
@@ -13527,7 +13317,7 @@
           <p:cNvPr id="2" name="Subtitle 1">
             <a:extLst>
               <a:ext uri="{FF2B5EF4-FFF2-40B4-BE49-F238E27FC236}">
-                <a16:creationId xmlns:a16="http://schemas.microsoft.com/office/drawing/2014/main" id="{2D5E834E-5B7A-2B4E-B858-B6A32B587303}"/>
+                <a16:creationId xmlns:a16="http://schemas.microsoft.com/office/drawing/2014/main" id="{383E0E86-9364-D544-9A33-2CBCED5E4D08}"/>
               </a:ext>
             </a:extLst>
           </p:cNvPr>
@@ -13552,7 +13342,7 @@
           <p:cNvPr id="3" name="Text Placeholder 2">
             <a:extLst>
               <a:ext uri="{FF2B5EF4-FFF2-40B4-BE49-F238E27FC236}">
-                <a16:creationId xmlns:a16="http://schemas.microsoft.com/office/drawing/2014/main" id="{A4443088-FEA6-234B-AB99-42466F3677BE}"/>
+                <a16:creationId xmlns:a16="http://schemas.microsoft.com/office/drawing/2014/main" id="{6E386924-6B21-1B45-93FB-2073DC8EA8B5}"/>
               </a:ext>
             </a:extLst>
           </p:cNvPr>
@@ -13577,7 +13367,7 @@
           <p:cNvPr id="4" name="Title 3">
             <a:extLst>
               <a:ext uri="{FF2B5EF4-FFF2-40B4-BE49-F238E27FC236}">
-                <a16:creationId xmlns:a16="http://schemas.microsoft.com/office/drawing/2014/main" id="{179C3DEC-70AC-AB42-BEB7-99CBEAF719E4}"/>
+                <a16:creationId xmlns:a16="http://schemas.microsoft.com/office/drawing/2014/main" id="{5F8B3FAC-76B5-1B44-ACE1-4D3D0E1DE523}"/>
               </a:ext>
             </a:extLst>
           </p:cNvPr>
@@ -13595,7 +13385,7 @@
           <a:p>
             <a:r>
               <a:rPr lang="en-US" dirty="0"/>
-              <a:t>Join Clause Recommendations</a:t>
+              <a:t>Bringing It All Together</a:t>
             </a:r>
           </a:p>
         </p:txBody>
@@ -13603,7 +13393,7 @@
     </p:spTree>
     <p:extLst>
       <p:ext uri="{BB962C8B-B14F-4D97-AF65-F5344CB8AC3E}">
-        <p14:creationId xmlns:p14="http://schemas.microsoft.com/office/powerpoint/2010/main" val="614002757"/>
+        <p14:creationId xmlns:p14="http://schemas.microsoft.com/office/powerpoint/2010/main" val="130460662"/>
       </p:ext>
     </p:extLst>
   </p:cSld>
@@ -13632,10 +13422,60 @@
       </p:grpSpPr>
       <p:sp>
         <p:nvSpPr>
+          <p:cNvPr id="2" name="Subtitle 1">
+            <a:extLst>
+              <a:ext uri="{FF2B5EF4-FFF2-40B4-BE49-F238E27FC236}">
+                <a16:creationId xmlns:a16="http://schemas.microsoft.com/office/drawing/2014/main" id="{2D5E834E-5B7A-2B4E-B858-B6A32B587303}"/>
+              </a:ext>
+            </a:extLst>
+          </p:cNvPr>
+          <p:cNvSpPr>
+            <a:spLocks noGrp="1"/>
+          </p:cNvSpPr>
+          <p:nvPr>
+            <p:ph type="subTitle" idx="1"/>
+          </p:nvPr>
+        </p:nvSpPr>
+        <p:spPr/>
+        <p:txBody>
+          <a:bodyPr/>
+          <a:lstStyle/>
+          <a:p>
+            <a:endParaRPr lang="en-US"/>
+          </a:p>
+        </p:txBody>
+      </p:sp>
+      <p:sp>
+        <p:nvSpPr>
+          <p:cNvPr id="3" name="Text Placeholder 2">
+            <a:extLst>
+              <a:ext uri="{FF2B5EF4-FFF2-40B4-BE49-F238E27FC236}">
+                <a16:creationId xmlns:a16="http://schemas.microsoft.com/office/drawing/2014/main" id="{A4443088-FEA6-234B-AB99-42466F3677BE}"/>
+              </a:ext>
+            </a:extLst>
+          </p:cNvPr>
+          <p:cNvSpPr>
+            <a:spLocks noGrp="1"/>
+          </p:cNvSpPr>
+          <p:nvPr>
+            <p:ph type="body" sz="quarter" idx="11"/>
+          </p:nvPr>
+        </p:nvSpPr>
+        <p:spPr/>
+        <p:txBody>
+          <a:bodyPr/>
+          <a:lstStyle/>
+          <a:p>
+            <a:endParaRPr lang="en-US"/>
+          </a:p>
+        </p:txBody>
+      </p:sp>
+      <p:sp>
+        <p:nvSpPr>
           <p:cNvPr id="4" name="Title 3">
             <a:extLst>
               <a:ext uri="{FF2B5EF4-FFF2-40B4-BE49-F238E27FC236}">
-                <a16:creationId xmlns:a16="http://schemas.microsoft.com/office/drawing/2014/main" id="{1E6D96E9-B635-0245-9098-C1FAA390A091}"/>
+                <a16:creationId xmlns:a16="http://schemas.microsoft.com/office/drawing/2014/main" id="{179C3DEC-70AC-AB42-BEB7-99CBEAF719E4}"/>
               </a:ext>
             </a:extLst>
           </p:cNvPr>
@@ -13653,7 +13493,7 @@
           <a:p>
             <a:r>
               <a:rPr lang="en-US" dirty="0"/>
-              <a:t>Part II: Transform</a:t>
+              <a:t>Join Clause Recommendations</a:t>
             </a:r>
           </a:p>
         </p:txBody>
@@ -13661,7 +13501,7 @@
     </p:spTree>
     <p:extLst>
       <p:ext uri="{BB962C8B-B14F-4D97-AF65-F5344CB8AC3E}">
-        <p14:creationId xmlns:p14="http://schemas.microsoft.com/office/powerpoint/2010/main" val="1657269070"/>
+        <p14:creationId xmlns:p14="http://schemas.microsoft.com/office/powerpoint/2010/main" val="614002757"/>
       </p:ext>
     </p:extLst>
   </p:cSld>
@@ -13690,10 +13530,10 @@
       </p:grpSpPr>
       <p:sp>
         <p:nvSpPr>
-          <p:cNvPr id="2" name="Title 1">
+          <p:cNvPr id="4" name="Title 3">
             <a:extLst>
               <a:ext uri="{FF2B5EF4-FFF2-40B4-BE49-F238E27FC236}">
-                <a16:creationId xmlns:a16="http://schemas.microsoft.com/office/drawing/2014/main" id="{2DCC4BB7-7A9D-DE44-81A7-84A15E54D20B}"/>
+                <a16:creationId xmlns:a16="http://schemas.microsoft.com/office/drawing/2014/main" id="{1E6D96E9-B635-0245-9098-C1FAA390A091}"/>
               </a:ext>
             </a:extLst>
           </p:cNvPr>
@@ -13711,20 +13551,15 @@
           <a:p>
             <a:r>
               <a:rPr lang="en-US" dirty="0"/>
-              <a:t>Module 5: Auditing &amp; Cleaning</a:t>
-            </a:r>
-            <a:r>
-              <a:rPr lang="en-US" baseline="0" dirty="0"/>
-              <a:t> Your Data</a:t>
-            </a:r>
-            <a:endParaRPr lang="en-US" dirty="0"/>
+              <a:t>Part II: Transform</a:t>
+            </a:r>
           </a:p>
         </p:txBody>
       </p:sp>
     </p:spTree>
     <p:extLst>
       <p:ext uri="{BB962C8B-B14F-4D97-AF65-F5344CB8AC3E}">
-        <p14:creationId xmlns:p14="http://schemas.microsoft.com/office/powerpoint/2010/main" val="228763628"/>
+        <p14:creationId xmlns:p14="http://schemas.microsoft.com/office/powerpoint/2010/main" val="1657269070"/>
       </p:ext>
     </p:extLst>
   </p:cSld>
@@ -13930,10 +13765,10 @@
       </p:grpSpPr>
       <p:sp>
         <p:nvSpPr>
-          <p:cNvPr id="3" name="Title 2">
+          <p:cNvPr id="2" name="Title 1">
             <a:extLst>
               <a:ext uri="{FF2B5EF4-FFF2-40B4-BE49-F238E27FC236}">
-                <a16:creationId xmlns:a16="http://schemas.microsoft.com/office/drawing/2014/main" id="{6A8948BA-33DF-8D4F-BE0B-53151B6B2FE4}"/>
+                <a16:creationId xmlns:a16="http://schemas.microsoft.com/office/drawing/2014/main" id="{2DCC4BB7-7A9D-DE44-81A7-84A15E54D20B}"/>
               </a:ext>
             </a:extLst>
           </p:cNvPr>
@@ -13951,40 +13786,20 @@
           <a:p>
             <a:r>
               <a:rPr lang="en-US" dirty="0"/>
-              <a:t>Auditing Your Data</a:t>
-            </a:r>
-          </a:p>
-        </p:txBody>
-      </p:sp>
-      <p:sp>
-        <p:nvSpPr>
-          <p:cNvPr id="4" name="Text Placeholder 3">
-            <a:extLst>
-              <a:ext uri="{FF2B5EF4-FFF2-40B4-BE49-F238E27FC236}">
-                <a16:creationId xmlns:a16="http://schemas.microsoft.com/office/drawing/2014/main" id="{94D8F0A2-309B-B545-8C29-D643FC88803F}"/>
-              </a:ext>
-            </a:extLst>
-          </p:cNvPr>
-          <p:cNvSpPr>
-            <a:spLocks noGrp="1"/>
-          </p:cNvSpPr>
-          <p:nvPr>
-            <p:ph type="body" sz="quarter" idx="10"/>
-          </p:nvPr>
-        </p:nvSpPr>
-        <p:spPr/>
-        <p:txBody>
-          <a:bodyPr/>
-          <a:lstStyle/>
-          <a:p>
-            <a:endParaRPr lang="en-US"/>
+              <a:t>Module 5: Auditing &amp; Cleaning</a:t>
+            </a:r>
+            <a:r>
+              <a:rPr lang="en-US" baseline="0" dirty="0"/>
+              <a:t> Your Data</a:t>
+            </a:r>
+            <a:endParaRPr lang="en-US" dirty="0"/>
           </a:p>
         </p:txBody>
       </p:sp>
     </p:spTree>
     <p:extLst>
       <p:ext uri="{BB962C8B-B14F-4D97-AF65-F5344CB8AC3E}">
-        <p14:creationId xmlns:p14="http://schemas.microsoft.com/office/powerpoint/2010/main" val="2617968978"/>
+        <p14:creationId xmlns:p14="http://schemas.microsoft.com/office/powerpoint/2010/main" val="228763628"/>
       </p:ext>
     </p:extLst>
   </p:cSld>
@@ -14013,10 +13828,10 @@
       </p:grpSpPr>
       <p:sp>
         <p:nvSpPr>
-          <p:cNvPr id="2" name="Title 1">
+          <p:cNvPr id="3" name="Title 2">
             <a:extLst>
               <a:ext uri="{FF2B5EF4-FFF2-40B4-BE49-F238E27FC236}">
-                <a16:creationId xmlns:a16="http://schemas.microsoft.com/office/drawing/2014/main" id="{0F73A750-FCCE-1B43-B19C-3EF29425C208}"/>
+                <a16:creationId xmlns:a16="http://schemas.microsoft.com/office/drawing/2014/main" id="{6A8948BA-33DF-8D4F-BE0B-53151B6B2FE4}"/>
               </a:ext>
             </a:extLst>
           </p:cNvPr>
@@ -14034,17 +13849,17 @@
           <a:p>
             <a:r>
               <a:rPr lang="en-US" dirty="0"/>
-              <a:t>Cleaning Your Data</a:t>
-            </a:r>
-          </a:p>
-        </p:txBody>
-      </p:sp>
-      <p:sp>
-        <p:nvSpPr>
-          <p:cNvPr id="3" name="Text Placeholder 2">
+              <a:t>Auditing Your Data</a:t>
+            </a:r>
+          </a:p>
+        </p:txBody>
+      </p:sp>
+      <p:sp>
+        <p:nvSpPr>
+          <p:cNvPr id="4" name="Text Placeholder 3">
             <a:extLst>
               <a:ext uri="{FF2B5EF4-FFF2-40B4-BE49-F238E27FC236}">
-                <a16:creationId xmlns:a16="http://schemas.microsoft.com/office/drawing/2014/main" id="{47EB4147-976C-5F4C-8296-9593979C5497}"/>
+                <a16:creationId xmlns:a16="http://schemas.microsoft.com/office/drawing/2014/main" id="{94D8F0A2-309B-B545-8C29-D643FC88803F}"/>
               </a:ext>
             </a:extLst>
           </p:cNvPr>
@@ -14067,7 +13882,7 @@
     </p:spTree>
     <p:extLst>
       <p:ext uri="{BB962C8B-B14F-4D97-AF65-F5344CB8AC3E}">
-        <p14:creationId xmlns:p14="http://schemas.microsoft.com/office/powerpoint/2010/main" val="520519833"/>
+        <p14:creationId xmlns:p14="http://schemas.microsoft.com/office/powerpoint/2010/main" val="2617968978"/>
       </p:ext>
     </p:extLst>
   </p:cSld>
@@ -14099,7 +13914,7 @@
           <p:cNvPr id="2" name="Title 1">
             <a:extLst>
               <a:ext uri="{FF2B5EF4-FFF2-40B4-BE49-F238E27FC236}">
-                <a16:creationId xmlns:a16="http://schemas.microsoft.com/office/drawing/2014/main" id="{8AADCE9C-567B-F343-AD3A-DCEED7751871}"/>
+                <a16:creationId xmlns:a16="http://schemas.microsoft.com/office/drawing/2014/main" id="{0F73A750-FCCE-1B43-B19C-3EF29425C208}"/>
               </a:ext>
             </a:extLst>
           </p:cNvPr>
@@ -14117,7 +13932,7 @@
           <a:p>
             <a:r>
               <a:rPr lang="en-US" dirty="0"/>
-              <a:t>Merge and Clean</a:t>
+              <a:t>Cleaning Your Data</a:t>
             </a:r>
           </a:p>
         </p:txBody>
@@ -14127,7 +13942,7 @@
           <p:cNvPr id="3" name="Text Placeholder 2">
             <a:extLst>
               <a:ext uri="{FF2B5EF4-FFF2-40B4-BE49-F238E27FC236}">
-                <a16:creationId xmlns:a16="http://schemas.microsoft.com/office/drawing/2014/main" id="{9E15A277-1323-9644-A078-4090B3729416}"/>
+                <a16:creationId xmlns:a16="http://schemas.microsoft.com/office/drawing/2014/main" id="{47EB4147-976C-5F4C-8296-9593979C5497}"/>
               </a:ext>
             </a:extLst>
           </p:cNvPr>
@@ -14150,7 +13965,7 @@
     </p:spTree>
     <p:extLst>
       <p:ext uri="{BB962C8B-B14F-4D97-AF65-F5344CB8AC3E}">
-        <p14:creationId xmlns:p14="http://schemas.microsoft.com/office/powerpoint/2010/main" val="3260361871"/>
+        <p14:creationId xmlns:p14="http://schemas.microsoft.com/office/powerpoint/2010/main" val="520519833"/>
       </p:ext>
     </p:extLst>
   </p:cSld>
@@ -14182,7 +13997,7 @@
           <p:cNvPr id="2" name="Title 1">
             <a:extLst>
               <a:ext uri="{FF2B5EF4-FFF2-40B4-BE49-F238E27FC236}">
-                <a16:creationId xmlns:a16="http://schemas.microsoft.com/office/drawing/2014/main" id="{0F9C471B-4CB9-534B-AF00-E0FEFDE63E75}"/>
+                <a16:creationId xmlns:a16="http://schemas.microsoft.com/office/drawing/2014/main" id="{8AADCE9C-567B-F343-AD3A-DCEED7751871}"/>
               </a:ext>
             </a:extLst>
           </p:cNvPr>
@@ -14200,7 +14015,7 @@
           <a:p>
             <a:r>
               <a:rPr lang="en-US" dirty="0"/>
-              <a:t>Making Data More Consistent</a:t>
+              <a:t>Merge and Clean</a:t>
             </a:r>
           </a:p>
         </p:txBody>
@@ -14210,7 +14025,7 @@
           <p:cNvPr id="3" name="Text Placeholder 2">
             <a:extLst>
               <a:ext uri="{FF2B5EF4-FFF2-40B4-BE49-F238E27FC236}">
-                <a16:creationId xmlns:a16="http://schemas.microsoft.com/office/drawing/2014/main" id="{F45FAE89-9E67-0A43-A422-22847A7FD8CA}"/>
+                <a16:creationId xmlns:a16="http://schemas.microsoft.com/office/drawing/2014/main" id="{9E15A277-1323-9644-A078-4090B3729416}"/>
               </a:ext>
             </a:extLst>
           </p:cNvPr>
@@ -14233,7 +14048,7 @@
     </p:spTree>
     <p:extLst>
       <p:ext uri="{BB962C8B-B14F-4D97-AF65-F5344CB8AC3E}">
-        <p14:creationId xmlns:p14="http://schemas.microsoft.com/office/powerpoint/2010/main" val="3958965914"/>
+        <p14:creationId xmlns:p14="http://schemas.microsoft.com/office/powerpoint/2010/main" val="3260361871"/>
       </p:ext>
     </p:extLst>
   </p:cSld>
@@ -14265,7 +14080,7 @@
           <p:cNvPr id="2" name="Title 1">
             <a:extLst>
               <a:ext uri="{FF2B5EF4-FFF2-40B4-BE49-F238E27FC236}">
-                <a16:creationId xmlns:a16="http://schemas.microsoft.com/office/drawing/2014/main" id="{2E92257E-A8A0-2740-A0E2-3034B8C6ADD9}"/>
+                <a16:creationId xmlns:a16="http://schemas.microsoft.com/office/drawing/2014/main" id="{0F9C471B-4CB9-534B-AF00-E0FEFDE63E75}"/>
               </a:ext>
             </a:extLst>
           </p:cNvPr>
@@ -14283,7 +14098,7 @@
           <a:p>
             <a:r>
               <a:rPr lang="en-US" dirty="0"/>
-              <a:t>Splitting Fields</a:t>
+              <a:t>Making Data More Consistent</a:t>
             </a:r>
           </a:p>
         </p:txBody>
@@ -14293,7 +14108,7 @@
           <p:cNvPr id="3" name="Text Placeholder 2">
             <a:extLst>
               <a:ext uri="{FF2B5EF4-FFF2-40B4-BE49-F238E27FC236}">
-                <a16:creationId xmlns:a16="http://schemas.microsoft.com/office/drawing/2014/main" id="{20C4FAF8-0C73-5A41-8B13-61EF434F64B4}"/>
+                <a16:creationId xmlns:a16="http://schemas.microsoft.com/office/drawing/2014/main" id="{F45FAE89-9E67-0A43-A422-22847A7FD8CA}"/>
               </a:ext>
             </a:extLst>
           </p:cNvPr>
@@ -14316,7 +14131,7 @@
     </p:spTree>
     <p:extLst>
       <p:ext uri="{BB962C8B-B14F-4D97-AF65-F5344CB8AC3E}">
-        <p14:creationId xmlns:p14="http://schemas.microsoft.com/office/powerpoint/2010/main" val="49218107"/>
+        <p14:creationId xmlns:p14="http://schemas.microsoft.com/office/powerpoint/2010/main" val="3958965914"/>
       </p:ext>
     </p:extLst>
   </p:cSld>
@@ -14348,7 +14163,7 @@
           <p:cNvPr id="2" name="Title 1">
             <a:extLst>
               <a:ext uri="{FF2B5EF4-FFF2-40B4-BE49-F238E27FC236}">
-                <a16:creationId xmlns:a16="http://schemas.microsoft.com/office/drawing/2014/main" id="{8ECBCB28-8413-5140-A949-761083F81470}"/>
+                <a16:creationId xmlns:a16="http://schemas.microsoft.com/office/drawing/2014/main" id="{2E92257E-A8A0-2740-A0E2-3034B8C6ADD9}"/>
               </a:ext>
             </a:extLst>
           </p:cNvPr>
@@ -14366,7 +14181,7 @@
           <a:p>
             <a:r>
               <a:rPr lang="en-US" dirty="0"/>
-              <a:t>Recommendations</a:t>
+              <a:t>Splitting Fields</a:t>
             </a:r>
           </a:p>
         </p:txBody>
@@ -14376,7 +14191,7 @@
           <p:cNvPr id="3" name="Text Placeholder 2">
             <a:extLst>
               <a:ext uri="{FF2B5EF4-FFF2-40B4-BE49-F238E27FC236}">
-                <a16:creationId xmlns:a16="http://schemas.microsoft.com/office/drawing/2014/main" id="{DE38BA79-005D-F748-8EF0-DDBDB31CFBF0}"/>
+                <a16:creationId xmlns:a16="http://schemas.microsoft.com/office/drawing/2014/main" id="{20C4FAF8-0C73-5A41-8B13-61EF434F64B4}"/>
               </a:ext>
             </a:extLst>
           </p:cNvPr>
@@ -14399,7 +14214,7 @@
     </p:spTree>
     <p:extLst>
       <p:ext uri="{BB962C8B-B14F-4D97-AF65-F5344CB8AC3E}">
-        <p14:creationId xmlns:p14="http://schemas.microsoft.com/office/powerpoint/2010/main" val="3708025470"/>
+        <p14:creationId xmlns:p14="http://schemas.microsoft.com/office/powerpoint/2010/main" val="49218107"/>
       </p:ext>
     </p:extLst>
   </p:cSld>
@@ -14431,7 +14246,7 @@
           <p:cNvPr id="2" name="Title 1">
             <a:extLst>
               <a:ext uri="{FF2B5EF4-FFF2-40B4-BE49-F238E27FC236}">
-                <a16:creationId xmlns:a16="http://schemas.microsoft.com/office/drawing/2014/main" id="{56B44BDD-EA88-2D47-A6B7-E02FE22AD315}"/>
+                <a16:creationId xmlns:a16="http://schemas.microsoft.com/office/drawing/2014/main" id="{8ECBCB28-8413-5140-A949-761083F81470}"/>
               </a:ext>
             </a:extLst>
           </p:cNvPr>
@@ -14449,7 +14264,7 @@
           <a:p>
             <a:r>
               <a:rPr lang="en-US" dirty="0"/>
-              <a:t>Handling NULL Values</a:t>
+              <a:t>Recommendations</a:t>
             </a:r>
           </a:p>
         </p:txBody>
@@ -14459,7 +14274,7 @@
           <p:cNvPr id="3" name="Text Placeholder 2">
             <a:extLst>
               <a:ext uri="{FF2B5EF4-FFF2-40B4-BE49-F238E27FC236}">
-                <a16:creationId xmlns:a16="http://schemas.microsoft.com/office/drawing/2014/main" id="{35B8F14B-39CF-AF41-99E1-2E843C247A56}"/>
+                <a16:creationId xmlns:a16="http://schemas.microsoft.com/office/drawing/2014/main" id="{DE38BA79-005D-F748-8EF0-DDBDB31CFBF0}"/>
               </a:ext>
             </a:extLst>
           </p:cNvPr>
@@ -14482,7 +14297,7 @@
     </p:spTree>
     <p:extLst>
       <p:ext uri="{BB962C8B-B14F-4D97-AF65-F5344CB8AC3E}">
-        <p14:creationId xmlns:p14="http://schemas.microsoft.com/office/powerpoint/2010/main" val="3654839068"/>
+        <p14:creationId xmlns:p14="http://schemas.microsoft.com/office/powerpoint/2010/main" val="3708025470"/>
       </p:ext>
     </p:extLst>
   </p:cSld>
@@ -14514,7 +14329,7 @@
           <p:cNvPr id="2" name="Title 1">
             <a:extLst>
               <a:ext uri="{FF2B5EF4-FFF2-40B4-BE49-F238E27FC236}">
-                <a16:creationId xmlns:a16="http://schemas.microsoft.com/office/drawing/2014/main" id="{505FEF39-4D4F-234C-A7CC-3D508B076ECC}"/>
+                <a16:creationId xmlns:a16="http://schemas.microsoft.com/office/drawing/2014/main" id="{56B44BDD-EA88-2D47-A6B7-E02FE22AD315}"/>
               </a:ext>
             </a:extLst>
           </p:cNvPr>
@@ -14532,7 +14347,7 @@
           <a:p>
             <a:r>
               <a:rPr lang="en-US" dirty="0"/>
-              <a:t>Filtering Records</a:t>
+              <a:t>Handling NULL Values</a:t>
             </a:r>
           </a:p>
         </p:txBody>
@@ -14542,7 +14357,7 @@
           <p:cNvPr id="3" name="Text Placeholder 2">
             <a:extLst>
               <a:ext uri="{FF2B5EF4-FFF2-40B4-BE49-F238E27FC236}">
-                <a16:creationId xmlns:a16="http://schemas.microsoft.com/office/drawing/2014/main" id="{F0A2B6CF-1628-4546-AF20-667E71376CF7}"/>
+                <a16:creationId xmlns:a16="http://schemas.microsoft.com/office/drawing/2014/main" id="{35B8F14B-39CF-AF41-99E1-2E843C247A56}"/>
               </a:ext>
             </a:extLst>
           </p:cNvPr>
@@ -14565,7 +14380,7 @@
     </p:spTree>
     <p:extLst>
       <p:ext uri="{BB962C8B-B14F-4D97-AF65-F5344CB8AC3E}">
-        <p14:creationId xmlns:p14="http://schemas.microsoft.com/office/powerpoint/2010/main" val="1615717970"/>
+        <p14:creationId xmlns:p14="http://schemas.microsoft.com/office/powerpoint/2010/main" val="3654839068"/>
       </p:ext>
     </p:extLst>
   </p:cSld>
@@ -14597,7 +14412,7 @@
           <p:cNvPr id="2" name="Title 1">
             <a:extLst>
               <a:ext uri="{FF2B5EF4-FFF2-40B4-BE49-F238E27FC236}">
-                <a16:creationId xmlns:a16="http://schemas.microsoft.com/office/drawing/2014/main" id="{C3A4853A-6621-BF48-99C0-CF9E50FA3A1F}"/>
+                <a16:creationId xmlns:a16="http://schemas.microsoft.com/office/drawing/2014/main" id="{505FEF39-4D4F-234C-A7CC-3D508B076ECC}"/>
               </a:ext>
             </a:extLst>
           </p:cNvPr>
@@ -14615,15 +14430,40 @@
           <a:p>
             <a:r>
               <a:rPr lang="en-US" dirty="0"/>
-              <a:t>Module 6: Group and Replace</a:t>
-            </a:r>
+              <a:t>Filtering Records</a:t>
+            </a:r>
+          </a:p>
+        </p:txBody>
+      </p:sp>
+      <p:sp>
+        <p:nvSpPr>
+          <p:cNvPr id="3" name="Text Placeholder 2">
+            <a:extLst>
+              <a:ext uri="{FF2B5EF4-FFF2-40B4-BE49-F238E27FC236}">
+                <a16:creationId xmlns:a16="http://schemas.microsoft.com/office/drawing/2014/main" id="{F0A2B6CF-1628-4546-AF20-667E71376CF7}"/>
+              </a:ext>
+            </a:extLst>
+          </p:cNvPr>
+          <p:cNvSpPr>
+            <a:spLocks noGrp="1"/>
+          </p:cNvSpPr>
+          <p:nvPr>
+            <p:ph type="body" sz="quarter" idx="10"/>
+          </p:nvPr>
+        </p:nvSpPr>
+        <p:spPr/>
+        <p:txBody>
+          <a:bodyPr/>
+          <a:lstStyle/>
+          <a:p>
+            <a:endParaRPr lang="en-US"/>
           </a:p>
         </p:txBody>
       </p:sp>
     </p:spTree>
     <p:extLst>
       <p:ext uri="{BB962C8B-B14F-4D97-AF65-F5344CB8AC3E}">
-        <p14:creationId xmlns:p14="http://schemas.microsoft.com/office/powerpoint/2010/main" val="3911395177"/>
+        <p14:creationId xmlns:p14="http://schemas.microsoft.com/office/powerpoint/2010/main" val="1615717970"/>
       </p:ext>
     </p:extLst>
   </p:cSld>
@@ -14655,7 +14495,7 @@
           <p:cNvPr id="2" name="Title 1">
             <a:extLst>
               <a:ext uri="{FF2B5EF4-FFF2-40B4-BE49-F238E27FC236}">
-                <a16:creationId xmlns:a16="http://schemas.microsoft.com/office/drawing/2014/main" id="{3480EC15-00FE-FC41-ADF7-549E87A4B4F2}"/>
+                <a16:creationId xmlns:a16="http://schemas.microsoft.com/office/drawing/2014/main" id="{C3A4853A-6621-BF48-99C0-CF9E50FA3A1F}"/>
               </a:ext>
             </a:extLst>
           </p:cNvPr>
@@ -14673,40 +14513,15 @@
           <a:p>
             <a:r>
               <a:rPr lang="en-US" dirty="0"/>
-              <a:t>Group and Replace</a:t>
-            </a:r>
-          </a:p>
-        </p:txBody>
-      </p:sp>
-      <p:sp>
-        <p:nvSpPr>
-          <p:cNvPr id="3" name="Text Placeholder 2">
-            <a:extLst>
-              <a:ext uri="{FF2B5EF4-FFF2-40B4-BE49-F238E27FC236}">
-                <a16:creationId xmlns:a16="http://schemas.microsoft.com/office/drawing/2014/main" id="{52CBEEB9-F887-F642-BD6A-347CE2FA09FB}"/>
-              </a:ext>
-            </a:extLst>
-          </p:cNvPr>
-          <p:cNvSpPr>
-            <a:spLocks noGrp="1"/>
-          </p:cNvSpPr>
-          <p:nvPr>
-            <p:ph type="body" sz="quarter" idx="10"/>
-          </p:nvPr>
-        </p:nvSpPr>
-        <p:spPr/>
-        <p:txBody>
-          <a:bodyPr/>
-          <a:lstStyle/>
-          <a:p>
-            <a:endParaRPr lang="en-US"/>
+              <a:t>Module 6: Group and Replace</a:t>
+            </a:r>
           </a:p>
         </p:txBody>
       </p:sp>
     </p:spTree>
     <p:extLst>
       <p:ext uri="{BB962C8B-B14F-4D97-AF65-F5344CB8AC3E}">
-        <p14:creationId xmlns:p14="http://schemas.microsoft.com/office/powerpoint/2010/main" val="4144102751"/>
+        <p14:creationId xmlns:p14="http://schemas.microsoft.com/office/powerpoint/2010/main" val="3911395177"/>
       </p:ext>
     </p:extLst>
   </p:cSld>
@@ -14848,7 +14663,7 @@
           <p:cNvPr id="2" name="Title 1">
             <a:extLst>
               <a:ext uri="{FF2B5EF4-FFF2-40B4-BE49-F238E27FC236}">
-                <a16:creationId xmlns:a16="http://schemas.microsoft.com/office/drawing/2014/main" id="{5EF4012B-FF41-2C4E-B2EF-2972C9D9184A}"/>
+                <a16:creationId xmlns:a16="http://schemas.microsoft.com/office/drawing/2014/main" id="{3480EC15-00FE-FC41-ADF7-549E87A4B4F2}"/>
               </a:ext>
             </a:extLst>
           </p:cNvPr>
@@ -14866,13 +14681,8 @@
           <a:p>
             <a:r>
               <a:rPr lang="en-US" dirty="0"/>
-              <a:t>Manual</a:t>
-            </a:r>
-            <a:r>
-              <a:rPr lang="en-US" baseline="0" dirty="0"/>
-              <a:t> Selection</a:t>
-            </a:r>
-            <a:endParaRPr lang="en-US" dirty="0"/>
+              <a:t>Group and Replace</a:t>
+            </a:r>
           </a:p>
         </p:txBody>
       </p:sp>
@@ -14881,7 +14691,7 @@
           <p:cNvPr id="3" name="Text Placeholder 2">
             <a:extLst>
               <a:ext uri="{FF2B5EF4-FFF2-40B4-BE49-F238E27FC236}">
-                <a16:creationId xmlns:a16="http://schemas.microsoft.com/office/drawing/2014/main" id="{404BE848-6263-0145-B9F8-9619C16139F0}"/>
+                <a16:creationId xmlns:a16="http://schemas.microsoft.com/office/drawing/2014/main" id="{52CBEEB9-F887-F642-BD6A-347CE2FA09FB}"/>
               </a:ext>
             </a:extLst>
           </p:cNvPr>
@@ -14904,7 +14714,7 @@
     </p:spTree>
     <p:extLst>
       <p:ext uri="{BB962C8B-B14F-4D97-AF65-F5344CB8AC3E}">
-        <p14:creationId xmlns:p14="http://schemas.microsoft.com/office/powerpoint/2010/main" val="1517578569"/>
+        <p14:creationId xmlns:p14="http://schemas.microsoft.com/office/powerpoint/2010/main" val="4144102751"/>
       </p:ext>
     </p:extLst>
   </p:cSld>
@@ -14936,7 +14746,7 @@
           <p:cNvPr id="2" name="Title 1">
             <a:extLst>
               <a:ext uri="{FF2B5EF4-FFF2-40B4-BE49-F238E27FC236}">
-                <a16:creationId xmlns:a16="http://schemas.microsoft.com/office/drawing/2014/main" id="{B8CB6C30-3AB2-3744-B360-453B167B4FF4}"/>
+                <a16:creationId xmlns:a16="http://schemas.microsoft.com/office/drawing/2014/main" id="{5EF4012B-FF41-2C4E-B2EF-2972C9D9184A}"/>
               </a:ext>
             </a:extLst>
           </p:cNvPr>
@@ -14954,8 +14764,13 @@
           <a:p>
             <a:r>
               <a:rPr lang="en-US" dirty="0"/>
-              <a:t>Grouping by Pronunciation</a:t>
-            </a:r>
+              <a:t>Manual</a:t>
+            </a:r>
+            <a:r>
+              <a:rPr lang="en-US" baseline="0" dirty="0"/>
+              <a:t> Selection</a:t>
+            </a:r>
+            <a:endParaRPr lang="en-US" dirty="0"/>
           </a:p>
         </p:txBody>
       </p:sp>
@@ -14964,7 +14779,7 @@
           <p:cNvPr id="3" name="Text Placeholder 2">
             <a:extLst>
               <a:ext uri="{FF2B5EF4-FFF2-40B4-BE49-F238E27FC236}">
-                <a16:creationId xmlns:a16="http://schemas.microsoft.com/office/drawing/2014/main" id="{3114DC91-50BA-4E48-B2AF-D3791A89BC17}"/>
+                <a16:creationId xmlns:a16="http://schemas.microsoft.com/office/drawing/2014/main" id="{404BE848-6263-0145-B9F8-9619C16139F0}"/>
               </a:ext>
             </a:extLst>
           </p:cNvPr>
@@ -14987,7 +14802,7 @@
     </p:spTree>
     <p:extLst>
       <p:ext uri="{BB962C8B-B14F-4D97-AF65-F5344CB8AC3E}">
-        <p14:creationId xmlns:p14="http://schemas.microsoft.com/office/powerpoint/2010/main" val="4105177919"/>
+        <p14:creationId xmlns:p14="http://schemas.microsoft.com/office/powerpoint/2010/main" val="1517578569"/>
       </p:ext>
     </p:extLst>
   </p:cSld>
@@ -15019,7 +14834,7 @@
           <p:cNvPr id="2" name="Title 1">
             <a:extLst>
               <a:ext uri="{FF2B5EF4-FFF2-40B4-BE49-F238E27FC236}">
-                <a16:creationId xmlns:a16="http://schemas.microsoft.com/office/drawing/2014/main" id="{F667AD0A-11C2-034F-9745-119770BC4F74}"/>
+                <a16:creationId xmlns:a16="http://schemas.microsoft.com/office/drawing/2014/main" id="{B8CB6C30-3AB2-3744-B360-453B167B4FF4}"/>
               </a:ext>
             </a:extLst>
           </p:cNvPr>
@@ -15037,13 +14852,8 @@
           <a:p>
             <a:r>
               <a:rPr lang="en-US" dirty="0"/>
-              <a:t>Grouping</a:t>
-            </a:r>
-            <a:r>
-              <a:rPr lang="en-US" baseline="0" dirty="0"/>
-              <a:t> by Common Characters</a:t>
-            </a:r>
-            <a:endParaRPr lang="en-US" dirty="0"/>
+              <a:t>Grouping by Pronunciation</a:t>
+            </a:r>
           </a:p>
         </p:txBody>
       </p:sp>
@@ -15052,7 +14862,7 @@
           <p:cNvPr id="3" name="Text Placeholder 2">
             <a:extLst>
               <a:ext uri="{FF2B5EF4-FFF2-40B4-BE49-F238E27FC236}">
-                <a16:creationId xmlns:a16="http://schemas.microsoft.com/office/drawing/2014/main" id="{E01C124F-BC23-884A-8940-AE40F6201DB9}"/>
+                <a16:creationId xmlns:a16="http://schemas.microsoft.com/office/drawing/2014/main" id="{3114DC91-50BA-4E48-B2AF-D3791A89BC17}"/>
               </a:ext>
             </a:extLst>
           </p:cNvPr>
@@ -15075,7 +14885,7 @@
     </p:spTree>
     <p:extLst>
       <p:ext uri="{BB962C8B-B14F-4D97-AF65-F5344CB8AC3E}">
-        <p14:creationId xmlns:p14="http://schemas.microsoft.com/office/powerpoint/2010/main" val="737931396"/>
+        <p14:creationId xmlns:p14="http://schemas.microsoft.com/office/powerpoint/2010/main" val="4105177919"/>
       </p:ext>
     </p:extLst>
   </p:cSld>
@@ -15107,7 +14917,7 @@
           <p:cNvPr id="2" name="Title 1">
             <a:extLst>
               <a:ext uri="{FF2B5EF4-FFF2-40B4-BE49-F238E27FC236}">
-                <a16:creationId xmlns:a16="http://schemas.microsoft.com/office/drawing/2014/main" id="{7A902A4D-3605-F64D-99D9-C7BD9542C2E4}"/>
+                <a16:creationId xmlns:a16="http://schemas.microsoft.com/office/drawing/2014/main" id="{F667AD0A-11C2-034F-9745-119770BC4F74}"/>
               </a:ext>
             </a:extLst>
           </p:cNvPr>
@@ -15125,8 +14935,13 @@
           <a:p>
             <a:r>
               <a:rPr lang="en-US" dirty="0"/>
-              <a:t>Grouping by Spelling</a:t>
-            </a:r>
+              <a:t>Grouping</a:t>
+            </a:r>
+            <a:r>
+              <a:rPr lang="en-US" baseline="0" dirty="0"/>
+              <a:t> by Common Characters</a:t>
+            </a:r>
+            <a:endParaRPr lang="en-US" dirty="0"/>
           </a:p>
         </p:txBody>
       </p:sp>
@@ -15135,7 +14950,7 @@
           <p:cNvPr id="3" name="Text Placeholder 2">
             <a:extLst>
               <a:ext uri="{FF2B5EF4-FFF2-40B4-BE49-F238E27FC236}">
-                <a16:creationId xmlns:a16="http://schemas.microsoft.com/office/drawing/2014/main" id="{1D73BADE-B533-CE4F-B5B8-CAB06C368000}"/>
+                <a16:creationId xmlns:a16="http://schemas.microsoft.com/office/drawing/2014/main" id="{E01C124F-BC23-884A-8940-AE40F6201DB9}"/>
               </a:ext>
             </a:extLst>
           </p:cNvPr>
@@ -15158,7 +14973,7 @@
     </p:spTree>
     <p:extLst>
       <p:ext uri="{BB962C8B-B14F-4D97-AF65-F5344CB8AC3E}">
-        <p14:creationId xmlns:p14="http://schemas.microsoft.com/office/powerpoint/2010/main" val="3770955645"/>
+        <p14:creationId xmlns:p14="http://schemas.microsoft.com/office/powerpoint/2010/main" val="737931396"/>
       </p:ext>
     </p:extLst>
   </p:cSld>
@@ -15190,7 +15005,7 @@
           <p:cNvPr id="2" name="Title 1">
             <a:extLst>
               <a:ext uri="{FF2B5EF4-FFF2-40B4-BE49-F238E27FC236}">
-                <a16:creationId xmlns:a16="http://schemas.microsoft.com/office/drawing/2014/main" id="{098CEEC1-7F87-F34D-B9A4-7EA9EFA2F688}"/>
+                <a16:creationId xmlns:a16="http://schemas.microsoft.com/office/drawing/2014/main" id="{7A902A4D-3605-F64D-99D9-C7BD9542C2E4}"/>
               </a:ext>
             </a:extLst>
           </p:cNvPr>
@@ -15208,7 +15023,7 @@
           <a:p>
             <a:r>
               <a:rPr lang="en-US" dirty="0"/>
-              <a:t>Module 7: Aggregating and Pivoting Data</a:t>
+              <a:t>Grouping by Spelling</a:t>
             </a:r>
           </a:p>
         </p:txBody>
@@ -15218,7 +15033,7 @@
           <p:cNvPr id="3" name="Text Placeholder 2">
             <a:extLst>
               <a:ext uri="{FF2B5EF4-FFF2-40B4-BE49-F238E27FC236}">
-                <a16:creationId xmlns:a16="http://schemas.microsoft.com/office/drawing/2014/main" id="{0DF7DD2A-8F11-D448-86F7-826465A815C8}"/>
+                <a16:creationId xmlns:a16="http://schemas.microsoft.com/office/drawing/2014/main" id="{1D73BADE-B533-CE4F-B5B8-CAB06C368000}"/>
               </a:ext>
             </a:extLst>
           </p:cNvPr>
@@ -15241,7 +15056,7 @@
     </p:spTree>
     <p:extLst>
       <p:ext uri="{BB962C8B-B14F-4D97-AF65-F5344CB8AC3E}">
-        <p14:creationId xmlns:p14="http://schemas.microsoft.com/office/powerpoint/2010/main" val="2030434778"/>
+        <p14:creationId xmlns:p14="http://schemas.microsoft.com/office/powerpoint/2010/main" val="3770955645"/>
       </p:ext>
     </p:extLst>
   </p:cSld>
@@ -15273,7 +15088,7 @@
           <p:cNvPr id="2" name="Title 1">
             <a:extLst>
               <a:ext uri="{FF2B5EF4-FFF2-40B4-BE49-F238E27FC236}">
-                <a16:creationId xmlns:a16="http://schemas.microsoft.com/office/drawing/2014/main" id="{7A459FFD-D6CD-5B4A-9BCB-E8A05891ABD0}"/>
+                <a16:creationId xmlns:a16="http://schemas.microsoft.com/office/drawing/2014/main" id="{098CEEC1-7F87-F34D-B9A4-7EA9EFA2F688}"/>
               </a:ext>
             </a:extLst>
           </p:cNvPr>
@@ -15291,40 +15106,15 @@
           <a:p>
             <a:r>
               <a:rPr lang="en-US" dirty="0"/>
-              <a:t>Aggregating Data</a:t>
-            </a:r>
-          </a:p>
-        </p:txBody>
-      </p:sp>
-      <p:sp>
-        <p:nvSpPr>
-          <p:cNvPr id="3" name="Text Placeholder 2">
-            <a:extLst>
-              <a:ext uri="{FF2B5EF4-FFF2-40B4-BE49-F238E27FC236}">
-                <a16:creationId xmlns:a16="http://schemas.microsoft.com/office/drawing/2014/main" id="{8B206731-BB58-084E-9F91-E2037F0BB52D}"/>
-              </a:ext>
-            </a:extLst>
-          </p:cNvPr>
-          <p:cNvSpPr>
-            <a:spLocks noGrp="1"/>
-          </p:cNvSpPr>
-          <p:nvPr>
-            <p:ph type="body" sz="quarter" idx="10"/>
-          </p:nvPr>
-        </p:nvSpPr>
-        <p:spPr/>
-        <p:txBody>
-          <a:bodyPr/>
-          <a:lstStyle/>
-          <a:p>
-            <a:endParaRPr lang="en-US"/>
+              <a:t>Module 7: Aggregating and Pivoting Data</a:t>
+            </a:r>
           </a:p>
         </p:txBody>
       </p:sp>
     </p:spTree>
     <p:extLst>
       <p:ext uri="{BB962C8B-B14F-4D97-AF65-F5344CB8AC3E}">
-        <p14:creationId xmlns:p14="http://schemas.microsoft.com/office/powerpoint/2010/main" val="3081864923"/>
+        <p14:creationId xmlns:p14="http://schemas.microsoft.com/office/powerpoint/2010/main" val="2030434778"/>
       </p:ext>
     </p:extLst>
   </p:cSld>
@@ -15356,7 +15146,7 @@
           <p:cNvPr id="2" name="Title 1">
             <a:extLst>
               <a:ext uri="{FF2B5EF4-FFF2-40B4-BE49-F238E27FC236}">
-                <a16:creationId xmlns:a16="http://schemas.microsoft.com/office/drawing/2014/main" id="{3B856723-7D74-B54B-8C18-AFFA49BB0578}"/>
+                <a16:creationId xmlns:a16="http://schemas.microsoft.com/office/drawing/2014/main" id="{7A459FFD-D6CD-5B4A-9BCB-E8A05891ABD0}"/>
               </a:ext>
             </a:extLst>
           </p:cNvPr>
@@ -15374,7 +15164,7 @@
           <a:p>
             <a:r>
               <a:rPr lang="en-US" dirty="0"/>
-              <a:t>Pivoting Data</a:t>
+              <a:t>Aggregating Data</a:t>
             </a:r>
           </a:p>
         </p:txBody>
@@ -15384,7 +15174,7 @@
           <p:cNvPr id="3" name="Text Placeholder 2">
             <a:extLst>
               <a:ext uri="{FF2B5EF4-FFF2-40B4-BE49-F238E27FC236}">
-                <a16:creationId xmlns:a16="http://schemas.microsoft.com/office/drawing/2014/main" id="{C07C88D3-0BAE-8749-84FF-FD11C5D739E5}"/>
+                <a16:creationId xmlns:a16="http://schemas.microsoft.com/office/drawing/2014/main" id="{8B206731-BB58-084E-9F91-E2037F0BB52D}"/>
               </a:ext>
             </a:extLst>
           </p:cNvPr>
@@ -15407,7 +15197,7 @@
     </p:spTree>
     <p:extLst>
       <p:ext uri="{BB962C8B-B14F-4D97-AF65-F5344CB8AC3E}">
-        <p14:creationId xmlns:p14="http://schemas.microsoft.com/office/powerpoint/2010/main" val="2826624053"/>
+        <p14:creationId xmlns:p14="http://schemas.microsoft.com/office/powerpoint/2010/main" val="3081864923"/>
       </p:ext>
     </p:extLst>
   </p:cSld>
@@ -15439,7 +15229,7 @@
           <p:cNvPr id="2" name="Title 1">
             <a:extLst>
               <a:ext uri="{FF2B5EF4-FFF2-40B4-BE49-F238E27FC236}">
-                <a16:creationId xmlns:a16="http://schemas.microsoft.com/office/drawing/2014/main" id="{6B5CDC5B-FC9D-9E42-ACCA-21C364287987}"/>
+                <a16:creationId xmlns:a16="http://schemas.microsoft.com/office/drawing/2014/main" id="{3B856723-7D74-B54B-8C18-AFFA49BB0578}"/>
               </a:ext>
             </a:extLst>
           </p:cNvPr>
@@ -15457,7 +15247,7 @@
           <a:p>
             <a:r>
               <a:rPr lang="en-US" dirty="0"/>
-              <a:t>Unpivoting Data</a:t>
+              <a:t>Pivoting Data</a:t>
             </a:r>
           </a:p>
         </p:txBody>
@@ -15467,7 +15257,7 @@
           <p:cNvPr id="3" name="Text Placeholder 2">
             <a:extLst>
               <a:ext uri="{FF2B5EF4-FFF2-40B4-BE49-F238E27FC236}">
-                <a16:creationId xmlns:a16="http://schemas.microsoft.com/office/drawing/2014/main" id="{7D0F7560-7895-1E4C-93E5-863F23F78976}"/>
+                <a16:creationId xmlns:a16="http://schemas.microsoft.com/office/drawing/2014/main" id="{C07C88D3-0BAE-8749-84FF-FD11C5D739E5}"/>
               </a:ext>
             </a:extLst>
           </p:cNvPr>
@@ -15490,7 +15280,7 @@
     </p:spTree>
     <p:extLst>
       <p:ext uri="{BB962C8B-B14F-4D97-AF65-F5344CB8AC3E}">
-        <p14:creationId xmlns:p14="http://schemas.microsoft.com/office/powerpoint/2010/main" val="223869305"/>
+        <p14:creationId xmlns:p14="http://schemas.microsoft.com/office/powerpoint/2010/main" val="2826624053"/>
       </p:ext>
     </p:extLst>
   </p:cSld>
@@ -15522,7 +15312,7 @@
           <p:cNvPr id="2" name="Title 1">
             <a:extLst>
               <a:ext uri="{FF2B5EF4-FFF2-40B4-BE49-F238E27FC236}">
-                <a16:creationId xmlns:a16="http://schemas.microsoft.com/office/drawing/2014/main" id="{BD3CC3C1-820E-1F4C-9494-4CA16BC01F49}"/>
+                <a16:creationId xmlns:a16="http://schemas.microsoft.com/office/drawing/2014/main" id="{6B5CDC5B-FC9D-9E42-ACCA-21C364287987}"/>
               </a:ext>
             </a:extLst>
           </p:cNvPr>
@@ -15540,15 +15330,40 @@
           <a:p>
             <a:r>
               <a:rPr lang="en-US" dirty="0"/>
-              <a:t>Part III: Load</a:t>
-            </a:r>
+              <a:t>Unpivoting Data</a:t>
+            </a:r>
+          </a:p>
+        </p:txBody>
+      </p:sp>
+      <p:sp>
+        <p:nvSpPr>
+          <p:cNvPr id="3" name="Text Placeholder 2">
+            <a:extLst>
+              <a:ext uri="{FF2B5EF4-FFF2-40B4-BE49-F238E27FC236}">
+                <a16:creationId xmlns:a16="http://schemas.microsoft.com/office/drawing/2014/main" id="{7D0F7560-7895-1E4C-93E5-863F23F78976}"/>
+              </a:ext>
+            </a:extLst>
+          </p:cNvPr>
+          <p:cNvSpPr>
+            <a:spLocks noGrp="1"/>
+          </p:cNvSpPr>
+          <p:nvPr>
+            <p:ph type="body" sz="quarter" idx="10"/>
+          </p:nvPr>
+        </p:nvSpPr>
+        <p:spPr/>
+        <p:txBody>
+          <a:bodyPr/>
+          <a:lstStyle/>
+          <a:p>
+            <a:endParaRPr lang="en-US"/>
           </a:p>
         </p:txBody>
       </p:sp>
     </p:spTree>
     <p:extLst>
       <p:ext uri="{BB962C8B-B14F-4D97-AF65-F5344CB8AC3E}">
-        <p14:creationId xmlns:p14="http://schemas.microsoft.com/office/powerpoint/2010/main" val="2503839061"/>
+        <p14:creationId xmlns:p14="http://schemas.microsoft.com/office/powerpoint/2010/main" val="223869305"/>
       </p:ext>
     </p:extLst>
   </p:cSld>
@@ -15580,7 +15395,7 @@
           <p:cNvPr id="2" name="Title 1">
             <a:extLst>
               <a:ext uri="{FF2B5EF4-FFF2-40B4-BE49-F238E27FC236}">
-                <a16:creationId xmlns:a16="http://schemas.microsoft.com/office/drawing/2014/main" id="{C7183894-EC31-F440-9353-89759F05B3EB}"/>
+                <a16:creationId xmlns:a16="http://schemas.microsoft.com/office/drawing/2014/main" id="{BD3CC3C1-820E-1F4C-9494-4CA16BC01F49}"/>
               </a:ext>
             </a:extLst>
           </p:cNvPr>
@@ -15598,7 +15413,7 @@
           <a:p>
             <a:r>
               <a:rPr lang="en-US" dirty="0"/>
-              <a:t>Module 8: Output</a:t>
+              <a:t>Part III: Load</a:t>
             </a:r>
           </a:p>
         </p:txBody>
@@ -15606,7 +15421,7 @@
     </p:spTree>
     <p:extLst>
       <p:ext uri="{BB962C8B-B14F-4D97-AF65-F5344CB8AC3E}">
-        <p14:creationId xmlns:p14="http://schemas.microsoft.com/office/powerpoint/2010/main" val="2381891199"/>
+        <p14:creationId xmlns:p14="http://schemas.microsoft.com/office/powerpoint/2010/main" val="2503839061"/>
       </p:ext>
     </p:extLst>
   </p:cSld>
@@ -16035,7 +15850,7 @@
           <p:cNvPr id="2" name="Title 1">
             <a:extLst>
               <a:ext uri="{FF2B5EF4-FFF2-40B4-BE49-F238E27FC236}">
-                <a16:creationId xmlns:a16="http://schemas.microsoft.com/office/drawing/2014/main" id="{59A8E365-F14F-F541-8BE6-C2E2F4658199}"/>
+                <a16:creationId xmlns:a16="http://schemas.microsoft.com/office/drawing/2014/main" id="{C7183894-EC31-F440-9353-89759F05B3EB}"/>
               </a:ext>
             </a:extLst>
           </p:cNvPr>
@@ -16053,40 +15868,15 @@
           <a:p>
             <a:r>
               <a:rPr lang="en-US" dirty="0"/>
-              <a:t>Outputting to files</a:t>
-            </a:r>
-          </a:p>
-        </p:txBody>
-      </p:sp>
-      <p:sp>
-        <p:nvSpPr>
-          <p:cNvPr id="3" name="Text Placeholder 2">
-            <a:extLst>
-              <a:ext uri="{FF2B5EF4-FFF2-40B4-BE49-F238E27FC236}">
-                <a16:creationId xmlns:a16="http://schemas.microsoft.com/office/drawing/2014/main" id="{6E648436-C250-D445-8FE2-389E92AF5047}"/>
-              </a:ext>
-            </a:extLst>
-          </p:cNvPr>
-          <p:cNvSpPr>
-            <a:spLocks noGrp="1"/>
-          </p:cNvSpPr>
-          <p:nvPr>
-            <p:ph type="body" sz="quarter" idx="10"/>
-          </p:nvPr>
-        </p:nvSpPr>
-        <p:spPr/>
-        <p:txBody>
-          <a:bodyPr/>
-          <a:lstStyle/>
-          <a:p>
-            <a:endParaRPr lang="en-US"/>
+              <a:t>Module 8: Output</a:t>
+            </a:r>
           </a:p>
         </p:txBody>
       </p:sp>
     </p:spTree>
     <p:extLst>
       <p:ext uri="{BB962C8B-B14F-4D97-AF65-F5344CB8AC3E}">
-        <p14:creationId xmlns:p14="http://schemas.microsoft.com/office/powerpoint/2010/main" val="3591092714"/>
+        <p14:creationId xmlns:p14="http://schemas.microsoft.com/office/powerpoint/2010/main" val="2381891199"/>
       </p:ext>
     </p:extLst>
   </p:cSld>
@@ -16118,7 +15908,7 @@
           <p:cNvPr id="2" name="Title 1">
             <a:extLst>
               <a:ext uri="{FF2B5EF4-FFF2-40B4-BE49-F238E27FC236}">
-                <a16:creationId xmlns:a16="http://schemas.microsoft.com/office/drawing/2014/main" id="{321139D9-EE71-5749-A7A3-8AC02267C975}"/>
+                <a16:creationId xmlns:a16="http://schemas.microsoft.com/office/drawing/2014/main" id="{59A8E365-F14F-F541-8BE6-C2E2F4658199}"/>
               </a:ext>
             </a:extLst>
           </p:cNvPr>
@@ -16136,7 +15926,7 @@
           <a:p>
             <a:r>
               <a:rPr lang="en-US" dirty="0"/>
-              <a:t>Outputting to other destinations</a:t>
+              <a:t>Outputting to files</a:t>
             </a:r>
           </a:p>
         </p:txBody>
@@ -16146,7 +15936,7 @@
           <p:cNvPr id="3" name="Text Placeholder 2">
             <a:extLst>
               <a:ext uri="{FF2B5EF4-FFF2-40B4-BE49-F238E27FC236}">
-                <a16:creationId xmlns:a16="http://schemas.microsoft.com/office/drawing/2014/main" id="{05636DDC-007A-D447-8410-CAD87BA30D78}"/>
+                <a16:creationId xmlns:a16="http://schemas.microsoft.com/office/drawing/2014/main" id="{6E648436-C250-D445-8FE2-389E92AF5047}"/>
               </a:ext>
             </a:extLst>
           </p:cNvPr>
@@ -16169,7 +15959,7 @@
     </p:spTree>
     <p:extLst>
       <p:ext uri="{BB962C8B-B14F-4D97-AF65-F5344CB8AC3E}">
-        <p14:creationId xmlns:p14="http://schemas.microsoft.com/office/powerpoint/2010/main" val="4121859749"/>
+        <p14:creationId xmlns:p14="http://schemas.microsoft.com/office/powerpoint/2010/main" val="3591092714"/>
       </p:ext>
     </p:extLst>
   </p:cSld>
@@ -16201,7 +15991,7 @@
           <p:cNvPr id="2" name="Title 1">
             <a:extLst>
               <a:ext uri="{FF2B5EF4-FFF2-40B4-BE49-F238E27FC236}">
-                <a16:creationId xmlns:a16="http://schemas.microsoft.com/office/drawing/2014/main" id="{BC13A45F-B701-6042-A1FC-E51DBE17F7A5}"/>
+                <a16:creationId xmlns:a16="http://schemas.microsoft.com/office/drawing/2014/main" id="{321139D9-EE71-5749-A7A3-8AC02267C975}"/>
               </a:ext>
             </a:extLst>
           </p:cNvPr>
@@ -16219,13 +16009,8 @@
           <a:p>
             <a:r>
               <a:rPr lang="en-US" dirty="0"/>
-              <a:t>Module 9: Prep Builder Conductor and Publishing Workflows</a:t>
-            </a:r>
-            <a:r>
-              <a:rPr lang="en-US" baseline="0" dirty="0"/>
-              <a:t> to Tableau Server</a:t>
-            </a:r>
-            <a:endParaRPr lang="en-US" dirty="0"/>
+              <a:t>Outputting to other destinations</a:t>
+            </a:r>
           </a:p>
         </p:txBody>
       </p:sp>
@@ -16234,7 +16019,7 @@
           <p:cNvPr id="3" name="Text Placeholder 2">
             <a:extLst>
               <a:ext uri="{FF2B5EF4-FFF2-40B4-BE49-F238E27FC236}">
-                <a16:creationId xmlns:a16="http://schemas.microsoft.com/office/drawing/2014/main" id="{BD941388-5AB7-FE47-8C02-C1162C5745C3}"/>
+                <a16:creationId xmlns:a16="http://schemas.microsoft.com/office/drawing/2014/main" id="{05636DDC-007A-D447-8410-CAD87BA30D78}"/>
               </a:ext>
             </a:extLst>
           </p:cNvPr>
@@ -16257,7 +16042,7 @@
     </p:spTree>
     <p:extLst>
       <p:ext uri="{BB962C8B-B14F-4D97-AF65-F5344CB8AC3E}">
-        <p14:creationId xmlns:p14="http://schemas.microsoft.com/office/powerpoint/2010/main" val="4173510137"/>
+        <p14:creationId xmlns:p14="http://schemas.microsoft.com/office/powerpoint/2010/main" val="4121859749"/>
       </p:ext>
     </p:extLst>
   </p:cSld>
@@ -16286,7 +16071,13 @@
       </p:grpSpPr>
       <p:sp>
         <p:nvSpPr>
-          <p:cNvPr id="2" name="Title 1"/>
+          <p:cNvPr id="2" name="Title 1">
+            <a:extLst>
+              <a:ext uri="{FF2B5EF4-FFF2-40B4-BE49-F238E27FC236}">
+                <a16:creationId xmlns:a16="http://schemas.microsoft.com/office/drawing/2014/main" id="{BC13A45F-B701-6042-A1FC-E51DBE17F7A5}"/>
+              </a:ext>
+            </a:extLst>
+          </p:cNvPr>
           <p:cNvSpPr>
             <a:spLocks noGrp="1"/>
           </p:cNvSpPr>
@@ -16296,40 +16087,17 @@
         </p:nvSpPr>
         <p:spPr/>
         <p:txBody>
-          <a:bodyPr>
-            <a:normAutofit/>
-          </a:bodyPr>
-          <a:lstStyle/>
-          <a:p>
-            <a:r>
-              <a:rPr lang="en-US" dirty="0"/>
-              <a:t>Tableau Prep Builder Conductor</a:t>
-            </a:r>
-          </a:p>
-          <a:p>
-            <a:endParaRPr lang="en-US" dirty="0"/>
-          </a:p>
-        </p:txBody>
-      </p:sp>
-      <p:sp>
-        <p:nvSpPr>
-          <p:cNvPr id="4" name="Slide Number Placeholder 3"/>
-          <p:cNvSpPr>
-            <a:spLocks noGrp="1"/>
-          </p:cNvSpPr>
-          <p:nvPr>
-            <p:ph type="sldNum" sz="quarter" idx="4294967295"/>
-          </p:nvPr>
-        </p:nvSpPr>
-        <p:spPr/>
-        <p:txBody>
-          <a:bodyPr/>
-          <a:lstStyle/>
-          <a:p>
-            <a:fld id="{4FAB73BC-B049-4115-A692-8D63A059BFB8}" type="slidenum">
-              <a:rPr lang="en-US" smtClean="0"/>
-              <a:t>73</a:t>
-            </a:fld>
+          <a:bodyPr/>
+          <a:lstStyle/>
+          <a:p>
+            <a:r>
+              <a:rPr lang="en-US" dirty="0"/>
+              <a:t>Module 9: Prep Builder Conductor and Publishing Workflows</a:t>
+            </a:r>
+            <a:r>
+              <a:rPr lang="en-US" baseline="0" dirty="0"/>
+              <a:t> to Tableau Server</a:t>
+            </a:r>
             <a:endParaRPr lang="en-US" dirty="0"/>
           </a:p>
         </p:txBody>
@@ -16337,7 +16105,7 @@
     </p:spTree>
     <p:extLst>
       <p:ext uri="{BB962C8B-B14F-4D97-AF65-F5344CB8AC3E}">
-        <p14:creationId xmlns:p14="http://schemas.microsoft.com/office/powerpoint/2010/main" val="710894456"/>
+        <p14:creationId xmlns:p14="http://schemas.microsoft.com/office/powerpoint/2010/main" val="4173510137"/>
       </p:ext>
     </p:extLst>
   </p:cSld>
@@ -16681,31 +16449,6 @@
               <a:rPr lang="en-US" dirty="0"/>
               <a:t>Appendix: Preparing Data In Tableau</a:t>
             </a:r>
-          </a:p>
-        </p:txBody>
-      </p:sp>
-      <p:sp>
-        <p:nvSpPr>
-          <p:cNvPr id="3" name="Text Placeholder 2">
-            <a:extLst>
-              <a:ext uri="{FF2B5EF4-FFF2-40B4-BE49-F238E27FC236}">
-                <a16:creationId xmlns:a16="http://schemas.microsoft.com/office/drawing/2014/main" id="{C0004C11-AE65-7146-9933-115250CEA8DA}"/>
-              </a:ext>
-            </a:extLst>
-          </p:cNvPr>
-          <p:cNvSpPr>
-            <a:spLocks noGrp="1"/>
-          </p:cNvSpPr>
-          <p:nvPr>
-            <p:ph type="body" sz="quarter" idx="10"/>
-          </p:nvPr>
-        </p:nvSpPr>
-        <p:spPr/>
-        <p:txBody>
-          <a:bodyPr/>
-          <a:lstStyle/>
-          <a:p>
-            <a:endParaRPr lang="en-US"/>
           </a:p>
         </p:txBody>
       </p:sp>
@@ -18233,21 +17976,6 @@
 </file>
 
 <file path=customXml/item1.xml><?xml version="1.0" encoding="utf-8"?>
-<?mso-contentType ?>
-<FormTemplates xmlns="http://schemas.microsoft.com/sharepoint/v3/contenttype/forms">
-  <Display>DocumentLibraryForm</Display>
-  <Edit>DocumentLibraryForm</Edit>
-  <New>DocumentLibraryForm</New>
-</FormTemplates>
-</file>
-
-<file path=customXml/item2.xml><?xml version="1.0" encoding="utf-8"?>
-<p:properties xmlns:p="http://schemas.microsoft.com/office/2006/metadata/properties" xmlns:xsi="http://www.w3.org/2001/XMLSchema-instance" xmlns:pc="http://schemas.microsoft.com/office/infopath/2007/PartnerControls">
-  <documentManagement/>
-</p:properties>
-</file>
-
-<file path=customXml/item3.xml><?xml version="1.0" encoding="utf-8"?>
 <ct:contentTypeSchema xmlns:ct="http://schemas.microsoft.com/office/2006/metadata/contentType" xmlns:ma="http://schemas.microsoft.com/office/2006/metadata/properties/metaAttributes" ct:_="" ma:_="" ma:contentTypeName="Document" ma:contentTypeID="0x010100DF17D0A5D2A94D41851BD81F437949EB" ma:contentTypeVersion="4" ma:contentTypeDescription="Create a new document." ma:contentTypeScope="" ma:versionID="86394c489d6ea242463219402424de30">
   <xsd:schema xmlns:xsd="http://www.w3.org/2001/XMLSchema" xmlns:xs="http://www.w3.org/2001/XMLSchema" xmlns:p="http://schemas.microsoft.com/office/2006/metadata/properties" xmlns:ns2="8ae4afce-818c-4ab4-8e35-377c82201c18" xmlns:ns3="6549f357-ea04-4fdc-a4ff-01e398dbae1f" targetNamespace="http://schemas.microsoft.com/office/2006/metadata/properties" ma:root="true" ma:fieldsID="fe252f9ea815bb7a68216b40880644e9" ns2:_="" ns3:_="">
     <xsd:import namespace="8ae4afce-818c-4ab4-8e35-377c82201c18"/>
@@ -18412,32 +18140,22 @@
 </ct:contentTypeSchema>
 </file>
 
-<file path=customXml/itemProps1.xml><?xml version="1.0" encoding="utf-8"?>
-<ds:datastoreItem xmlns:ds="http://schemas.openxmlformats.org/officeDocument/2006/customXml" ds:itemID="{7FBE9ADF-F1D8-4E9F-83D5-C6625824914C}">
-  <ds:schemaRefs>
-    <ds:schemaRef ds:uri="http://schemas.microsoft.com/sharepoint/v3/contenttype/forms"/>
-  </ds:schemaRefs>
-</ds:datastoreItem>
+<file path=customXml/item2.xml><?xml version="1.0" encoding="utf-8"?>
+<?mso-contentType ?>
+<FormTemplates xmlns="http://schemas.microsoft.com/sharepoint/v3/contenttype/forms">
+  <Display>DocumentLibraryForm</Display>
+  <Edit>DocumentLibraryForm</Edit>
+  <New>DocumentLibraryForm</New>
+</FormTemplates>
 </file>
 
-<file path=customXml/itemProps2.xml><?xml version="1.0" encoding="utf-8"?>
-<ds:datastoreItem xmlns:ds="http://schemas.openxmlformats.org/officeDocument/2006/customXml" ds:itemID="{FF9AC6B8-7021-4B23-A9AF-61295A177099}">
-  <ds:schemaRefs>
-    <ds:schemaRef ds:uri="http://schemas.microsoft.com/office/infopath/2007/PartnerControls"/>
-    <ds:schemaRef ds:uri="http://purl.org/dc/dcmitype/"/>
-    <ds:schemaRef ds:uri="http://schemas.microsoft.com/office/2006/metadata/properties"/>
-    <ds:schemaRef ds:uri="http://www.w3.org/XML/1998/namespace"/>
-    <ds:schemaRef ds:uri="http://schemas.microsoft.com/office/2006/documentManagement/types"/>
-    <ds:schemaRef ds:uri="6549f357-ea04-4fdc-a4ff-01e398dbae1f"/>
-    <ds:schemaRef ds:uri="http://schemas.openxmlformats.org/package/2006/metadata/core-properties"/>
-    <ds:schemaRef ds:uri="8ae4afce-818c-4ab4-8e35-377c82201c18"/>
-    <ds:schemaRef ds:uri="http://purl.org/dc/terms/"/>
-    <ds:schemaRef ds:uri="http://purl.org/dc/elements/1.1/"/>
-  </ds:schemaRefs>
-</ds:datastoreItem>
+<file path=customXml/item3.xml><?xml version="1.0" encoding="utf-8"?>
+<p:properties xmlns:p="http://schemas.microsoft.com/office/2006/metadata/properties" xmlns:xsi="http://www.w3.org/2001/XMLSchema-instance" xmlns:pc="http://schemas.microsoft.com/office/infopath/2007/PartnerControls">
+  <documentManagement/>
+</p:properties>
 </file>
 
-<file path=customXml/itemProps3.xml><?xml version="1.0" encoding="utf-8"?>
+<file path=customXml/itemProps1.xml><?xml version="1.0" encoding="utf-8"?>
 <ds:datastoreItem xmlns:ds="http://schemas.openxmlformats.org/officeDocument/2006/customXml" ds:itemID="{5E59C5BB-F795-4F02-AFC2-70EF9316FDF1}">
   <ds:schemaRefs>
     <ds:schemaRef ds:uri="http://schemas.microsoft.com/office/2006/metadata/contentType"/>
@@ -18454,4 +18172,29 @@
     <ds:schemaRef ds:uri="http://schemas.microsoft.com/internal/obd"/>
   </ds:schemaRefs>
 </ds:datastoreItem>
+</file>
+
+<file path=customXml/itemProps2.xml><?xml version="1.0" encoding="utf-8"?>
+<ds:datastoreItem xmlns:ds="http://schemas.openxmlformats.org/officeDocument/2006/customXml" ds:itemID="{7FBE9ADF-F1D8-4E9F-83D5-C6625824914C}">
+  <ds:schemaRefs>
+    <ds:schemaRef ds:uri="http://schemas.microsoft.com/sharepoint/v3/contenttype/forms"/>
+  </ds:schemaRefs>
+</ds:datastoreItem>
+</file>
+
+<file path=customXml/itemProps3.xml><?xml version="1.0" encoding="utf-8"?>
+<ds:datastoreItem xmlns:ds="http://schemas.openxmlformats.org/officeDocument/2006/customXml" ds:itemID="{FF9AC6B8-7021-4B23-A9AF-61295A177099}">
+  <ds:schemaRefs>
+    <ds:schemaRef ds:uri="http://schemas.microsoft.com/office/infopath/2007/PartnerControls"/>
+    <ds:schemaRef ds:uri="http://purl.org/dc/dcmitype/"/>
+    <ds:schemaRef ds:uri="http://schemas.microsoft.com/office/2006/metadata/properties"/>
+    <ds:schemaRef ds:uri="http://www.w3.org/XML/1998/namespace"/>
+    <ds:schemaRef ds:uri="http://schemas.microsoft.com/office/2006/documentManagement/types"/>
+    <ds:schemaRef ds:uri="6549f357-ea04-4fdc-a4ff-01e398dbae1f"/>
+    <ds:schemaRef ds:uri="http://schemas.openxmlformats.org/package/2006/metadata/core-properties"/>
+    <ds:schemaRef ds:uri="8ae4afce-818c-4ab4-8e35-377c82201c18"/>
+    <ds:schemaRef ds:uri="http://purl.org/dc/terms/"/>
+    <ds:schemaRef ds:uri="http://purl.org/dc/elements/1.1/"/>
+  </ds:schemaRefs>
+</ds:datastoreItem>
 </file>
</xml_diff>

<commit_message>
Finished the bulk of it...
</commit_message>
<xml_diff>
--- a/ppt/TableauPrepBuilderIntroV1_1.pptx
+++ b/ppt/TableauPrepBuilderIntroV1_1.pptx
@@ -107,11 +107,11 @@
     <p:sldId id="487" r:id="rId98"/>
     <p:sldId id="488" r:id="rId99"/>
     <p:sldId id="489" r:id="rId100"/>
-    <p:sldId id="490" r:id="rId101"/>
-    <p:sldId id="382" r:id="rId102"/>
-    <p:sldId id="384" r:id="rId103"/>
-    <p:sldId id="385" r:id="rId104"/>
-    <p:sldId id="491" r:id="rId105"/>
+    <p:sldId id="519" r:id="rId101"/>
+    <p:sldId id="490" r:id="rId102"/>
+    <p:sldId id="382" r:id="rId103"/>
+    <p:sldId id="384" r:id="rId104"/>
+    <p:sldId id="385" r:id="rId105"/>
     <p:sldId id="340" r:id="rId106"/>
   </p:sldIdLst>
   <p:sldSz cx="12192000" cy="6858000"/>
@@ -374,6 +374,7 @@
             <p14:sldId id="487"/>
             <p14:sldId id="488"/>
             <p14:sldId id="489"/>
+            <p14:sldId id="519"/>
           </p14:sldIdLst>
         </p14:section>
         <p14:section name="Module 9: Tableau Prep Builder Conductor" id="{A03F1157-B246-4852-A53A-4CEC99584E0B}">
@@ -385,9 +386,7 @@
           </p14:sldIdLst>
         </p14:section>
         <p14:section name="Appendix: Preparing Data In Tableau" id="{F4494685-5EB9-C64C-B54A-24D4DA38DC63}">
-          <p14:sldIdLst>
-            <p14:sldId id="491"/>
-          </p14:sldIdLst>
+          <p14:sldIdLst/>
         </p14:section>
         <p14:section name="Conclusion" id="{437119FA-B2B2-43B2-BA16-8275F50D5A56}">
           <p14:sldIdLst>
@@ -5779,7 +5778,7 @@
               <a:pPr>
                 <a:defRPr/>
               </a:pPr>
-              <a:t>97</a:t>
+              <a:t>98</a:t>
             </a:fld>
             <a:endParaRPr lang="en-US"/>
           </a:p>
@@ -5869,7 +5868,7 @@
               <a:pPr>
                 <a:defRPr/>
               </a:pPr>
-              <a:t>98</a:t>
+              <a:t>99</a:t>
             </a:fld>
             <a:endParaRPr lang="en-US"/>
           </a:p>
@@ -5959,7 +5958,7 @@
               <a:pPr>
                 <a:defRPr/>
               </a:pPr>
-              <a:t>99</a:t>
+              <a:t>100</a:t>
             </a:fld>
             <a:endParaRPr lang="en-US"/>
           </a:p>
@@ -6049,7 +6048,7 @@
               <a:pPr>
                 <a:defRPr/>
               </a:pPr>
-              <a:t>100</a:t>
+              <a:t>101</a:t>
             </a:fld>
             <a:endParaRPr lang="en-US"/>
           </a:p>
@@ -6069,96 +6068,6 @@
 </file>
 
 <file path=ppt/notesSlides/notesSlide58.xml><?xml version="1.0" encoding="utf-8"?>
-<p:notes xmlns:a="http://schemas.openxmlformats.org/drawingml/2006/main" xmlns:r="http://schemas.openxmlformats.org/officeDocument/2006/relationships" xmlns:p="http://schemas.openxmlformats.org/presentationml/2006/main">
-  <p:cSld>
-    <p:spTree>
-      <p:nvGrpSpPr>
-        <p:cNvPr id="1" name=""/>
-        <p:cNvGrpSpPr/>
-        <p:nvPr/>
-      </p:nvGrpSpPr>
-      <p:grpSpPr>
-        <a:xfrm>
-          <a:off x="0" y="0"/>
-          <a:ext cx="0" cy="0"/>
-          <a:chOff x="0" y="0"/>
-          <a:chExt cx="0" cy="0"/>
-        </a:xfrm>
-      </p:grpSpPr>
-      <p:sp>
-        <p:nvSpPr>
-          <p:cNvPr id="2" name="Slide Image Placeholder 1"/>
-          <p:cNvSpPr>
-            <a:spLocks noGrp="1" noRot="1" noChangeAspect="1"/>
-          </p:cNvSpPr>
-          <p:nvPr>
-            <p:ph type="sldImg"/>
-          </p:nvPr>
-        </p:nvSpPr>
-        <p:spPr/>
-      </p:sp>
-      <p:sp>
-        <p:nvSpPr>
-          <p:cNvPr id="3" name="Notes Placeholder 2"/>
-          <p:cNvSpPr>
-            <a:spLocks noGrp="1"/>
-          </p:cNvSpPr>
-          <p:nvPr>
-            <p:ph type="body" idx="1"/>
-          </p:nvPr>
-        </p:nvSpPr>
-        <p:spPr/>
-        <p:txBody>
-          <a:bodyPr/>
-          <a:lstStyle/>
-          <a:p>
-            <a:endParaRPr lang="en-US"/>
-          </a:p>
-        </p:txBody>
-      </p:sp>
-      <p:sp>
-        <p:nvSpPr>
-          <p:cNvPr id="4" name="Slide Number Placeholder 3"/>
-          <p:cNvSpPr>
-            <a:spLocks noGrp="1"/>
-          </p:cNvSpPr>
-          <p:nvPr>
-            <p:ph type="sldNum" sz="quarter" idx="5"/>
-          </p:nvPr>
-        </p:nvSpPr>
-        <p:spPr/>
-        <p:txBody>
-          <a:bodyPr/>
-          <a:lstStyle/>
-          <a:p>
-            <a:pPr>
-              <a:defRPr/>
-            </a:pPr>
-            <a:fld id="{673C55C6-0635-4FFD-BEAC-5E6F89DDB24B}" type="slidenum">
-              <a:rPr lang="en-US" smtClean="0"/>
-              <a:pPr>
-                <a:defRPr/>
-              </a:pPr>
-              <a:t>101</a:t>
-            </a:fld>
-            <a:endParaRPr lang="en-US"/>
-          </a:p>
-        </p:txBody>
-      </p:sp>
-    </p:spTree>
-    <p:extLst>
-      <p:ext uri="{BB962C8B-B14F-4D97-AF65-F5344CB8AC3E}">
-        <p14:creationId xmlns:p14="http://schemas.microsoft.com/office/powerpoint/2010/main" val="4194155776"/>
-      </p:ext>
-    </p:extLst>
-  </p:cSld>
-  <p:clrMapOvr>
-    <a:masterClrMapping/>
-  </p:clrMapOvr>
-</p:notes>
-</file>
-
-<file path=ppt/notesSlides/notesSlide59.xml><?xml version="1.0" encoding="utf-8"?>
 <p:notes xmlns:a="http://schemas.openxmlformats.org/drawingml/2006/main" xmlns:r="http://schemas.openxmlformats.org/officeDocument/2006/relationships" xmlns:p="http://schemas.openxmlformats.org/presentationml/2006/main">
   <p:cSld>
     <p:spTree>
@@ -9334,13 +9243,18 @@
         </p:nvSpPr>
         <p:spPr/>
         <p:txBody>
-          <a:bodyPr/>
+          <a:bodyPr>
+            <a:normAutofit/>
+          </a:bodyPr>
           <a:lstStyle/>
           <a:p>
             <a:r>
               <a:rPr lang="en-US" dirty="0"/>
-              <a:t>Scheduling Workflows to Server (Discussed)</a:t>
-            </a:r>
+              <a:t>Publishing Workflows to Server (Discussed)</a:t>
+            </a:r>
+          </a:p>
+          <a:p>
+            <a:endParaRPr lang="en-US" dirty="0"/>
           </a:p>
         </p:txBody>
       </p:sp>
@@ -9389,7 +9303,7 @@
     </p:spTree>
     <p:extLst>
       <p:ext uri="{BB962C8B-B14F-4D97-AF65-F5344CB8AC3E}">
-        <p14:creationId xmlns:p14="http://schemas.microsoft.com/office/powerpoint/2010/main" val="2531394161"/>
+        <p14:creationId xmlns:p14="http://schemas.microsoft.com/office/powerpoint/2010/main" val="2246816309"/>
       </p:ext>
     </p:extLst>
   </p:cSld>
@@ -9418,13 +9332,7 @@
       </p:grpSpPr>
       <p:sp>
         <p:nvSpPr>
-          <p:cNvPr id="2" name="Title 1">
-            <a:extLst>
-              <a:ext uri="{FF2B5EF4-FFF2-40B4-BE49-F238E27FC236}">
-                <a16:creationId xmlns:a16="http://schemas.microsoft.com/office/drawing/2014/main" id="{7657EA3D-211E-5446-93D5-5F5CF81BBCDA}"/>
-              </a:ext>
-            </a:extLst>
-          </p:cNvPr>
+          <p:cNvPr id="2" name="Title 1"/>
           <p:cNvSpPr>
             <a:spLocks noGrp="1"/>
           </p:cNvSpPr>
@@ -9439,15 +9347,57 @@
           <a:p>
             <a:r>
               <a:rPr lang="en-US" dirty="0"/>
-              <a:t>Appendix: Preparing Data In Tableau</a:t>
-            </a:r>
+              <a:t>Scheduling Workflows on the Server (Discussed)</a:t>
+            </a:r>
+          </a:p>
+        </p:txBody>
+      </p:sp>
+      <p:sp>
+        <p:nvSpPr>
+          <p:cNvPr id="5" name="Text Placeholder 4"/>
+          <p:cNvSpPr>
+            <a:spLocks noGrp="1"/>
+          </p:cNvSpPr>
+          <p:nvPr>
+            <p:ph type="body" sz="quarter" idx="10"/>
+          </p:nvPr>
+        </p:nvSpPr>
+        <p:spPr/>
+        <p:txBody>
+          <a:bodyPr/>
+          <a:lstStyle/>
+          <a:p>
+            <a:endParaRPr lang="en-US"/>
+          </a:p>
+        </p:txBody>
+      </p:sp>
+      <p:sp>
+        <p:nvSpPr>
+          <p:cNvPr id="4" name="Slide Number Placeholder 3"/>
+          <p:cNvSpPr>
+            <a:spLocks noGrp="1"/>
+          </p:cNvSpPr>
+          <p:nvPr>
+            <p:ph type="sldNum" sz="quarter" idx="4294967295"/>
+          </p:nvPr>
+        </p:nvSpPr>
+        <p:spPr/>
+        <p:txBody>
+          <a:bodyPr/>
+          <a:lstStyle/>
+          <a:p>
+            <a:fld id="{4FAB73BC-B049-4115-A692-8D63A059BFB8}" type="slidenum">
+              <a:rPr lang="en-US" smtClean="0"/>
+              <a:t>101</a:t>
+            </a:fld>
+            <a:endParaRPr lang="en-US" dirty="0"/>
           </a:p>
         </p:txBody>
       </p:sp>
     </p:spTree>
     <p:extLst>
       <p:ext uri="{BB962C8B-B14F-4D97-AF65-F5344CB8AC3E}">
-        <p14:creationId xmlns:p14="http://schemas.microsoft.com/office/powerpoint/2010/main" val="746464040"/>
+        <p14:creationId xmlns:p14="http://schemas.microsoft.com/office/powerpoint/2010/main" val="2531394161"/>
       </p:ext>
     </p:extLst>
   </p:cSld>
@@ -36175,13 +36125,8 @@
           <a:p>
             <a:r>
               <a:rPr lang="en-US" dirty="0"/>
-              <a:t>Analysis typically requires attribute columns &amp; </a:t>
-            </a:r>
-            <a:r>
-              <a:rPr lang="en-US"/>
-              <a:t>value columns</a:t>
-            </a:r>
-            <a:endParaRPr lang="en-US" dirty="0"/>
+              <a:t>Analysis typically requires attribute columns &amp; value columns</a:t>
+            </a:r>
           </a:p>
           <a:p>
             <a:endParaRPr lang="en-US" dirty="0"/>
@@ -36302,7 +36247,27 @@
             </a:pPr>
             <a:r>
               <a:rPr lang="en-US" i="1" dirty="0"/>
-              <a:t> </a:t>
+              <a:t> “Aggregating Data”, pp. 132-134</a:t>
+            </a:r>
+          </a:p>
+          <a:p>
+            <a:pPr marL="342900" indent="-342900">
+              <a:buFont typeface="Arial" panose="020B0604020202020204" pitchFamily="34" charset="0"/>
+              <a:buChar char="•"/>
+            </a:pPr>
+            <a:r>
+              <a:rPr lang="en-US" i="1" dirty="0"/>
+              <a:t>“Pivot”, pp. 138-145</a:t>
+            </a:r>
+          </a:p>
+          <a:p>
+            <a:pPr marL="342900" indent="-342900">
+              <a:buFont typeface="Arial" panose="020B0604020202020204" pitchFamily="34" charset="0"/>
+              <a:buChar char="•"/>
+            </a:pPr>
+            <a:r>
+              <a:rPr lang="en-US" i="1" dirty="0"/>
+              <a:t>“Unpivot”, pp. 146-148</a:t>
             </a:r>
           </a:p>
         </p:txBody>
@@ -36328,7 +36293,10 @@
           <a:bodyPr/>
           <a:lstStyle/>
           <a:p>
-            <a:endParaRPr lang="en-US"/>
+            <a:r>
+              <a:rPr lang="en-US" dirty="0"/>
+              <a:t>30 Minutes</a:t>
+            </a:r>
           </a:p>
         </p:txBody>
       </p:sp>
@@ -36555,10 +36523,81 @@
           <a:bodyPr/>
           <a:lstStyle/>
           <a:p>
-            <a:endParaRPr lang="en-US"/>
+            <a:r>
+              <a:rPr lang="en-US" dirty="0"/>
+              <a:t>File formats: .</a:t>
+            </a:r>
+            <a:r>
+              <a:rPr lang="en-US" dirty="0" err="1"/>
+              <a:t>tde</a:t>
+            </a:r>
+            <a:r>
+              <a:rPr lang="en-US" dirty="0"/>
+              <a:t>, .hyper, .csv</a:t>
+            </a:r>
           </a:p>
         </p:txBody>
       </p:sp>
+      <p:pic>
+        <p:nvPicPr>
+          <p:cNvPr id="4" name="Picture 3">
+            <a:extLst>
+              <a:ext uri="{FF2B5EF4-FFF2-40B4-BE49-F238E27FC236}">
+                <a16:creationId xmlns:a16="http://schemas.microsoft.com/office/drawing/2014/main" id="{EFF7E02E-665C-498D-AF31-CB83EC07D60A}"/>
+              </a:ext>
+            </a:extLst>
+          </p:cNvPr>
+          <p:cNvPicPr>
+            <a:picLocks noChangeAspect="1"/>
+          </p:cNvPicPr>
+          <p:nvPr/>
+        </p:nvPicPr>
+        <p:blipFill>
+          <a:blip r:embed="rId3"/>
+          <a:stretch>
+            <a:fillRect/>
+          </a:stretch>
+        </p:blipFill>
+        <p:spPr>
+          <a:xfrm>
+            <a:off x="6553200" y="838200"/>
+            <a:ext cx="1095528" cy="666843"/>
+          </a:xfrm>
+          <a:prstGeom prst="rect">
+            <a:avLst/>
+          </a:prstGeom>
+        </p:spPr>
+      </p:pic>
+      <p:pic>
+        <p:nvPicPr>
+          <p:cNvPr id="5" name="Picture 4">
+            <a:extLst>
+              <a:ext uri="{FF2B5EF4-FFF2-40B4-BE49-F238E27FC236}">
+                <a16:creationId xmlns:a16="http://schemas.microsoft.com/office/drawing/2014/main" id="{0B89DD90-16B2-47DA-99B1-39F75F384EAE}"/>
+              </a:ext>
+            </a:extLst>
+          </p:cNvPr>
+          <p:cNvPicPr>
+            <a:picLocks noChangeAspect="1"/>
+          </p:cNvPicPr>
+          <p:nvPr/>
+        </p:nvPicPr>
+        <p:blipFill>
+          <a:blip r:embed="rId4"/>
+          <a:stretch>
+            <a:fillRect/>
+          </a:stretch>
+        </p:blipFill>
+        <p:spPr>
+          <a:xfrm>
+            <a:off x="8772154" y="1823813"/>
+            <a:ext cx="2657846" cy="3210373"/>
+          </a:xfrm>
+          <a:prstGeom prst="rect">
+            <a:avLst/>
+          </a:prstGeom>
+        </p:spPr>
+      </p:pic>
     </p:spTree>
     <p:extLst>
       <p:ext uri="{BB962C8B-B14F-4D97-AF65-F5344CB8AC3E}">
@@ -36633,15 +36672,53 @@
             <p:ph type="body" sz="quarter" idx="10"/>
           </p:nvPr>
         </p:nvSpPr>
-        <p:spPr/>
+        <p:spPr>
+          <a:xfrm>
+            <a:off x="762000" y="1752600"/>
+            <a:ext cx="7772400" cy="3733800"/>
+          </a:xfrm>
+        </p:spPr>
         <p:txBody>
           <a:bodyPr/>
           <a:lstStyle/>
           <a:p>
-            <a:endParaRPr lang="en-US"/>
+            <a:r>
+              <a:rPr lang="en-US" dirty="0"/>
+              <a:t>Prep can also output to a server or Tableau Online</a:t>
+            </a:r>
           </a:p>
         </p:txBody>
       </p:sp>
+      <p:pic>
+        <p:nvPicPr>
+          <p:cNvPr id="4" name="Picture 3">
+            <a:extLst>
+              <a:ext uri="{FF2B5EF4-FFF2-40B4-BE49-F238E27FC236}">
+                <a16:creationId xmlns:a16="http://schemas.microsoft.com/office/drawing/2014/main" id="{B5B891A1-0061-40B6-B04B-469BF368500F}"/>
+              </a:ext>
+            </a:extLst>
+          </p:cNvPr>
+          <p:cNvPicPr>
+            <a:picLocks noChangeAspect="1"/>
+          </p:cNvPicPr>
+          <p:nvPr/>
+        </p:nvPicPr>
+        <p:blipFill>
+          <a:blip r:embed="rId3"/>
+          <a:stretch>
+            <a:fillRect/>
+          </a:stretch>
+        </p:blipFill>
+        <p:spPr>
+          <a:xfrm>
+            <a:off x="8819786" y="668208"/>
+            <a:ext cx="2610214" cy="1857634"/>
+          </a:xfrm>
+          <a:prstGeom prst="rect">
+            <a:avLst/>
+          </a:prstGeom>
+        </p:spPr>
+      </p:pic>
     </p:spTree>
     <p:extLst>
       <p:ext uri="{BB962C8B-B14F-4D97-AF65-F5344CB8AC3E}">
@@ -36674,10 +36751,10 @@
       </p:grpSpPr>
       <p:sp>
         <p:nvSpPr>
-          <p:cNvPr id="2" name="Title 1">
+          <p:cNvPr id="2" name="Subtitle 1">
             <a:extLst>
               <a:ext uri="{FF2B5EF4-FFF2-40B4-BE49-F238E27FC236}">
-                <a16:creationId xmlns:a16="http://schemas.microsoft.com/office/drawing/2014/main" id="{BC13A45F-B701-6042-A1FC-E51DBE17F7A5}"/>
+                <a16:creationId xmlns:a16="http://schemas.microsoft.com/office/drawing/2014/main" id="{754018C2-5B5D-4B02-B84F-65ECE4C3752D}"/>
               </a:ext>
             </a:extLst>
           </p:cNvPr>
@@ -36685,7 +36762,7 @@
             <a:spLocks noGrp="1"/>
           </p:cNvSpPr>
           <p:nvPr>
-            <p:ph type="title"/>
+            <p:ph type="subTitle" idx="1"/>
           </p:nvPr>
         </p:nvSpPr>
         <p:spPr/>
@@ -36693,22 +36770,77 @@
           <a:bodyPr/>
           <a:lstStyle/>
           <a:p>
+            <a:pPr marL="342900" indent="-342900">
+              <a:buFont typeface="Arial" panose="020B0604020202020204" pitchFamily="34" charset="0"/>
+              <a:buChar char="•"/>
+            </a:pPr>
             <a:r>
               <a:rPr lang="en-US" dirty="0"/>
-              <a:t>Module 9: Prep Builder Conductor and Publishing Workflows</a:t>
-            </a:r>
-            <a:r>
-              <a:rPr lang="en-US" baseline="0" dirty="0"/>
-              <a:t> to Tableau Server</a:t>
-            </a:r>
-            <a:endParaRPr lang="en-US" dirty="0"/>
+              <a:t>Exercise 11.1, pp. 151-155</a:t>
+            </a:r>
+          </a:p>
+        </p:txBody>
+      </p:sp>
+      <p:sp>
+        <p:nvSpPr>
+          <p:cNvPr id="3" name="Text Placeholder 2">
+            <a:extLst>
+              <a:ext uri="{FF2B5EF4-FFF2-40B4-BE49-F238E27FC236}">
+                <a16:creationId xmlns:a16="http://schemas.microsoft.com/office/drawing/2014/main" id="{6A0AC584-05CF-440B-9623-884DC38DD2CC}"/>
+              </a:ext>
+            </a:extLst>
+          </p:cNvPr>
+          <p:cNvSpPr>
+            <a:spLocks noGrp="1"/>
+          </p:cNvSpPr>
+          <p:nvPr>
+            <p:ph type="body" sz="quarter" idx="11"/>
+          </p:nvPr>
+        </p:nvSpPr>
+        <p:spPr/>
+        <p:txBody>
+          <a:bodyPr/>
+          <a:lstStyle/>
+          <a:p>
+            <a:r>
+              <a:rPr lang="en-US" dirty="0"/>
+              <a:t>15 Minutes</a:t>
+            </a:r>
+          </a:p>
+        </p:txBody>
+      </p:sp>
+      <p:sp>
+        <p:nvSpPr>
+          <p:cNvPr id="4" name="Title 3">
+            <a:extLst>
+              <a:ext uri="{FF2B5EF4-FFF2-40B4-BE49-F238E27FC236}">
+                <a16:creationId xmlns:a16="http://schemas.microsoft.com/office/drawing/2014/main" id="{76D3235D-8164-477B-9C25-3BFCBDBA4892}"/>
+              </a:ext>
+            </a:extLst>
+          </p:cNvPr>
+          <p:cNvSpPr>
+            <a:spLocks noGrp="1"/>
+          </p:cNvSpPr>
+          <p:nvPr>
+            <p:ph type="title"/>
+          </p:nvPr>
+        </p:nvSpPr>
+        <p:spPr/>
+        <p:txBody>
+          <a:bodyPr/>
+          <a:lstStyle/>
+          <a:p>
+            <a:r>
+              <a:rPr lang="en-US" dirty="0"/>
+              <a:t>Lab 8: Output</a:t>
+            </a:r>
           </a:p>
         </p:txBody>
       </p:sp>
     </p:spTree>
     <p:extLst>
       <p:ext uri="{BB962C8B-B14F-4D97-AF65-F5344CB8AC3E}">
-        <p14:creationId xmlns:p14="http://schemas.microsoft.com/office/powerpoint/2010/main" val="4173510137"/>
+        <p14:creationId xmlns:p14="http://schemas.microsoft.com/office/powerpoint/2010/main" val="1972065437"/>
       </p:ext>
     </p:extLst>
   </p:cSld>
@@ -36737,39 +36869,18 @@
       </p:grpSpPr>
       <p:sp>
         <p:nvSpPr>
-          <p:cNvPr id="2" name="Title 1"/>
+          <p:cNvPr id="2" name="Title 1">
+            <a:extLst>
+              <a:ext uri="{FF2B5EF4-FFF2-40B4-BE49-F238E27FC236}">
+                <a16:creationId xmlns:a16="http://schemas.microsoft.com/office/drawing/2014/main" id="{BC13A45F-B701-6042-A1FC-E51DBE17F7A5}"/>
+              </a:ext>
+            </a:extLst>
+          </p:cNvPr>
           <p:cNvSpPr>
             <a:spLocks noGrp="1"/>
           </p:cNvSpPr>
           <p:nvPr>
             <p:ph type="title"/>
-          </p:nvPr>
-        </p:nvSpPr>
-        <p:spPr/>
-        <p:txBody>
-          <a:bodyPr>
-            <a:normAutofit/>
-          </a:bodyPr>
-          <a:lstStyle/>
-          <a:p>
-            <a:r>
-              <a:rPr lang="en-US" dirty="0"/>
-              <a:t>Tableau Prep Builder Conductor</a:t>
-            </a:r>
-          </a:p>
-          <a:p>
-            <a:endParaRPr lang="en-US" dirty="0"/>
-          </a:p>
-        </p:txBody>
-      </p:sp>
-      <p:sp>
-        <p:nvSpPr>
-          <p:cNvPr id="5" name="Text Placeholder 4"/>
-          <p:cNvSpPr>
-            <a:spLocks noGrp="1"/>
-          </p:cNvSpPr>
-          <p:nvPr>
-            <p:ph type="body" sz="quarter" idx="10"/>
           </p:nvPr>
         </p:nvSpPr>
         <p:spPr/>
@@ -36777,29 +36888,14 @@
           <a:bodyPr/>
           <a:lstStyle/>
           <a:p>
-            <a:endParaRPr lang="en-US"/>
-          </a:p>
-        </p:txBody>
-      </p:sp>
-      <p:sp>
-        <p:nvSpPr>
-          <p:cNvPr id="4" name="Slide Number Placeholder 3"/>
-          <p:cNvSpPr>
-            <a:spLocks noGrp="1"/>
-          </p:cNvSpPr>
-          <p:nvPr>
-            <p:ph type="sldNum" sz="quarter" idx="4294967295"/>
-          </p:nvPr>
-        </p:nvSpPr>
-        <p:spPr/>
-        <p:txBody>
-          <a:bodyPr/>
-          <a:lstStyle/>
-          <a:p>
-            <a:fld id="{4FAB73BC-B049-4115-A692-8D63A059BFB8}" type="slidenum">
-              <a:rPr lang="en-US" smtClean="0"/>
-              <a:t>98</a:t>
-            </a:fld>
+            <a:r>
+              <a:rPr lang="en-US" dirty="0"/>
+              <a:t>Module 9: Prep Builder Conductor and Publishing Workflows</a:t>
+            </a:r>
+            <a:r>
+              <a:rPr lang="en-US" baseline="0" dirty="0"/>
+              <a:t> to Tableau Server</a:t>
+            </a:r>
             <a:endParaRPr lang="en-US" dirty="0"/>
           </a:p>
         </p:txBody>
@@ -36807,7 +36903,7 @@
     </p:spTree>
     <p:extLst>
       <p:ext uri="{BB962C8B-B14F-4D97-AF65-F5344CB8AC3E}">
-        <p14:creationId xmlns:p14="http://schemas.microsoft.com/office/powerpoint/2010/main" val="3097242473"/>
+        <p14:creationId xmlns:p14="http://schemas.microsoft.com/office/powerpoint/2010/main" val="4173510137"/>
       </p:ext>
     </p:extLst>
   </p:cSld>
@@ -36853,7 +36949,7 @@
           <a:p>
             <a:r>
               <a:rPr lang="en-US" dirty="0"/>
-              <a:t>Publishing Workflows to Server (Discussed)</a:t>
+              <a:t>Tableau Prep Conductor</a:t>
             </a:r>
           </a:p>
           <a:p>
@@ -36871,12 +36967,26 @@
             <p:ph type="body" sz="quarter" idx="10"/>
           </p:nvPr>
         </p:nvSpPr>
-        <p:spPr/>
+        <p:spPr>
+          <a:xfrm>
+            <a:off x="762000" y="1752600"/>
+            <a:ext cx="4343400" cy="3733800"/>
+          </a:xfrm>
+        </p:spPr>
         <p:txBody>
           <a:bodyPr/>
           <a:lstStyle/>
           <a:p>
-            <a:endParaRPr lang="en-US"/>
+            <a:r>
+              <a:rPr lang="en-US" dirty="0"/>
+              <a:t>Part of the Data Management Add-on</a:t>
+            </a:r>
+          </a:p>
+          <a:p>
+            <a:r>
+              <a:rPr lang="en-US" dirty="0"/>
+              <a:t>Schedule &amp; Monitor Flows on the server</a:t>
+            </a:r>
           </a:p>
         </p:txBody>
       </p:sp>
@@ -36903,10 +37013,40 @@
           </a:p>
         </p:txBody>
       </p:sp>
+      <p:pic>
+        <p:nvPicPr>
+          <p:cNvPr id="3" name="Picture 2">
+            <a:extLst>
+              <a:ext uri="{FF2B5EF4-FFF2-40B4-BE49-F238E27FC236}">
+                <a16:creationId xmlns:a16="http://schemas.microsoft.com/office/drawing/2014/main" id="{F3A79E44-1126-4484-88CD-9CB3EE29ECE5}"/>
+              </a:ext>
+            </a:extLst>
+          </p:cNvPr>
+          <p:cNvPicPr>
+            <a:picLocks noChangeAspect="1"/>
+          </p:cNvPicPr>
+          <p:nvPr/>
+        </p:nvPicPr>
+        <p:blipFill>
+          <a:blip r:embed="rId3"/>
+          <a:stretch>
+            <a:fillRect/>
+          </a:stretch>
+        </p:blipFill>
+        <p:spPr>
+          <a:xfrm>
+            <a:off x="5352404" y="1371600"/>
+            <a:ext cx="6077596" cy="3789119"/>
+          </a:xfrm>
+          <a:prstGeom prst="rect">
+            <a:avLst/>
+          </a:prstGeom>
+        </p:spPr>
+      </p:pic>
     </p:spTree>
     <p:extLst>
       <p:ext uri="{BB962C8B-B14F-4D97-AF65-F5344CB8AC3E}">
-        <p14:creationId xmlns:p14="http://schemas.microsoft.com/office/powerpoint/2010/main" val="2246816309"/>
+        <p14:creationId xmlns:p14="http://schemas.microsoft.com/office/powerpoint/2010/main" val="3097242473"/>
       </p:ext>
     </p:extLst>
   </p:cSld>

</xml_diff>